<commit_message>
fix ptrol plan images in docs
</commit_message>
<xml_diff>
--- a/docs/mkdocs-ng/docs/tutorials/quickstart-bdi/patrol.pptx
+++ b/docs/mkdocs-ng/docs/tutorials/quickstart-bdi/patrol.pptx
@@ -8,14 +8,14 @@
     <p:sldId id="258" r:id="rId2"/>
     <p:sldId id="259" r:id="rId3"/>
   </p:sldIdLst>
-  <p:sldSz cx="4319588" cy="3240088"/>
+  <p:sldSz cx="2879725" cy="2160588"/>
   <p:notesSz cx="6858000" cy="9144000"/>
   <p:defaultTextStyle>
     <a:defPPr>
       <a:defRPr lang="de-DE"/>
     </a:defPPr>
-    <a:lvl1pPr marL="0" algn="l" defTabSz="431917" rtl="0" eaLnBrk="1" latinLnBrk="0" hangingPunct="1">
-      <a:defRPr sz="851" kern="1200">
+    <a:lvl1pPr marL="0" algn="l" defTabSz="287959" rtl="0" eaLnBrk="1" latinLnBrk="0" hangingPunct="1">
+      <a:defRPr sz="567" kern="1200">
         <a:solidFill>
           <a:schemeClr val="tx1"/>
         </a:solidFill>
@@ -24,8 +24,8 @@
         <a:cs typeface="+mn-cs"/>
       </a:defRPr>
     </a:lvl1pPr>
-    <a:lvl2pPr marL="215959" algn="l" defTabSz="431917" rtl="0" eaLnBrk="1" latinLnBrk="0" hangingPunct="1">
-      <a:defRPr sz="851" kern="1200">
+    <a:lvl2pPr marL="143980" algn="l" defTabSz="287959" rtl="0" eaLnBrk="1" latinLnBrk="0" hangingPunct="1">
+      <a:defRPr sz="567" kern="1200">
         <a:solidFill>
           <a:schemeClr val="tx1"/>
         </a:solidFill>
@@ -34,8 +34,8 @@
         <a:cs typeface="+mn-cs"/>
       </a:defRPr>
     </a:lvl2pPr>
-    <a:lvl3pPr marL="431917" algn="l" defTabSz="431917" rtl="0" eaLnBrk="1" latinLnBrk="0" hangingPunct="1">
-      <a:defRPr sz="851" kern="1200">
+    <a:lvl3pPr marL="287959" algn="l" defTabSz="287959" rtl="0" eaLnBrk="1" latinLnBrk="0" hangingPunct="1">
+      <a:defRPr sz="567" kern="1200">
         <a:solidFill>
           <a:schemeClr val="tx1"/>
         </a:solidFill>
@@ -44,8 +44,8 @@
         <a:cs typeface="+mn-cs"/>
       </a:defRPr>
     </a:lvl3pPr>
-    <a:lvl4pPr marL="647876" algn="l" defTabSz="431917" rtl="0" eaLnBrk="1" latinLnBrk="0" hangingPunct="1">
-      <a:defRPr sz="851" kern="1200">
+    <a:lvl4pPr marL="431939" algn="l" defTabSz="287959" rtl="0" eaLnBrk="1" latinLnBrk="0" hangingPunct="1">
+      <a:defRPr sz="567" kern="1200">
         <a:solidFill>
           <a:schemeClr val="tx1"/>
         </a:solidFill>
@@ -54,8 +54,8 @@
         <a:cs typeface="+mn-cs"/>
       </a:defRPr>
     </a:lvl4pPr>
-    <a:lvl5pPr marL="863834" algn="l" defTabSz="431917" rtl="0" eaLnBrk="1" latinLnBrk="0" hangingPunct="1">
-      <a:defRPr sz="851" kern="1200">
+    <a:lvl5pPr marL="575918" algn="l" defTabSz="287959" rtl="0" eaLnBrk="1" latinLnBrk="0" hangingPunct="1">
+      <a:defRPr sz="567" kern="1200">
         <a:solidFill>
           <a:schemeClr val="tx1"/>
         </a:solidFill>
@@ -64,8 +64,8 @@
         <a:cs typeface="+mn-cs"/>
       </a:defRPr>
     </a:lvl5pPr>
-    <a:lvl6pPr marL="1079792" algn="l" defTabSz="431917" rtl="0" eaLnBrk="1" latinLnBrk="0" hangingPunct="1">
-      <a:defRPr sz="851" kern="1200">
+    <a:lvl6pPr marL="719897" algn="l" defTabSz="287959" rtl="0" eaLnBrk="1" latinLnBrk="0" hangingPunct="1">
+      <a:defRPr sz="567" kern="1200">
         <a:solidFill>
           <a:schemeClr val="tx1"/>
         </a:solidFill>
@@ -74,8 +74,8 @@
         <a:cs typeface="+mn-cs"/>
       </a:defRPr>
     </a:lvl6pPr>
-    <a:lvl7pPr marL="1295750" algn="l" defTabSz="431917" rtl="0" eaLnBrk="1" latinLnBrk="0" hangingPunct="1">
-      <a:defRPr sz="851" kern="1200">
+    <a:lvl7pPr marL="863877" algn="l" defTabSz="287959" rtl="0" eaLnBrk="1" latinLnBrk="0" hangingPunct="1">
+      <a:defRPr sz="567" kern="1200">
         <a:solidFill>
           <a:schemeClr val="tx1"/>
         </a:solidFill>
@@ -84,8 +84,8 @@
         <a:cs typeface="+mn-cs"/>
       </a:defRPr>
     </a:lvl7pPr>
-    <a:lvl8pPr marL="1511709" algn="l" defTabSz="431917" rtl="0" eaLnBrk="1" latinLnBrk="0" hangingPunct="1">
-      <a:defRPr sz="851" kern="1200">
+    <a:lvl8pPr marL="1007856" algn="l" defTabSz="287959" rtl="0" eaLnBrk="1" latinLnBrk="0" hangingPunct="1">
+      <a:defRPr sz="567" kern="1200">
         <a:solidFill>
           <a:schemeClr val="tx1"/>
         </a:solidFill>
@@ -94,8 +94,8 @@
         <a:cs typeface="+mn-cs"/>
       </a:defRPr>
     </a:lvl8pPr>
-    <a:lvl9pPr marL="1727667" algn="l" defTabSz="431917" rtl="0" eaLnBrk="1" latinLnBrk="0" hangingPunct="1">
-      <a:defRPr sz="851" kern="1200">
+    <a:lvl9pPr marL="1151836" algn="l" defTabSz="287959" rtl="0" eaLnBrk="1" latinLnBrk="0" hangingPunct="1">
+      <a:defRPr sz="567" kern="1200">
         <a:solidFill>
           <a:schemeClr val="tx1"/>
         </a:solidFill>
@@ -108,12 +108,12 @@
   <p:extLst>
     <p:ext uri="{EFAFB233-063F-42B5-8137-9DF3F51BA10A}">
       <p15:sldGuideLst xmlns:p15="http://schemas.microsoft.com/office/powerpoint/2012/main">
-        <p15:guide id="1" orient="horz" pos="1021" userDrawn="1">
+        <p15:guide id="1" orient="horz" pos="681" userDrawn="1">
           <p15:clr>
             <a:srgbClr val="A4A3A4"/>
           </p15:clr>
         </p15:guide>
-        <p15:guide id="2" pos="1361" userDrawn="1">
+        <p15:guide id="2" pos="907" userDrawn="1">
           <p15:clr>
             <a:srgbClr val="A4A3A4"/>
           </p15:clr>
@@ -153,8 +153,8 @@
         </p:nvSpPr>
         <p:spPr>
           <a:xfrm>
-            <a:off x="323970" y="1006527"/>
-            <a:ext cx="3671650" cy="694519"/>
+            <a:off x="215980" y="671183"/>
+            <a:ext cx="2447766" cy="463126"/>
           </a:xfrm>
         </p:spPr>
         <p:txBody>
@@ -181,8 +181,8 @@
         </p:nvSpPr>
         <p:spPr>
           <a:xfrm>
-            <a:off x="647939" y="1836050"/>
-            <a:ext cx="3023712" cy="828023"/>
+            <a:off x="431959" y="1224333"/>
+            <a:ext cx="2015808" cy="552151"/>
           </a:xfrm>
         </p:spPr>
         <p:txBody>
@@ -198,7 +198,7 @@
                 </a:solidFill>
               </a:defRPr>
             </a:lvl1pPr>
-            <a:lvl2pPr marL="215993" indent="0" algn="ctr">
+            <a:lvl2pPr marL="144003" indent="0" algn="ctr">
               <a:buNone/>
               <a:defRPr>
                 <a:solidFill>
@@ -208,7 +208,7 @@
                 </a:solidFill>
               </a:defRPr>
             </a:lvl2pPr>
-            <a:lvl3pPr marL="431986" indent="0" algn="ctr">
+            <a:lvl3pPr marL="288005" indent="0" algn="ctr">
               <a:buNone/>
               <a:defRPr>
                 <a:solidFill>
@@ -218,7 +218,7 @@
                 </a:solidFill>
               </a:defRPr>
             </a:lvl3pPr>
-            <a:lvl4pPr marL="647978" indent="0" algn="ctr">
+            <a:lvl4pPr marL="432007" indent="0" algn="ctr">
               <a:buNone/>
               <a:defRPr>
                 <a:solidFill>
@@ -228,7 +228,7 @@
                 </a:solidFill>
               </a:defRPr>
             </a:lvl4pPr>
-            <a:lvl5pPr marL="863971" indent="0" algn="ctr">
+            <a:lvl5pPr marL="576009" indent="0" algn="ctr">
               <a:buNone/>
               <a:defRPr>
                 <a:solidFill>
@@ -238,7 +238,7 @@
                 </a:solidFill>
               </a:defRPr>
             </a:lvl5pPr>
-            <a:lvl6pPr marL="1079963" indent="0" algn="ctr">
+            <a:lvl6pPr marL="720011" indent="0" algn="ctr">
               <a:buNone/>
               <a:defRPr>
                 <a:solidFill>
@@ -248,7 +248,7 @@
                 </a:solidFill>
               </a:defRPr>
             </a:lvl6pPr>
-            <a:lvl7pPr marL="1295957" indent="0" algn="ctr">
+            <a:lvl7pPr marL="864015" indent="0" algn="ctr">
               <a:buNone/>
               <a:defRPr>
                 <a:solidFill>
@@ -258,7 +258,7 @@
                 </a:solidFill>
               </a:defRPr>
             </a:lvl7pPr>
-            <a:lvl8pPr marL="1511949" indent="0" algn="ctr">
+            <a:lvl8pPr marL="1008016" indent="0" algn="ctr">
               <a:buNone/>
               <a:defRPr>
                 <a:solidFill>
@@ -268,7 +268,7 @@
                 </a:solidFill>
               </a:defRPr>
             </a:lvl8pPr>
-            <a:lvl9pPr marL="1727942" indent="0" algn="ctr">
+            <a:lvl9pPr marL="1152019" indent="0" algn="ctr">
               <a:buNone/>
               <a:defRPr>
                 <a:solidFill>
@@ -305,7 +305,7 @@
           <a:p>
             <a:fld id="{87CB0DDD-8CA0-4903-99FB-3FB32E8355B3}" type="datetimeFigureOut">
               <a:rPr lang="de-DE" smtClean="0"/>
-              <a:t>15.10.2018</a:t>
+              <a:t>17.10.2018</a:t>
             </a:fld>
             <a:endParaRPr lang="de-DE"/>
           </a:p>
@@ -475,7 +475,7 @@
           <a:p>
             <a:fld id="{87CB0DDD-8CA0-4903-99FB-3FB32E8355B3}" type="datetimeFigureOut">
               <a:rPr lang="de-DE" smtClean="0"/>
-              <a:t>15.10.2018</a:t>
+              <a:t>17.10.2018</a:t>
             </a:fld>
             <a:endParaRPr lang="de-DE"/>
           </a:p>
@@ -565,8 +565,8 @@
         </p:nvSpPr>
         <p:spPr>
           <a:xfrm>
-            <a:off x="3131701" y="129754"/>
-            <a:ext cx="971907" cy="2764575"/>
+            <a:off x="2087801" y="86524"/>
+            <a:ext cx="647938" cy="1843502"/>
           </a:xfrm>
         </p:spPr>
         <p:txBody>
@@ -593,8 +593,8 @@
         </p:nvSpPr>
         <p:spPr>
           <a:xfrm>
-            <a:off x="215979" y="129754"/>
-            <a:ext cx="2843729" cy="2764575"/>
+            <a:off x="143986" y="86524"/>
+            <a:ext cx="1895819" cy="1843502"/>
           </a:xfrm>
         </p:spPr>
         <p:txBody>
@@ -655,7 +655,7 @@
           <a:p>
             <a:fld id="{87CB0DDD-8CA0-4903-99FB-3FB32E8355B3}" type="datetimeFigureOut">
               <a:rPr lang="de-DE" smtClean="0"/>
-              <a:t>15.10.2018</a:t>
+              <a:t>17.10.2018</a:t>
             </a:fld>
             <a:endParaRPr lang="de-DE"/>
           </a:p>
@@ -825,7 +825,7 @@
           <a:p>
             <a:fld id="{87CB0DDD-8CA0-4903-99FB-3FB32E8355B3}" type="datetimeFigureOut">
               <a:rPr lang="de-DE" smtClean="0"/>
-              <a:t>15.10.2018</a:t>
+              <a:t>17.10.2018</a:t>
             </a:fld>
             <a:endParaRPr lang="de-DE"/>
           </a:p>
@@ -915,15 +915,15 @@
         </p:nvSpPr>
         <p:spPr>
           <a:xfrm>
-            <a:off x="341218" y="2082057"/>
-            <a:ext cx="3671650" cy="643517"/>
+            <a:off x="227479" y="1388379"/>
+            <a:ext cx="2447766" cy="429116"/>
           </a:xfrm>
         </p:spPr>
         <p:txBody>
           <a:bodyPr anchor="t"/>
           <a:lstStyle>
             <a:lvl1pPr algn="l">
-              <a:defRPr sz="1890" b="1" cap="all"/>
+              <a:defRPr sz="1260" b="1" cap="all"/>
             </a:lvl1pPr>
           </a:lstStyle>
           <a:p>
@@ -947,8 +947,8 @@
         </p:nvSpPr>
         <p:spPr>
           <a:xfrm>
-            <a:off x="341218" y="1373288"/>
-            <a:ext cx="3671650" cy="708769"/>
+            <a:off x="227479" y="915750"/>
+            <a:ext cx="2447766" cy="472628"/>
           </a:xfrm>
         </p:spPr>
         <p:txBody>
@@ -956,7 +956,7 @@
           <a:lstStyle>
             <a:lvl1pPr marL="0" indent="0">
               <a:buNone/>
-              <a:defRPr sz="945">
+              <a:defRPr sz="630">
                 <a:solidFill>
                   <a:schemeClr val="tx1">
                     <a:tint val="75000"/>
@@ -964,9 +964,9 @@
                 </a:solidFill>
               </a:defRPr>
             </a:lvl1pPr>
-            <a:lvl2pPr marL="215993" indent="0">
+            <a:lvl2pPr marL="144003" indent="0">
               <a:buNone/>
-              <a:defRPr sz="851">
+              <a:defRPr sz="567">
                 <a:solidFill>
                   <a:schemeClr val="tx1">
                     <a:tint val="75000"/>
@@ -974,9 +974,9 @@
                 </a:solidFill>
               </a:defRPr>
             </a:lvl2pPr>
-            <a:lvl3pPr marL="431986" indent="0">
+            <a:lvl3pPr marL="288005" indent="0">
               <a:buNone/>
-              <a:defRPr sz="756">
+              <a:defRPr sz="504">
                 <a:solidFill>
                   <a:schemeClr val="tx1">
                     <a:tint val="75000"/>
@@ -984,9 +984,9 @@
                 </a:solidFill>
               </a:defRPr>
             </a:lvl3pPr>
-            <a:lvl4pPr marL="647978" indent="0">
+            <a:lvl4pPr marL="432007" indent="0">
               <a:buNone/>
-              <a:defRPr sz="662">
+              <a:defRPr sz="441">
                 <a:solidFill>
                   <a:schemeClr val="tx1">
                     <a:tint val="75000"/>
@@ -994,9 +994,9 @@
                 </a:solidFill>
               </a:defRPr>
             </a:lvl4pPr>
-            <a:lvl5pPr marL="863971" indent="0">
+            <a:lvl5pPr marL="576009" indent="0">
               <a:buNone/>
-              <a:defRPr sz="662">
+              <a:defRPr sz="441">
                 <a:solidFill>
                   <a:schemeClr val="tx1">
                     <a:tint val="75000"/>
@@ -1004,9 +1004,9 @@
                 </a:solidFill>
               </a:defRPr>
             </a:lvl5pPr>
-            <a:lvl6pPr marL="1079963" indent="0">
+            <a:lvl6pPr marL="720011" indent="0">
               <a:buNone/>
-              <a:defRPr sz="662">
+              <a:defRPr sz="441">
                 <a:solidFill>
                   <a:schemeClr val="tx1">
                     <a:tint val="75000"/>
@@ -1014,9 +1014,9 @@
                 </a:solidFill>
               </a:defRPr>
             </a:lvl6pPr>
-            <a:lvl7pPr marL="1295957" indent="0">
+            <a:lvl7pPr marL="864015" indent="0">
               <a:buNone/>
-              <a:defRPr sz="662">
+              <a:defRPr sz="441">
                 <a:solidFill>
                   <a:schemeClr val="tx1">
                     <a:tint val="75000"/>
@@ -1024,9 +1024,9 @@
                 </a:solidFill>
               </a:defRPr>
             </a:lvl7pPr>
-            <a:lvl8pPr marL="1511949" indent="0">
+            <a:lvl8pPr marL="1008016" indent="0">
               <a:buNone/>
-              <a:defRPr sz="662">
+              <a:defRPr sz="441">
                 <a:solidFill>
                   <a:schemeClr val="tx1">
                     <a:tint val="75000"/>
@@ -1034,9 +1034,9 @@
                 </a:solidFill>
               </a:defRPr>
             </a:lvl8pPr>
-            <a:lvl9pPr marL="1727942" indent="0">
+            <a:lvl9pPr marL="1152019" indent="0">
               <a:buNone/>
-              <a:defRPr sz="662">
+              <a:defRPr sz="441">
                 <a:solidFill>
                   <a:schemeClr val="tx1">
                     <a:tint val="75000"/>
@@ -1071,7 +1071,7 @@
           <a:p>
             <a:fld id="{87CB0DDD-8CA0-4903-99FB-3FB32E8355B3}" type="datetimeFigureOut">
               <a:rPr lang="de-DE" smtClean="0"/>
-              <a:t>15.10.2018</a:t>
+              <a:t>17.10.2018</a:t>
             </a:fld>
             <a:endParaRPr lang="de-DE"/>
           </a:p>
@@ -1184,39 +1184,39 @@
         </p:nvSpPr>
         <p:spPr>
           <a:xfrm>
-            <a:off x="215980" y="756021"/>
-            <a:ext cx="1907818" cy="2138308"/>
+            <a:off x="143986" y="504138"/>
+            <a:ext cx="1271879" cy="1425888"/>
           </a:xfrm>
         </p:spPr>
         <p:txBody>
           <a:bodyPr/>
           <a:lstStyle>
             <a:lvl1pPr>
-              <a:defRPr sz="1323"/>
+              <a:defRPr sz="882"/>
             </a:lvl1pPr>
             <a:lvl2pPr>
-              <a:defRPr sz="1134"/>
+              <a:defRPr sz="756"/>
             </a:lvl2pPr>
             <a:lvl3pPr>
-              <a:defRPr sz="945"/>
+              <a:defRPr sz="630"/>
             </a:lvl3pPr>
             <a:lvl4pPr>
-              <a:defRPr sz="851"/>
+              <a:defRPr sz="567"/>
             </a:lvl4pPr>
             <a:lvl5pPr>
-              <a:defRPr sz="851"/>
+              <a:defRPr sz="567"/>
             </a:lvl5pPr>
             <a:lvl6pPr>
-              <a:defRPr sz="851"/>
+              <a:defRPr sz="567"/>
             </a:lvl6pPr>
             <a:lvl7pPr>
-              <a:defRPr sz="851"/>
+              <a:defRPr sz="567"/>
             </a:lvl7pPr>
             <a:lvl8pPr>
-              <a:defRPr sz="851"/>
+              <a:defRPr sz="567"/>
             </a:lvl8pPr>
             <a:lvl9pPr>
-              <a:defRPr sz="851"/>
+              <a:defRPr sz="567"/>
             </a:lvl9pPr>
           </a:lstStyle>
           <a:p>
@@ -1269,39 +1269,39 @@
         </p:nvSpPr>
         <p:spPr>
           <a:xfrm>
-            <a:off x="2195791" y="756021"/>
-            <a:ext cx="1907818" cy="2138308"/>
+            <a:off x="1463860" y="504138"/>
+            <a:ext cx="1271879" cy="1425888"/>
           </a:xfrm>
         </p:spPr>
         <p:txBody>
           <a:bodyPr/>
           <a:lstStyle>
             <a:lvl1pPr>
-              <a:defRPr sz="1323"/>
+              <a:defRPr sz="882"/>
             </a:lvl1pPr>
             <a:lvl2pPr>
-              <a:defRPr sz="1134"/>
+              <a:defRPr sz="756"/>
             </a:lvl2pPr>
             <a:lvl3pPr>
-              <a:defRPr sz="945"/>
+              <a:defRPr sz="630"/>
             </a:lvl3pPr>
             <a:lvl4pPr>
-              <a:defRPr sz="851"/>
+              <a:defRPr sz="567"/>
             </a:lvl4pPr>
             <a:lvl5pPr>
-              <a:defRPr sz="851"/>
+              <a:defRPr sz="567"/>
             </a:lvl5pPr>
             <a:lvl6pPr>
-              <a:defRPr sz="851"/>
+              <a:defRPr sz="567"/>
             </a:lvl6pPr>
             <a:lvl7pPr>
-              <a:defRPr sz="851"/>
+              <a:defRPr sz="567"/>
             </a:lvl7pPr>
             <a:lvl8pPr>
-              <a:defRPr sz="851"/>
+              <a:defRPr sz="567"/>
             </a:lvl8pPr>
             <a:lvl9pPr>
-              <a:defRPr sz="851"/>
+              <a:defRPr sz="567"/>
             </a:lvl9pPr>
           </a:lstStyle>
           <a:p>
@@ -1359,7 +1359,7 @@
           <a:p>
             <a:fld id="{87CB0DDD-8CA0-4903-99FB-3FB32E8355B3}" type="datetimeFigureOut">
               <a:rPr lang="de-DE" smtClean="0"/>
-              <a:t>15.10.2018</a:t>
+              <a:t>17.10.2018</a:t>
             </a:fld>
             <a:endParaRPr lang="de-DE"/>
           </a:p>
@@ -1476,8 +1476,8 @@
         </p:nvSpPr>
         <p:spPr>
           <a:xfrm>
-            <a:off x="215980" y="725270"/>
-            <a:ext cx="1908568" cy="302258"/>
+            <a:off x="143986" y="483632"/>
+            <a:ext cx="1272379" cy="201555"/>
           </a:xfrm>
         </p:spPr>
         <p:txBody>
@@ -1485,39 +1485,39 @@
           <a:lstStyle>
             <a:lvl1pPr marL="0" indent="0">
               <a:buNone/>
-              <a:defRPr sz="1134" b="1"/>
+              <a:defRPr sz="756" b="1"/>
             </a:lvl1pPr>
-            <a:lvl2pPr marL="215993" indent="0">
+            <a:lvl2pPr marL="144003" indent="0">
               <a:buNone/>
-              <a:defRPr sz="945" b="1"/>
+              <a:defRPr sz="630" b="1"/>
             </a:lvl2pPr>
-            <a:lvl3pPr marL="431986" indent="0">
+            <a:lvl3pPr marL="288005" indent="0">
               <a:buNone/>
-              <a:defRPr sz="851" b="1"/>
+              <a:defRPr sz="567" b="1"/>
             </a:lvl3pPr>
-            <a:lvl4pPr marL="647978" indent="0">
+            <a:lvl4pPr marL="432007" indent="0">
               <a:buNone/>
-              <a:defRPr sz="756" b="1"/>
+              <a:defRPr sz="504" b="1"/>
             </a:lvl4pPr>
-            <a:lvl5pPr marL="863971" indent="0">
+            <a:lvl5pPr marL="576009" indent="0">
               <a:buNone/>
-              <a:defRPr sz="756" b="1"/>
+              <a:defRPr sz="504" b="1"/>
             </a:lvl5pPr>
-            <a:lvl6pPr marL="1079963" indent="0">
+            <a:lvl6pPr marL="720011" indent="0">
               <a:buNone/>
-              <a:defRPr sz="756" b="1"/>
+              <a:defRPr sz="504" b="1"/>
             </a:lvl6pPr>
-            <a:lvl7pPr marL="1295957" indent="0">
+            <a:lvl7pPr marL="864015" indent="0">
               <a:buNone/>
-              <a:defRPr sz="756" b="1"/>
+              <a:defRPr sz="504" b="1"/>
             </a:lvl7pPr>
-            <a:lvl8pPr marL="1511949" indent="0">
+            <a:lvl8pPr marL="1008016" indent="0">
               <a:buNone/>
-              <a:defRPr sz="756" b="1"/>
+              <a:defRPr sz="504" b="1"/>
             </a:lvl8pPr>
-            <a:lvl9pPr marL="1727942" indent="0">
+            <a:lvl9pPr marL="1152019" indent="0">
               <a:buNone/>
-              <a:defRPr sz="756" b="1"/>
+              <a:defRPr sz="504" b="1"/>
             </a:lvl9pPr>
           </a:lstStyle>
           <a:p>
@@ -1541,39 +1541,39 @@
         </p:nvSpPr>
         <p:spPr>
           <a:xfrm>
-            <a:off x="215980" y="1027528"/>
-            <a:ext cx="1908568" cy="1866801"/>
+            <a:off x="143986" y="685187"/>
+            <a:ext cx="1272379" cy="1244839"/>
           </a:xfrm>
         </p:spPr>
         <p:txBody>
           <a:bodyPr/>
           <a:lstStyle>
             <a:lvl1pPr>
-              <a:defRPr sz="1134"/>
+              <a:defRPr sz="756"/>
             </a:lvl1pPr>
             <a:lvl2pPr>
-              <a:defRPr sz="945"/>
+              <a:defRPr sz="630"/>
             </a:lvl2pPr>
             <a:lvl3pPr>
-              <a:defRPr sz="851"/>
+              <a:defRPr sz="567"/>
             </a:lvl3pPr>
             <a:lvl4pPr>
-              <a:defRPr sz="756"/>
+              <a:defRPr sz="504"/>
             </a:lvl4pPr>
             <a:lvl5pPr>
-              <a:defRPr sz="756"/>
+              <a:defRPr sz="504"/>
             </a:lvl5pPr>
             <a:lvl6pPr>
-              <a:defRPr sz="756"/>
+              <a:defRPr sz="504"/>
             </a:lvl6pPr>
             <a:lvl7pPr>
-              <a:defRPr sz="756"/>
+              <a:defRPr sz="504"/>
             </a:lvl7pPr>
             <a:lvl8pPr>
-              <a:defRPr sz="756"/>
+              <a:defRPr sz="504"/>
             </a:lvl8pPr>
             <a:lvl9pPr>
-              <a:defRPr sz="756"/>
+              <a:defRPr sz="504"/>
             </a:lvl9pPr>
           </a:lstStyle>
           <a:p>
@@ -1626,8 +1626,8 @@
         </p:nvSpPr>
         <p:spPr>
           <a:xfrm>
-            <a:off x="2194291" y="725270"/>
-            <a:ext cx="1909318" cy="302258"/>
+            <a:off x="1462860" y="483632"/>
+            <a:ext cx="1272879" cy="201555"/>
           </a:xfrm>
         </p:spPr>
         <p:txBody>
@@ -1635,39 +1635,39 @@
           <a:lstStyle>
             <a:lvl1pPr marL="0" indent="0">
               <a:buNone/>
-              <a:defRPr sz="1134" b="1"/>
+              <a:defRPr sz="756" b="1"/>
             </a:lvl1pPr>
-            <a:lvl2pPr marL="215993" indent="0">
+            <a:lvl2pPr marL="144003" indent="0">
               <a:buNone/>
-              <a:defRPr sz="945" b="1"/>
+              <a:defRPr sz="630" b="1"/>
             </a:lvl2pPr>
-            <a:lvl3pPr marL="431986" indent="0">
+            <a:lvl3pPr marL="288005" indent="0">
               <a:buNone/>
-              <a:defRPr sz="851" b="1"/>
+              <a:defRPr sz="567" b="1"/>
             </a:lvl3pPr>
-            <a:lvl4pPr marL="647978" indent="0">
+            <a:lvl4pPr marL="432007" indent="0">
               <a:buNone/>
-              <a:defRPr sz="756" b="1"/>
+              <a:defRPr sz="504" b="1"/>
             </a:lvl4pPr>
-            <a:lvl5pPr marL="863971" indent="0">
+            <a:lvl5pPr marL="576009" indent="0">
               <a:buNone/>
-              <a:defRPr sz="756" b="1"/>
+              <a:defRPr sz="504" b="1"/>
             </a:lvl5pPr>
-            <a:lvl6pPr marL="1079963" indent="0">
+            <a:lvl6pPr marL="720011" indent="0">
               <a:buNone/>
-              <a:defRPr sz="756" b="1"/>
+              <a:defRPr sz="504" b="1"/>
             </a:lvl6pPr>
-            <a:lvl7pPr marL="1295957" indent="0">
+            <a:lvl7pPr marL="864015" indent="0">
               <a:buNone/>
-              <a:defRPr sz="756" b="1"/>
+              <a:defRPr sz="504" b="1"/>
             </a:lvl7pPr>
-            <a:lvl8pPr marL="1511949" indent="0">
+            <a:lvl8pPr marL="1008016" indent="0">
               <a:buNone/>
-              <a:defRPr sz="756" b="1"/>
+              <a:defRPr sz="504" b="1"/>
             </a:lvl8pPr>
-            <a:lvl9pPr marL="1727942" indent="0">
+            <a:lvl9pPr marL="1152019" indent="0">
               <a:buNone/>
-              <a:defRPr sz="756" b="1"/>
+              <a:defRPr sz="504" b="1"/>
             </a:lvl9pPr>
           </a:lstStyle>
           <a:p>
@@ -1691,39 +1691,39 @@
         </p:nvSpPr>
         <p:spPr>
           <a:xfrm>
-            <a:off x="2194291" y="1027528"/>
-            <a:ext cx="1909318" cy="1866801"/>
+            <a:off x="1462860" y="685187"/>
+            <a:ext cx="1272879" cy="1244839"/>
           </a:xfrm>
         </p:spPr>
         <p:txBody>
           <a:bodyPr/>
           <a:lstStyle>
             <a:lvl1pPr>
-              <a:defRPr sz="1134"/>
+              <a:defRPr sz="756"/>
             </a:lvl1pPr>
             <a:lvl2pPr>
-              <a:defRPr sz="945"/>
+              <a:defRPr sz="630"/>
             </a:lvl2pPr>
             <a:lvl3pPr>
-              <a:defRPr sz="851"/>
+              <a:defRPr sz="567"/>
             </a:lvl3pPr>
             <a:lvl4pPr>
-              <a:defRPr sz="756"/>
+              <a:defRPr sz="504"/>
             </a:lvl4pPr>
             <a:lvl5pPr>
-              <a:defRPr sz="756"/>
+              <a:defRPr sz="504"/>
             </a:lvl5pPr>
             <a:lvl6pPr>
-              <a:defRPr sz="756"/>
+              <a:defRPr sz="504"/>
             </a:lvl6pPr>
             <a:lvl7pPr>
-              <a:defRPr sz="756"/>
+              <a:defRPr sz="504"/>
             </a:lvl7pPr>
             <a:lvl8pPr>
-              <a:defRPr sz="756"/>
+              <a:defRPr sz="504"/>
             </a:lvl8pPr>
             <a:lvl9pPr>
-              <a:defRPr sz="756"/>
+              <a:defRPr sz="504"/>
             </a:lvl9pPr>
           </a:lstStyle>
           <a:p>
@@ -1781,7 +1781,7 @@
           <a:p>
             <a:fld id="{87CB0DDD-8CA0-4903-99FB-3FB32E8355B3}" type="datetimeFigureOut">
               <a:rPr lang="de-DE" smtClean="0"/>
-              <a:t>15.10.2018</a:t>
+              <a:t>17.10.2018</a:t>
             </a:fld>
             <a:endParaRPr lang="de-DE"/>
           </a:p>
@@ -1899,7 +1899,7 @@
           <a:p>
             <a:fld id="{87CB0DDD-8CA0-4903-99FB-3FB32E8355B3}" type="datetimeFigureOut">
               <a:rPr lang="de-DE" smtClean="0"/>
-              <a:t>15.10.2018</a:t>
+              <a:t>17.10.2018</a:t>
             </a:fld>
             <a:endParaRPr lang="de-DE"/>
           </a:p>
@@ -1994,7 +1994,7 @@
           <a:p>
             <a:fld id="{87CB0DDD-8CA0-4903-99FB-3FB32E8355B3}" type="datetimeFigureOut">
               <a:rPr lang="de-DE" smtClean="0"/>
-              <a:t>15.10.2018</a:t>
+              <a:t>17.10.2018</a:t>
             </a:fld>
             <a:endParaRPr lang="de-DE"/>
           </a:p>
@@ -2084,15 +2084,15 @@
         </p:nvSpPr>
         <p:spPr>
           <a:xfrm>
-            <a:off x="215980" y="129004"/>
-            <a:ext cx="1421114" cy="549015"/>
+            <a:off x="143987" y="86024"/>
+            <a:ext cx="947409" cy="366100"/>
           </a:xfrm>
         </p:spPr>
         <p:txBody>
           <a:bodyPr anchor="b"/>
           <a:lstStyle>
             <a:lvl1pPr algn="l">
-              <a:defRPr sz="945" b="1"/>
+              <a:defRPr sz="630" b="1"/>
             </a:lvl1pPr>
           </a:lstStyle>
           <a:p>
@@ -2116,39 +2116,39 @@
         </p:nvSpPr>
         <p:spPr>
           <a:xfrm>
-            <a:off x="1688839" y="129004"/>
-            <a:ext cx="2414770" cy="2765326"/>
+            <a:off x="1125893" y="86024"/>
+            <a:ext cx="1609846" cy="1844002"/>
           </a:xfrm>
         </p:spPr>
         <p:txBody>
           <a:bodyPr/>
           <a:lstStyle>
             <a:lvl1pPr>
-              <a:defRPr sz="1512"/>
+              <a:defRPr sz="1008"/>
             </a:lvl1pPr>
             <a:lvl2pPr>
-              <a:defRPr sz="1323"/>
+              <a:defRPr sz="882"/>
             </a:lvl2pPr>
             <a:lvl3pPr>
-              <a:defRPr sz="1134"/>
+              <a:defRPr sz="756"/>
             </a:lvl3pPr>
             <a:lvl4pPr>
-              <a:defRPr sz="945"/>
+              <a:defRPr sz="630"/>
             </a:lvl4pPr>
             <a:lvl5pPr>
-              <a:defRPr sz="945"/>
+              <a:defRPr sz="630"/>
             </a:lvl5pPr>
             <a:lvl6pPr>
-              <a:defRPr sz="945"/>
+              <a:defRPr sz="630"/>
             </a:lvl6pPr>
             <a:lvl7pPr>
-              <a:defRPr sz="945"/>
+              <a:defRPr sz="630"/>
             </a:lvl7pPr>
             <a:lvl8pPr>
-              <a:defRPr sz="945"/>
+              <a:defRPr sz="630"/>
             </a:lvl8pPr>
             <a:lvl9pPr>
-              <a:defRPr sz="945"/>
+              <a:defRPr sz="630"/>
             </a:lvl9pPr>
           </a:lstStyle>
           <a:p>
@@ -2201,8 +2201,8 @@
         </p:nvSpPr>
         <p:spPr>
           <a:xfrm>
-            <a:off x="215980" y="678019"/>
-            <a:ext cx="1421114" cy="2216310"/>
+            <a:off x="143987" y="452123"/>
+            <a:ext cx="947409" cy="1477902"/>
           </a:xfrm>
         </p:spPr>
         <p:txBody>
@@ -2210,39 +2210,39 @@
           <a:lstStyle>
             <a:lvl1pPr marL="0" indent="0">
               <a:buNone/>
-              <a:defRPr sz="662"/>
+              <a:defRPr sz="441"/>
             </a:lvl1pPr>
-            <a:lvl2pPr marL="215993" indent="0">
+            <a:lvl2pPr marL="144003" indent="0">
               <a:buNone/>
-              <a:defRPr sz="567"/>
+              <a:defRPr sz="378"/>
             </a:lvl2pPr>
-            <a:lvl3pPr marL="431986" indent="0">
+            <a:lvl3pPr marL="288005" indent="0">
               <a:buNone/>
-              <a:defRPr sz="472"/>
+              <a:defRPr sz="315"/>
             </a:lvl3pPr>
-            <a:lvl4pPr marL="647978" indent="0">
+            <a:lvl4pPr marL="432007" indent="0">
               <a:buNone/>
-              <a:defRPr sz="425"/>
+              <a:defRPr sz="283"/>
             </a:lvl4pPr>
-            <a:lvl5pPr marL="863971" indent="0">
+            <a:lvl5pPr marL="576009" indent="0">
               <a:buNone/>
-              <a:defRPr sz="425"/>
+              <a:defRPr sz="283"/>
             </a:lvl5pPr>
-            <a:lvl6pPr marL="1079963" indent="0">
+            <a:lvl6pPr marL="720011" indent="0">
               <a:buNone/>
-              <a:defRPr sz="425"/>
+              <a:defRPr sz="283"/>
             </a:lvl6pPr>
-            <a:lvl7pPr marL="1295957" indent="0">
+            <a:lvl7pPr marL="864015" indent="0">
               <a:buNone/>
-              <a:defRPr sz="425"/>
+              <a:defRPr sz="283"/>
             </a:lvl7pPr>
-            <a:lvl8pPr marL="1511949" indent="0">
+            <a:lvl8pPr marL="1008016" indent="0">
               <a:buNone/>
-              <a:defRPr sz="425"/>
+              <a:defRPr sz="283"/>
             </a:lvl8pPr>
-            <a:lvl9pPr marL="1727942" indent="0">
+            <a:lvl9pPr marL="1152019" indent="0">
               <a:buNone/>
-              <a:defRPr sz="425"/>
+              <a:defRPr sz="283"/>
             </a:lvl9pPr>
           </a:lstStyle>
           <a:p>
@@ -2271,7 +2271,7 @@
           <a:p>
             <a:fld id="{87CB0DDD-8CA0-4903-99FB-3FB32E8355B3}" type="datetimeFigureOut">
               <a:rPr lang="de-DE" smtClean="0"/>
-              <a:t>15.10.2018</a:t>
+              <a:t>17.10.2018</a:t>
             </a:fld>
             <a:endParaRPr lang="de-DE"/>
           </a:p>
@@ -2361,15 +2361,15 @@
         </p:nvSpPr>
         <p:spPr>
           <a:xfrm>
-            <a:off x="846670" y="2268062"/>
-            <a:ext cx="2591753" cy="267757"/>
+            <a:off x="564447" y="1512412"/>
+            <a:ext cx="1727835" cy="178548"/>
           </a:xfrm>
         </p:spPr>
         <p:txBody>
           <a:bodyPr anchor="b"/>
           <a:lstStyle>
             <a:lvl1pPr algn="l">
-              <a:defRPr sz="945" b="1"/>
+              <a:defRPr sz="630" b="1"/>
             </a:lvl1pPr>
           </a:lstStyle>
           <a:p>
@@ -2393,8 +2393,8 @@
         </p:nvSpPr>
         <p:spPr>
           <a:xfrm>
-            <a:off x="846670" y="289508"/>
-            <a:ext cx="2591753" cy="1944053"/>
+            <a:off x="564447" y="193053"/>
+            <a:ext cx="1727835" cy="1296353"/>
           </a:xfrm>
         </p:spPr>
         <p:txBody>
@@ -2402,39 +2402,39 @@
           <a:lstStyle>
             <a:lvl1pPr marL="0" indent="0">
               <a:buNone/>
-              <a:defRPr sz="1512"/>
+              <a:defRPr sz="1008"/>
             </a:lvl1pPr>
-            <a:lvl2pPr marL="215993" indent="0">
+            <a:lvl2pPr marL="144003" indent="0">
               <a:buNone/>
-              <a:defRPr sz="1323"/>
+              <a:defRPr sz="882"/>
             </a:lvl2pPr>
-            <a:lvl3pPr marL="431986" indent="0">
+            <a:lvl3pPr marL="288005" indent="0">
               <a:buNone/>
-              <a:defRPr sz="1134"/>
+              <a:defRPr sz="756"/>
             </a:lvl3pPr>
-            <a:lvl4pPr marL="647978" indent="0">
+            <a:lvl4pPr marL="432007" indent="0">
               <a:buNone/>
-              <a:defRPr sz="945"/>
+              <a:defRPr sz="630"/>
             </a:lvl4pPr>
-            <a:lvl5pPr marL="863971" indent="0">
+            <a:lvl5pPr marL="576009" indent="0">
               <a:buNone/>
-              <a:defRPr sz="945"/>
+              <a:defRPr sz="630"/>
             </a:lvl5pPr>
-            <a:lvl6pPr marL="1079963" indent="0">
+            <a:lvl6pPr marL="720011" indent="0">
               <a:buNone/>
-              <a:defRPr sz="945"/>
+              <a:defRPr sz="630"/>
             </a:lvl6pPr>
-            <a:lvl7pPr marL="1295957" indent="0">
+            <a:lvl7pPr marL="864015" indent="0">
               <a:buNone/>
-              <a:defRPr sz="945"/>
+              <a:defRPr sz="630"/>
             </a:lvl7pPr>
-            <a:lvl8pPr marL="1511949" indent="0">
+            <a:lvl8pPr marL="1008016" indent="0">
               <a:buNone/>
-              <a:defRPr sz="945"/>
+              <a:defRPr sz="630"/>
             </a:lvl8pPr>
-            <a:lvl9pPr marL="1727942" indent="0">
+            <a:lvl9pPr marL="1152019" indent="0">
               <a:buNone/>
-              <a:defRPr sz="945"/>
+              <a:defRPr sz="630"/>
             </a:lvl9pPr>
           </a:lstStyle>
           <a:p>
@@ -2454,8 +2454,8 @@
         </p:nvSpPr>
         <p:spPr>
           <a:xfrm>
-            <a:off x="846670" y="2535820"/>
-            <a:ext cx="2591753" cy="380260"/>
+            <a:off x="564447" y="1690961"/>
+            <a:ext cx="1727835" cy="253569"/>
           </a:xfrm>
         </p:spPr>
         <p:txBody>
@@ -2463,39 +2463,39 @@
           <a:lstStyle>
             <a:lvl1pPr marL="0" indent="0">
               <a:buNone/>
-              <a:defRPr sz="662"/>
+              <a:defRPr sz="441"/>
             </a:lvl1pPr>
-            <a:lvl2pPr marL="215993" indent="0">
+            <a:lvl2pPr marL="144003" indent="0">
               <a:buNone/>
-              <a:defRPr sz="567"/>
+              <a:defRPr sz="378"/>
             </a:lvl2pPr>
-            <a:lvl3pPr marL="431986" indent="0">
+            <a:lvl3pPr marL="288005" indent="0">
               <a:buNone/>
-              <a:defRPr sz="472"/>
+              <a:defRPr sz="315"/>
             </a:lvl3pPr>
-            <a:lvl4pPr marL="647978" indent="0">
+            <a:lvl4pPr marL="432007" indent="0">
               <a:buNone/>
-              <a:defRPr sz="425"/>
+              <a:defRPr sz="283"/>
             </a:lvl4pPr>
-            <a:lvl5pPr marL="863971" indent="0">
+            <a:lvl5pPr marL="576009" indent="0">
               <a:buNone/>
-              <a:defRPr sz="425"/>
+              <a:defRPr sz="283"/>
             </a:lvl5pPr>
-            <a:lvl6pPr marL="1079963" indent="0">
+            <a:lvl6pPr marL="720011" indent="0">
               <a:buNone/>
-              <a:defRPr sz="425"/>
+              <a:defRPr sz="283"/>
             </a:lvl6pPr>
-            <a:lvl7pPr marL="1295957" indent="0">
+            <a:lvl7pPr marL="864015" indent="0">
               <a:buNone/>
-              <a:defRPr sz="425"/>
+              <a:defRPr sz="283"/>
             </a:lvl7pPr>
-            <a:lvl8pPr marL="1511949" indent="0">
+            <a:lvl8pPr marL="1008016" indent="0">
               <a:buNone/>
-              <a:defRPr sz="425"/>
+              <a:defRPr sz="283"/>
             </a:lvl8pPr>
-            <a:lvl9pPr marL="1727942" indent="0">
+            <a:lvl9pPr marL="1152019" indent="0">
               <a:buNone/>
-              <a:defRPr sz="425"/>
+              <a:defRPr sz="283"/>
             </a:lvl9pPr>
           </a:lstStyle>
           <a:p>
@@ -2524,7 +2524,7 @@
           <a:p>
             <a:fld id="{87CB0DDD-8CA0-4903-99FB-3FB32E8355B3}" type="datetimeFigureOut">
               <a:rPr lang="de-DE" smtClean="0"/>
-              <a:t>15.10.2018</a:t>
+              <a:t>17.10.2018</a:t>
             </a:fld>
             <a:endParaRPr lang="de-DE"/>
           </a:p>
@@ -2619,8 +2619,8 @@
         </p:nvSpPr>
         <p:spPr>
           <a:xfrm>
-            <a:off x="215980" y="129754"/>
-            <a:ext cx="3887629" cy="540014"/>
+            <a:off x="143987" y="86524"/>
+            <a:ext cx="2591752" cy="360098"/>
           </a:xfrm>
           <a:prstGeom prst="rect">
             <a:avLst/>
@@ -2652,8 +2652,8 @@
         </p:nvSpPr>
         <p:spPr>
           <a:xfrm>
-            <a:off x="215980" y="756021"/>
-            <a:ext cx="3887629" cy="2138308"/>
+            <a:off x="143987" y="504138"/>
+            <a:ext cx="2591752" cy="1425888"/>
           </a:xfrm>
           <a:prstGeom prst="rect">
             <a:avLst/>
@@ -2714,8 +2714,8 @@
         </p:nvSpPr>
         <p:spPr>
           <a:xfrm>
-            <a:off x="215979" y="3003081"/>
-            <a:ext cx="1007904" cy="172505"/>
+            <a:off x="143986" y="2002545"/>
+            <a:ext cx="671936" cy="115032"/>
           </a:xfrm>
           <a:prstGeom prst="rect">
             <a:avLst/>
@@ -2725,7 +2725,7 @@
           <a:bodyPr vert="horz" lIns="91440" tIns="45720" rIns="91440" bIns="45720" rtlCol="0" anchor="ctr"/>
           <a:lstStyle>
             <a:lvl1pPr algn="l">
-              <a:defRPr sz="567">
+              <a:defRPr sz="378">
                 <a:solidFill>
                   <a:schemeClr val="tx1">
                     <a:tint val="75000"/>
@@ -2737,7 +2737,7 @@
           <a:p>
             <a:fld id="{87CB0DDD-8CA0-4903-99FB-3FB32E8355B3}" type="datetimeFigureOut">
               <a:rPr lang="de-DE" smtClean="0"/>
-              <a:t>15.10.2018</a:t>
+              <a:t>17.10.2018</a:t>
             </a:fld>
             <a:endParaRPr lang="de-DE"/>
           </a:p>
@@ -2755,8 +2755,8 @@
         </p:nvSpPr>
         <p:spPr>
           <a:xfrm>
-            <a:off x="1475859" y="3003081"/>
-            <a:ext cx="1367870" cy="172505"/>
+            <a:off x="983906" y="2002545"/>
+            <a:ext cx="911913" cy="115032"/>
           </a:xfrm>
           <a:prstGeom prst="rect">
             <a:avLst/>
@@ -2766,7 +2766,7 @@
           <a:bodyPr vert="horz" lIns="91440" tIns="45720" rIns="91440" bIns="45720" rtlCol="0" anchor="ctr"/>
           <a:lstStyle>
             <a:lvl1pPr algn="ctr">
-              <a:defRPr sz="567">
+              <a:defRPr sz="378">
                 <a:solidFill>
                   <a:schemeClr val="tx1">
                     <a:tint val="75000"/>
@@ -2792,8 +2792,8 @@
         </p:nvSpPr>
         <p:spPr>
           <a:xfrm>
-            <a:off x="3095705" y="3003081"/>
-            <a:ext cx="1007904" cy="172505"/>
+            <a:off x="2063803" y="2002545"/>
+            <a:ext cx="671936" cy="115032"/>
           </a:xfrm>
           <a:prstGeom prst="rect">
             <a:avLst/>
@@ -2803,7 +2803,7 @@
           <a:bodyPr vert="horz" lIns="91440" tIns="45720" rIns="91440" bIns="45720" rtlCol="0" anchor="ctr"/>
           <a:lstStyle>
             <a:lvl1pPr algn="r">
-              <a:defRPr sz="567">
+              <a:defRPr sz="378">
                 <a:solidFill>
                   <a:schemeClr val="tx1">
                     <a:tint val="75000"/>
@@ -2844,12 +2844,12 @@
   </p:sldLayoutIdLst>
   <p:txStyles>
     <p:titleStyle>
-      <a:lvl1pPr algn="ctr" defTabSz="431986" rtl="0" eaLnBrk="1" latinLnBrk="0" hangingPunct="1">
+      <a:lvl1pPr algn="ctr" defTabSz="288005" rtl="0" eaLnBrk="1" latinLnBrk="0" hangingPunct="1">
         <a:spcBef>
           <a:spcPct val="0"/>
         </a:spcBef>
         <a:buNone/>
-        <a:defRPr sz="2079" kern="1200">
+        <a:defRPr sz="1386" kern="1200">
           <a:solidFill>
             <a:schemeClr val="tx1"/>
           </a:solidFill>
@@ -2860,13 +2860,13 @@
       </a:lvl1pPr>
     </p:titleStyle>
     <p:bodyStyle>
-      <a:lvl1pPr marL="161995" indent="-161995" algn="l" defTabSz="431986" rtl="0" eaLnBrk="1" latinLnBrk="0" hangingPunct="1">
+      <a:lvl1pPr marL="108002" indent="-108002" algn="l" defTabSz="288005" rtl="0" eaLnBrk="1" latinLnBrk="0" hangingPunct="1">
         <a:spcBef>
           <a:spcPct val="20000"/>
         </a:spcBef>
         <a:buFont typeface="Arial" panose="020B0604020202020204" pitchFamily="34" charset="0"/>
         <a:buChar char="•"/>
-        <a:defRPr sz="1512" kern="1200">
+        <a:defRPr sz="1008" kern="1200">
           <a:solidFill>
             <a:schemeClr val="tx1"/>
           </a:solidFill>
@@ -2875,13 +2875,13 @@
           <a:cs typeface="+mn-cs"/>
         </a:defRPr>
       </a:lvl1pPr>
-      <a:lvl2pPr marL="350988" indent="-134996" algn="l" defTabSz="431986" rtl="0" eaLnBrk="1" latinLnBrk="0" hangingPunct="1">
+      <a:lvl2pPr marL="234004" indent="-90002" algn="l" defTabSz="288005" rtl="0" eaLnBrk="1" latinLnBrk="0" hangingPunct="1">
         <a:spcBef>
           <a:spcPct val="20000"/>
         </a:spcBef>
         <a:buFont typeface="Arial" panose="020B0604020202020204" pitchFamily="34" charset="0"/>
         <a:buChar char="–"/>
-        <a:defRPr sz="1323" kern="1200">
+        <a:defRPr sz="882" kern="1200">
           <a:solidFill>
             <a:schemeClr val="tx1"/>
           </a:solidFill>
@@ -2890,13 +2890,13 @@
           <a:cs typeface="+mn-cs"/>
         </a:defRPr>
       </a:lvl2pPr>
-      <a:lvl3pPr marL="539982" indent="-107996" algn="l" defTabSz="431986" rtl="0" eaLnBrk="1" latinLnBrk="0" hangingPunct="1">
+      <a:lvl3pPr marL="360006" indent="-72001" algn="l" defTabSz="288005" rtl="0" eaLnBrk="1" latinLnBrk="0" hangingPunct="1">
         <a:spcBef>
           <a:spcPct val="20000"/>
         </a:spcBef>
         <a:buFont typeface="Arial" panose="020B0604020202020204" pitchFamily="34" charset="0"/>
         <a:buChar char="•"/>
-        <a:defRPr sz="1134" kern="1200">
+        <a:defRPr sz="756" kern="1200">
           <a:solidFill>
             <a:schemeClr val="tx1"/>
           </a:solidFill>
@@ -2905,13 +2905,13 @@
           <a:cs typeface="+mn-cs"/>
         </a:defRPr>
       </a:lvl3pPr>
-      <a:lvl4pPr marL="755975" indent="-107996" algn="l" defTabSz="431986" rtl="0" eaLnBrk="1" latinLnBrk="0" hangingPunct="1">
+      <a:lvl4pPr marL="504009" indent="-72001" algn="l" defTabSz="288005" rtl="0" eaLnBrk="1" latinLnBrk="0" hangingPunct="1">
         <a:spcBef>
           <a:spcPct val="20000"/>
         </a:spcBef>
         <a:buFont typeface="Arial" panose="020B0604020202020204" pitchFamily="34" charset="0"/>
         <a:buChar char="–"/>
-        <a:defRPr sz="945" kern="1200">
+        <a:defRPr sz="630" kern="1200">
           <a:solidFill>
             <a:schemeClr val="tx1"/>
           </a:solidFill>
@@ -2920,13 +2920,13 @@
           <a:cs typeface="+mn-cs"/>
         </a:defRPr>
       </a:lvl4pPr>
-      <a:lvl5pPr marL="971967" indent="-107996" algn="l" defTabSz="431986" rtl="0" eaLnBrk="1" latinLnBrk="0" hangingPunct="1">
+      <a:lvl5pPr marL="648010" indent="-72001" algn="l" defTabSz="288005" rtl="0" eaLnBrk="1" latinLnBrk="0" hangingPunct="1">
         <a:spcBef>
           <a:spcPct val="20000"/>
         </a:spcBef>
         <a:buFont typeface="Arial" panose="020B0604020202020204" pitchFamily="34" charset="0"/>
         <a:buChar char="»"/>
-        <a:defRPr sz="945" kern="1200">
+        <a:defRPr sz="630" kern="1200">
           <a:solidFill>
             <a:schemeClr val="tx1"/>
           </a:solidFill>
@@ -2935,13 +2935,13 @@
           <a:cs typeface="+mn-cs"/>
         </a:defRPr>
       </a:lvl5pPr>
-      <a:lvl6pPr marL="1187960" indent="-107996" algn="l" defTabSz="431986" rtl="0" eaLnBrk="1" latinLnBrk="0" hangingPunct="1">
+      <a:lvl6pPr marL="792013" indent="-72001" algn="l" defTabSz="288005" rtl="0" eaLnBrk="1" latinLnBrk="0" hangingPunct="1">
         <a:spcBef>
           <a:spcPct val="20000"/>
         </a:spcBef>
         <a:buFont typeface="Arial" panose="020B0604020202020204" pitchFamily="34" charset="0"/>
         <a:buChar char="•"/>
-        <a:defRPr sz="945" kern="1200">
+        <a:defRPr sz="630" kern="1200">
           <a:solidFill>
             <a:schemeClr val="tx1"/>
           </a:solidFill>
@@ -2950,13 +2950,13 @@
           <a:cs typeface="+mn-cs"/>
         </a:defRPr>
       </a:lvl6pPr>
-      <a:lvl7pPr marL="1403953" indent="-107996" algn="l" defTabSz="431986" rtl="0" eaLnBrk="1" latinLnBrk="0" hangingPunct="1">
+      <a:lvl7pPr marL="936015" indent="-72001" algn="l" defTabSz="288005" rtl="0" eaLnBrk="1" latinLnBrk="0" hangingPunct="1">
         <a:spcBef>
           <a:spcPct val="20000"/>
         </a:spcBef>
         <a:buFont typeface="Arial" panose="020B0604020202020204" pitchFamily="34" charset="0"/>
         <a:buChar char="•"/>
-        <a:defRPr sz="945" kern="1200">
+        <a:defRPr sz="630" kern="1200">
           <a:solidFill>
             <a:schemeClr val="tx1"/>
           </a:solidFill>
@@ -2965,13 +2965,13 @@
           <a:cs typeface="+mn-cs"/>
         </a:defRPr>
       </a:lvl7pPr>
-      <a:lvl8pPr marL="1619945" indent="-107996" algn="l" defTabSz="431986" rtl="0" eaLnBrk="1" latinLnBrk="0" hangingPunct="1">
+      <a:lvl8pPr marL="1080017" indent="-72001" algn="l" defTabSz="288005" rtl="0" eaLnBrk="1" latinLnBrk="0" hangingPunct="1">
         <a:spcBef>
           <a:spcPct val="20000"/>
         </a:spcBef>
         <a:buFont typeface="Arial" panose="020B0604020202020204" pitchFamily="34" charset="0"/>
         <a:buChar char="•"/>
-        <a:defRPr sz="945" kern="1200">
+        <a:defRPr sz="630" kern="1200">
           <a:solidFill>
             <a:schemeClr val="tx1"/>
           </a:solidFill>
@@ -2980,13 +2980,13 @@
           <a:cs typeface="+mn-cs"/>
         </a:defRPr>
       </a:lvl8pPr>
-      <a:lvl9pPr marL="1835938" indent="-107996" algn="l" defTabSz="431986" rtl="0" eaLnBrk="1" latinLnBrk="0" hangingPunct="1">
+      <a:lvl9pPr marL="1224020" indent="-72001" algn="l" defTabSz="288005" rtl="0" eaLnBrk="1" latinLnBrk="0" hangingPunct="1">
         <a:spcBef>
           <a:spcPct val="20000"/>
         </a:spcBef>
         <a:buFont typeface="Arial" panose="020B0604020202020204" pitchFamily="34" charset="0"/>
         <a:buChar char="•"/>
-        <a:defRPr sz="945" kern="1200">
+        <a:defRPr sz="630" kern="1200">
           <a:solidFill>
             <a:schemeClr val="tx1"/>
           </a:solidFill>
@@ -3000,8 +3000,8 @@
       <a:defPPr>
         <a:defRPr lang="de-DE"/>
       </a:defPPr>
-      <a:lvl1pPr marL="0" algn="l" defTabSz="431986" rtl="0" eaLnBrk="1" latinLnBrk="0" hangingPunct="1">
-        <a:defRPr sz="851" kern="1200">
+      <a:lvl1pPr marL="0" algn="l" defTabSz="288005" rtl="0" eaLnBrk="1" latinLnBrk="0" hangingPunct="1">
+        <a:defRPr sz="567" kern="1200">
           <a:solidFill>
             <a:schemeClr val="tx1"/>
           </a:solidFill>
@@ -3010,8 +3010,8 @@
           <a:cs typeface="+mn-cs"/>
         </a:defRPr>
       </a:lvl1pPr>
-      <a:lvl2pPr marL="215993" algn="l" defTabSz="431986" rtl="0" eaLnBrk="1" latinLnBrk="0" hangingPunct="1">
-        <a:defRPr sz="851" kern="1200">
+      <a:lvl2pPr marL="144003" algn="l" defTabSz="288005" rtl="0" eaLnBrk="1" latinLnBrk="0" hangingPunct="1">
+        <a:defRPr sz="567" kern="1200">
           <a:solidFill>
             <a:schemeClr val="tx1"/>
           </a:solidFill>
@@ -3020,8 +3020,8 @@
           <a:cs typeface="+mn-cs"/>
         </a:defRPr>
       </a:lvl2pPr>
-      <a:lvl3pPr marL="431986" algn="l" defTabSz="431986" rtl="0" eaLnBrk="1" latinLnBrk="0" hangingPunct="1">
-        <a:defRPr sz="851" kern="1200">
+      <a:lvl3pPr marL="288005" algn="l" defTabSz="288005" rtl="0" eaLnBrk="1" latinLnBrk="0" hangingPunct="1">
+        <a:defRPr sz="567" kern="1200">
           <a:solidFill>
             <a:schemeClr val="tx1"/>
           </a:solidFill>
@@ -3030,8 +3030,8 @@
           <a:cs typeface="+mn-cs"/>
         </a:defRPr>
       </a:lvl3pPr>
-      <a:lvl4pPr marL="647978" algn="l" defTabSz="431986" rtl="0" eaLnBrk="1" latinLnBrk="0" hangingPunct="1">
-        <a:defRPr sz="851" kern="1200">
+      <a:lvl4pPr marL="432007" algn="l" defTabSz="288005" rtl="0" eaLnBrk="1" latinLnBrk="0" hangingPunct="1">
+        <a:defRPr sz="567" kern="1200">
           <a:solidFill>
             <a:schemeClr val="tx1"/>
           </a:solidFill>
@@ -3040,8 +3040,8 @@
           <a:cs typeface="+mn-cs"/>
         </a:defRPr>
       </a:lvl4pPr>
-      <a:lvl5pPr marL="863971" algn="l" defTabSz="431986" rtl="0" eaLnBrk="1" latinLnBrk="0" hangingPunct="1">
-        <a:defRPr sz="851" kern="1200">
+      <a:lvl5pPr marL="576009" algn="l" defTabSz="288005" rtl="0" eaLnBrk="1" latinLnBrk="0" hangingPunct="1">
+        <a:defRPr sz="567" kern="1200">
           <a:solidFill>
             <a:schemeClr val="tx1"/>
           </a:solidFill>
@@ -3050,8 +3050,8 @@
           <a:cs typeface="+mn-cs"/>
         </a:defRPr>
       </a:lvl5pPr>
-      <a:lvl6pPr marL="1079963" algn="l" defTabSz="431986" rtl="0" eaLnBrk="1" latinLnBrk="0" hangingPunct="1">
-        <a:defRPr sz="851" kern="1200">
+      <a:lvl6pPr marL="720011" algn="l" defTabSz="288005" rtl="0" eaLnBrk="1" latinLnBrk="0" hangingPunct="1">
+        <a:defRPr sz="567" kern="1200">
           <a:solidFill>
             <a:schemeClr val="tx1"/>
           </a:solidFill>
@@ -3060,8 +3060,8 @@
           <a:cs typeface="+mn-cs"/>
         </a:defRPr>
       </a:lvl6pPr>
-      <a:lvl7pPr marL="1295957" algn="l" defTabSz="431986" rtl="0" eaLnBrk="1" latinLnBrk="0" hangingPunct="1">
-        <a:defRPr sz="851" kern="1200">
+      <a:lvl7pPr marL="864015" algn="l" defTabSz="288005" rtl="0" eaLnBrk="1" latinLnBrk="0" hangingPunct="1">
+        <a:defRPr sz="567" kern="1200">
           <a:solidFill>
             <a:schemeClr val="tx1"/>
           </a:solidFill>
@@ -3070,8 +3070,8 @@
           <a:cs typeface="+mn-cs"/>
         </a:defRPr>
       </a:lvl7pPr>
-      <a:lvl8pPr marL="1511949" algn="l" defTabSz="431986" rtl="0" eaLnBrk="1" latinLnBrk="0" hangingPunct="1">
-        <a:defRPr sz="851" kern="1200">
+      <a:lvl8pPr marL="1008016" algn="l" defTabSz="288005" rtl="0" eaLnBrk="1" latinLnBrk="0" hangingPunct="1">
+        <a:defRPr sz="567" kern="1200">
           <a:solidFill>
             <a:schemeClr val="tx1"/>
           </a:solidFill>
@@ -3080,8 +3080,8 @@
           <a:cs typeface="+mn-cs"/>
         </a:defRPr>
       </a:lvl8pPr>
-      <a:lvl9pPr marL="1727942" algn="l" defTabSz="431986" rtl="0" eaLnBrk="1" latinLnBrk="0" hangingPunct="1">
-        <a:defRPr sz="851" kern="1200">
+      <a:lvl9pPr marL="1152019" algn="l" defTabSz="288005" rtl="0" eaLnBrk="1" latinLnBrk="0" hangingPunct="1">
+        <a:defRPr sz="567" kern="1200">
           <a:solidFill>
             <a:schemeClr val="tx1"/>
           </a:solidFill>
@@ -3140,8 +3140,8 @@
         </p:blipFill>
         <p:spPr>
           <a:xfrm>
-            <a:off x="427119" y="463168"/>
-            <a:ext cx="2037615" cy="2041300"/>
+            <a:off x="284746" y="309043"/>
+            <a:ext cx="1358410" cy="1360867"/>
           </a:xfrm>
           <a:prstGeom prst="rect">
             <a:avLst/>
@@ -3162,14 +3162,14 @@
         </p:nvSpPr>
         <p:spPr>
           <a:xfrm>
-            <a:off x="424964" y="463491"/>
-            <a:ext cx="204098" cy="204098"/>
+            <a:off x="281873" y="309259"/>
+            <a:ext cx="137502" cy="136065"/>
           </a:xfrm>
           <a:prstGeom prst="rect">
             <a:avLst/>
           </a:prstGeom>
           <a:noFill/>
-          <a:ln w="15875">
+          <a:ln w="9525">
             <a:solidFill>
               <a:schemeClr val="tx1"/>
             </a:solidFill>
@@ -3192,11 +3192,11 @@
           </a:fontRef>
         </p:style>
         <p:txBody>
-          <a:bodyPr rtlCol="0" anchor="ctr"/>
+          <a:bodyPr lIns="0" tIns="0" rIns="0" bIns="0" rtlCol="0" anchor="ctr"/>
           <a:lstStyle/>
           <a:p>
             <a:pPr algn="ctr"/>
-            <a:endParaRPr lang="de-DE" sz="750"/>
+            <a:endParaRPr lang="de-DE" sz="600"/>
           </a:p>
         </p:txBody>
       </p:sp>
@@ -3208,14 +3208,14 @@
         </p:nvSpPr>
         <p:spPr>
           <a:xfrm>
-            <a:off x="629061" y="463491"/>
-            <a:ext cx="204098" cy="204098"/>
+            <a:off x="419374" y="309259"/>
+            <a:ext cx="136065" cy="136065"/>
           </a:xfrm>
           <a:prstGeom prst="rect">
             <a:avLst/>
           </a:prstGeom>
           <a:noFill/>
-          <a:ln w="15875">
+          <a:ln w="9525">
             <a:solidFill>
               <a:schemeClr val="tx1"/>
             </a:solidFill>
@@ -3238,11 +3238,11 @@
           </a:fontRef>
         </p:style>
         <p:txBody>
-          <a:bodyPr rtlCol="0" anchor="ctr"/>
+          <a:bodyPr lIns="0" tIns="0" rIns="0" bIns="0" rtlCol="0" anchor="ctr"/>
           <a:lstStyle/>
           <a:p>
             <a:pPr algn="ctr"/>
-            <a:endParaRPr lang="de-DE" sz="750"/>
+            <a:endParaRPr lang="de-DE" sz="600"/>
           </a:p>
         </p:txBody>
       </p:sp>
@@ -3254,14 +3254,14 @@
         </p:nvSpPr>
         <p:spPr>
           <a:xfrm>
-            <a:off x="831005" y="463491"/>
-            <a:ext cx="204098" cy="204098"/>
+            <a:off x="554003" y="309259"/>
+            <a:ext cx="136065" cy="136065"/>
           </a:xfrm>
           <a:prstGeom prst="rect">
             <a:avLst/>
           </a:prstGeom>
           <a:noFill/>
-          <a:ln w="15875">
+          <a:ln w="9525">
             <a:solidFill>
               <a:schemeClr val="tx1"/>
             </a:solidFill>
@@ -3284,11 +3284,11 @@
           </a:fontRef>
         </p:style>
         <p:txBody>
-          <a:bodyPr rtlCol="0" anchor="ctr"/>
+          <a:bodyPr lIns="0" tIns="0" rIns="0" bIns="0" rtlCol="0" anchor="ctr"/>
           <a:lstStyle/>
           <a:p>
             <a:pPr algn="ctr"/>
-            <a:endParaRPr lang="de-DE" sz="750"/>
+            <a:endParaRPr lang="de-DE" sz="600"/>
           </a:p>
         </p:txBody>
       </p:sp>
@@ -3300,14 +3300,14 @@
         </p:nvSpPr>
         <p:spPr>
           <a:xfrm>
-            <a:off x="1035102" y="463491"/>
-            <a:ext cx="204098" cy="204098"/>
+            <a:off x="690068" y="309259"/>
+            <a:ext cx="136065" cy="136065"/>
           </a:xfrm>
           <a:prstGeom prst="rect">
             <a:avLst/>
           </a:prstGeom>
           <a:noFill/>
-          <a:ln w="15875">
+          <a:ln w="9525">
             <a:solidFill>
               <a:schemeClr val="tx1"/>
             </a:solidFill>
@@ -3330,11 +3330,11 @@
           </a:fontRef>
         </p:style>
         <p:txBody>
-          <a:bodyPr rtlCol="0" anchor="ctr"/>
+          <a:bodyPr lIns="0" tIns="0" rIns="0" bIns="0" rtlCol="0" anchor="ctr"/>
           <a:lstStyle/>
           <a:p>
             <a:pPr algn="ctr"/>
-            <a:endParaRPr lang="de-DE" sz="750"/>
+            <a:endParaRPr lang="de-DE" sz="600"/>
           </a:p>
         </p:txBody>
       </p:sp>
@@ -3346,14 +3346,14 @@
         </p:nvSpPr>
         <p:spPr>
           <a:xfrm>
-            <a:off x="1239683" y="463491"/>
-            <a:ext cx="204098" cy="204098"/>
+            <a:off x="826455" y="309259"/>
+            <a:ext cx="136065" cy="136065"/>
           </a:xfrm>
           <a:prstGeom prst="rect">
             <a:avLst/>
           </a:prstGeom>
           <a:noFill/>
-          <a:ln w="15875">
+          <a:ln w="9525">
             <a:solidFill>
               <a:schemeClr val="tx1"/>
             </a:solidFill>
@@ -3376,11 +3376,11 @@
           </a:fontRef>
         </p:style>
         <p:txBody>
-          <a:bodyPr rtlCol="0" anchor="ctr"/>
+          <a:bodyPr lIns="0" tIns="0" rIns="0" bIns="0" rtlCol="0" anchor="ctr"/>
           <a:lstStyle/>
           <a:p>
             <a:pPr algn="ctr"/>
-            <a:endParaRPr lang="de-DE" sz="750"/>
+            <a:endParaRPr lang="de-DE" sz="600"/>
           </a:p>
         </p:txBody>
       </p:sp>
@@ -3392,14 +3392,14 @@
         </p:nvSpPr>
         <p:spPr>
           <a:xfrm>
-            <a:off x="1444244" y="463491"/>
-            <a:ext cx="204098" cy="204098"/>
+            <a:off x="962829" y="309259"/>
+            <a:ext cx="136065" cy="136065"/>
           </a:xfrm>
           <a:prstGeom prst="rect">
             <a:avLst/>
           </a:prstGeom>
           <a:noFill/>
-          <a:ln w="15875">
+          <a:ln w="9525">
             <a:solidFill>
               <a:schemeClr val="tx1"/>
             </a:solidFill>
@@ -3422,11 +3422,11 @@
           </a:fontRef>
         </p:style>
         <p:txBody>
-          <a:bodyPr rtlCol="0" anchor="ctr"/>
+          <a:bodyPr lIns="0" tIns="0" rIns="0" bIns="0" rtlCol="0" anchor="ctr"/>
           <a:lstStyle/>
           <a:p>
             <a:pPr algn="ctr"/>
-            <a:endParaRPr lang="de-DE" sz="750"/>
+            <a:endParaRPr lang="de-DE" sz="600"/>
           </a:p>
         </p:txBody>
       </p:sp>
@@ -3438,14 +3438,14 @@
         </p:nvSpPr>
         <p:spPr>
           <a:xfrm>
-            <a:off x="1648343" y="463491"/>
-            <a:ext cx="204098" cy="204098"/>
+            <a:off x="1098895" y="309259"/>
+            <a:ext cx="136065" cy="136065"/>
           </a:xfrm>
           <a:prstGeom prst="rect">
             <a:avLst/>
           </a:prstGeom>
           <a:noFill/>
-          <a:ln w="15875">
+          <a:ln w="9525">
             <a:solidFill>
               <a:schemeClr val="tx1"/>
             </a:solidFill>
@@ -3468,11 +3468,11 @@
           </a:fontRef>
         </p:style>
         <p:txBody>
-          <a:bodyPr rtlCol="0" anchor="ctr"/>
+          <a:bodyPr lIns="0" tIns="0" rIns="0" bIns="0" rtlCol="0" anchor="ctr"/>
           <a:lstStyle/>
           <a:p>
             <a:pPr algn="ctr"/>
-            <a:endParaRPr lang="de-DE" sz="750"/>
+            <a:endParaRPr lang="de-DE" sz="600"/>
           </a:p>
         </p:txBody>
       </p:sp>
@@ -3484,14 +3484,14 @@
         </p:nvSpPr>
         <p:spPr>
           <a:xfrm>
-            <a:off x="1852440" y="463491"/>
-            <a:ext cx="204098" cy="204098"/>
+            <a:off x="1234960" y="309259"/>
+            <a:ext cx="136065" cy="136065"/>
           </a:xfrm>
           <a:prstGeom prst="rect">
             <a:avLst/>
           </a:prstGeom>
           <a:noFill/>
-          <a:ln w="15875">
+          <a:ln w="9525">
             <a:solidFill>
               <a:schemeClr val="tx1"/>
             </a:solidFill>
@@ -3514,11 +3514,11 @@
           </a:fontRef>
         </p:style>
         <p:txBody>
-          <a:bodyPr rtlCol="0" anchor="ctr"/>
+          <a:bodyPr lIns="0" tIns="0" rIns="0" bIns="0" rtlCol="0" anchor="ctr"/>
           <a:lstStyle/>
           <a:p>
             <a:pPr algn="ctr"/>
-            <a:endParaRPr lang="de-DE" sz="750"/>
+            <a:endParaRPr lang="de-DE" sz="600"/>
           </a:p>
         </p:txBody>
       </p:sp>
@@ -3530,14 +3530,14 @@
         </p:nvSpPr>
         <p:spPr>
           <a:xfrm>
-            <a:off x="2056538" y="463491"/>
-            <a:ext cx="204098" cy="204098"/>
+            <a:off x="1371025" y="309259"/>
+            <a:ext cx="136065" cy="136065"/>
           </a:xfrm>
           <a:prstGeom prst="rect">
             <a:avLst/>
           </a:prstGeom>
           <a:noFill/>
-          <a:ln w="15875">
+          <a:ln w="9525">
             <a:solidFill>
               <a:schemeClr val="tx1"/>
             </a:solidFill>
@@ -3560,11 +3560,11 @@
           </a:fontRef>
         </p:style>
         <p:txBody>
-          <a:bodyPr rtlCol="0" anchor="ctr"/>
+          <a:bodyPr lIns="0" tIns="0" rIns="0" bIns="0" rtlCol="0" anchor="ctr"/>
           <a:lstStyle/>
           <a:p>
             <a:pPr algn="ctr"/>
-            <a:endParaRPr lang="de-DE" sz="750"/>
+            <a:endParaRPr lang="de-DE" sz="600"/>
           </a:p>
         </p:txBody>
       </p:sp>
@@ -3576,14 +3576,14 @@
         </p:nvSpPr>
         <p:spPr>
           <a:xfrm>
-            <a:off x="2260635" y="463491"/>
-            <a:ext cx="204098" cy="204098"/>
+            <a:off x="1507090" y="309259"/>
+            <a:ext cx="136065" cy="136065"/>
           </a:xfrm>
           <a:prstGeom prst="rect">
             <a:avLst/>
           </a:prstGeom>
           <a:noFill/>
-          <a:ln w="15875">
+          <a:ln w="9525">
             <a:solidFill>
               <a:schemeClr val="tx1"/>
             </a:solidFill>
@@ -3606,11 +3606,11 @@
           </a:fontRef>
         </p:style>
         <p:txBody>
-          <a:bodyPr rtlCol="0" anchor="ctr"/>
+          <a:bodyPr lIns="0" tIns="0" rIns="0" bIns="0" rtlCol="0" anchor="ctr"/>
           <a:lstStyle/>
           <a:p>
             <a:pPr algn="ctr"/>
-            <a:endParaRPr lang="de-DE" sz="750"/>
+            <a:endParaRPr lang="de-DE" sz="600"/>
           </a:p>
         </p:txBody>
       </p:sp>
@@ -3622,14 +3622,14 @@
         </p:nvSpPr>
         <p:spPr>
           <a:xfrm>
-            <a:off x="424964" y="667588"/>
-            <a:ext cx="204098" cy="204098"/>
+            <a:off x="281873" y="445324"/>
+            <a:ext cx="137502" cy="136065"/>
           </a:xfrm>
           <a:prstGeom prst="rect">
             <a:avLst/>
           </a:prstGeom>
           <a:noFill/>
-          <a:ln w="15875">
+          <a:ln w="9525">
             <a:solidFill>
               <a:schemeClr val="tx1"/>
             </a:solidFill>
@@ -3652,11 +3652,11 @@
           </a:fontRef>
         </p:style>
         <p:txBody>
-          <a:bodyPr rtlCol="0" anchor="ctr"/>
+          <a:bodyPr lIns="0" tIns="0" rIns="0" bIns="0" rtlCol="0" anchor="ctr"/>
           <a:lstStyle/>
           <a:p>
             <a:pPr algn="ctr"/>
-            <a:endParaRPr lang="de-DE" sz="750"/>
+            <a:endParaRPr lang="de-DE" sz="600"/>
           </a:p>
         </p:txBody>
       </p:sp>
@@ -3668,14 +3668,14 @@
         </p:nvSpPr>
         <p:spPr>
           <a:xfrm>
-            <a:off x="424964" y="871686"/>
-            <a:ext cx="204098" cy="204098"/>
+            <a:off x="281873" y="581389"/>
+            <a:ext cx="137502" cy="136065"/>
           </a:xfrm>
           <a:prstGeom prst="rect">
             <a:avLst/>
           </a:prstGeom>
           <a:noFill/>
-          <a:ln w="15875">
+          <a:ln w="9525">
             <a:solidFill>
               <a:schemeClr val="tx1"/>
             </a:solidFill>
@@ -3698,11 +3698,11 @@
           </a:fontRef>
         </p:style>
         <p:txBody>
-          <a:bodyPr rtlCol="0" anchor="ctr"/>
+          <a:bodyPr lIns="0" tIns="0" rIns="0" bIns="0" rtlCol="0" anchor="ctr"/>
           <a:lstStyle/>
           <a:p>
             <a:pPr algn="ctr"/>
-            <a:endParaRPr lang="de-DE" sz="750"/>
+            <a:endParaRPr lang="de-DE" sz="600"/>
           </a:p>
         </p:txBody>
       </p:sp>
@@ -3714,14 +3714,14 @@
         </p:nvSpPr>
         <p:spPr>
           <a:xfrm>
-            <a:off x="424964" y="1075783"/>
-            <a:ext cx="204098" cy="204098"/>
+            <a:off x="281873" y="717454"/>
+            <a:ext cx="137502" cy="136065"/>
           </a:xfrm>
           <a:prstGeom prst="rect">
             <a:avLst/>
           </a:prstGeom>
           <a:noFill/>
-          <a:ln w="15875">
+          <a:ln w="9525">
             <a:solidFill>
               <a:schemeClr val="tx1"/>
             </a:solidFill>
@@ -3744,11 +3744,11 @@
           </a:fontRef>
         </p:style>
         <p:txBody>
-          <a:bodyPr rtlCol="0" anchor="ctr"/>
+          <a:bodyPr lIns="0" tIns="0" rIns="0" bIns="0" rtlCol="0" anchor="ctr"/>
           <a:lstStyle/>
           <a:p>
             <a:pPr algn="ctr"/>
-            <a:endParaRPr lang="de-DE" sz="750"/>
+            <a:endParaRPr lang="de-DE" sz="600"/>
           </a:p>
         </p:txBody>
       </p:sp>
@@ -3760,14 +3760,14 @@
         </p:nvSpPr>
         <p:spPr>
           <a:xfrm>
-            <a:off x="424964" y="1279881"/>
-            <a:ext cx="204098" cy="204098"/>
+            <a:off x="281873" y="853519"/>
+            <a:ext cx="137502" cy="136065"/>
           </a:xfrm>
           <a:prstGeom prst="rect">
             <a:avLst/>
           </a:prstGeom>
           <a:noFill/>
-          <a:ln w="15875">
+          <a:ln w="9525">
             <a:solidFill>
               <a:schemeClr val="tx1"/>
             </a:solidFill>
@@ -3790,11 +3790,11 @@
           </a:fontRef>
         </p:style>
         <p:txBody>
-          <a:bodyPr rtlCol="0" anchor="ctr"/>
+          <a:bodyPr lIns="0" tIns="0" rIns="0" bIns="0" rtlCol="0" anchor="ctr"/>
           <a:lstStyle/>
           <a:p>
             <a:pPr algn="ctr"/>
-            <a:endParaRPr lang="de-DE" sz="750"/>
+            <a:endParaRPr lang="de-DE" sz="600"/>
           </a:p>
         </p:txBody>
       </p:sp>
@@ -3806,14 +3806,14 @@
         </p:nvSpPr>
         <p:spPr>
           <a:xfrm>
-            <a:off x="424964" y="1483979"/>
-            <a:ext cx="204098" cy="204098"/>
+            <a:off x="281873" y="989584"/>
+            <a:ext cx="137502" cy="136065"/>
           </a:xfrm>
           <a:prstGeom prst="rect">
             <a:avLst/>
           </a:prstGeom>
           <a:noFill/>
-          <a:ln w="15875">
+          <a:ln w="9525">
             <a:solidFill>
               <a:schemeClr val="tx1"/>
             </a:solidFill>
@@ -3836,11 +3836,11 @@
           </a:fontRef>
         </p:style>
         <p:txBody>
-          <a:bodyPr rtlCol="0" anchor="ctr"/>
+          <a:bodyPr lIns="0" tIns="0" rIns="0" bIns="0" rtlCol="0" anchor="ctr"/>
           <a:lstStyle/>
           <a:p>
             <a:pPr algn="ctr"/>
-            <a:endParaRPr lang="de-DE" sz="750"/>
+            <a:endParaRPr lang="de-DE" sz="600"/>
           </a:p>
         </p:txBody>
       </p:sp>
@@ -3852,14 +3852,14 @@
         </p:nvSpPr>
         <p:spPr>
           <a:xfrm>
-            <a:off x="427119" y="1688076"/>
-            <a:ext cx="201943" cy="204098"/>
+            <a:off x="281872" y="1125649"/>
+            <a:ext cx="137503" cy="136065"/>
           </a:xfrm>
           <a:prstGeom prst="rect">
             <a:avLst/>
           </a:prstGeom>
           <a:noFill/>
-          <a:ln w="15875">
+          <a:ln w="9525">
             <a:solidFill>
               <a:schemeClr val="tx1"/>
             </a:solidFill>
@@ -3882,11 +3882,11 @@
           </a:fontRef>
         </p:style>
         <p:txBody>
-          <a:bodyPr rtlCol="0" anchor="ctr"/>
+          <a:bodyPr lIns="0" tIns="0" rIns="0" bIns="0" rtlCol="0" anchor="ctr"/>
           <a:lstStyle/>
           <a:p>
             <a:pPr algn="ctr"/>
-            <a:endParaRPr lang="de-DE" sz="750"/>
+            <a:endParaRPr lang="de-DE" sz="600"/>
           </a:p>
         </p:txBody>
       </p:sp>
@@ -3898,14 +3898,14 @@
         </p:nvSpPr>
         <p:spPr>
           <a:xfrm>
-            <a:off x="427119" y="1892174"/>
-            <a:ext cx="201943" cy="204098"/>
+            <a:off x="281872" y="1261714"/>
+            <a:ext cx="137503" cy="136065"/>
           </a:xfrm>
           <a:prstGeom prst="rect">
             <a:avLst/>
           </a:prstGeom>
           <a:noFill/>
-          <a:ln w="15875">
+          <a:ln w="9525">
             <a:solidFill>
               <a:schemeClr val="tx1"/>
             </a:solidFill>
@@ -3928,11 +3928,11 @@
           </a:fontRef>
         </p:style>
         <p:txBody>
-          <a:bodyPr rtlCol="0" anchor="ctr"/>
+          <a:bodyPr lIns="0" tIns="0" rIns="0" bIns="0" rtlCol="0" anchor="ctr"/>
           <a:lstStyle/>
           <a:p>
             <a:pPr algn="ctr"/>
-            <a:endParaRPr lang="de-DE" sz="750"/>
+            <a:endParaRPr lang="de-DE" sz="600"/>
           </a:p>
         </p:txBody>
       </p:sp>
@@ -3944,14 +3944,14 @@
         </p:nvSpPr>
         <p:spPr>
           <a:xfrm>
-            <a:off x="427119" y="2096272"/>
-            <a:ext cx="201943" cy="204098"/>
+            <a:off x="281872" y="1397780"/>
+            <a:ext cx="137503" cy="136065"/>
           </a:xfrm>
           <a:prstGeom prst="rect">
             <a:avLst/>
           </a:prstGeom>
           <a:noFill/>
-          <a:ln w="15875">
+          <a:ln w="9525">
             <a:solidFill>
               <a:schemeClr val="tx1"/>
             </a:solidFill>
@@ -3974,11 +3974,11 @@
           </a:fontRef>
         </p:style>
         <p:txBody>
-          <a:bodyPr rtlCol="0" anchor="ctr"/>
+          <a:bodyPr lIns="0" tIns="0" rIns="0" bIns="0" rtlCol="0" anchor="ctr"/>
           <a:lstStyle/>
           <a:p>
             <a:pPr algn="ctr"/>
-            <a:endParaRPr lang="de-DE" sz="750"/>
+            <a:endParaRPr lang="de-DE" sz="600"/>
           </a:p>
         </p:txBody>
       </p:sp>
@@ -3990,14 +3990,14 @@
         </p:nvSpPr>
         <p:spPr>
           <a:xfrm>
-            <a:off x="427119" y="2300370"/>
-            <a:ext cx="201943" cy="204098"/>
+            <a:off x="281872" y="1533845"/>
+            <a:ext cx="137503" cy="136065"/>
           </a:xfrm>
           <a:prstGeom prst="rect">
             <a:avLst/>
           </a:prstGeom>
           <a:noFill/>
-          <a:ln w="15875">
+          <a:ln w="9525">
             <a:solidFill>
               <a:schemeClr val="tx1"/>
             </a:solidFill>
@@ -4020,11 +4020,11 @@
           </a:fontRef>
         </p:style>
         <p:txBody>
-          <a:bodyPr rtlCol="0" anchor="ctr"/>
+          <a:bodyPr lIns="0" tIns="0" rIns="0" bIns="0" rtlCol="0" anchor="ctr"/>
           <a:lstStyle/>
           <a:p>
             <a:pPr algn="ctr"/>
-            <a:endParaRPr lang="de-DE" sz="750"/>
+            <a:endParaRPr lang="de-DE" sz="600"/>
           </a:p>
         </p:txBody>
       </p:sp>
@@ -4036,8 +4036,8 @@
         </p:nvSpPr>
         <p:spPr>
           <a:xfrm>
-            <a:off x="988639" y="1843489"/>
-            <a:ext cx="102049" cy="102049"/>
+            <a:off x="645068" y="1216714"/>
+            <a:ext cx="90000" cy="90000"/>
           </a:xfrm>
           <a:prstGeom prst="ellipse">
             <a:avLst/>
@@ -4045,7 +4045,7 @@
           <a:solidFill>
             <a:schemeClr val="bg1"/>
           </a:solidFill>
-          <a:ln w="15875">
+          <a:ln w="9525">
             <a:solidFill>
               <a:schemeClr val="tx1"/>
             </a:solidFill>
@@ -4068,12 +4068,12 @@
           </a:fontRef>
         </p:style>
         <p:txBody>
-          <a:bodyPr rtlCol="0" anchor="ctr"/>
+          <a:bodyPr lIns="0" tIns="0" rIns="0" bIns="0" rtlCol="0" anchor="ctr"/>
           <a:lstStyle/>
           <a:p>
             <a:pPr algn="ctr"/>
             <a:r>
-              <a:rPr lang="de-DE" sz="750" dirty="0">
+              <a:rPr lang="de-DE" sz="600" dirty="0">
                 <a:solidFill>
                   <a:schemeClr val="tx1"/>
                 </a:solidFill>
@@ -4091,8 +4091,8 @@
         </p:nvSpPr>
         <p:spPr>
           <a:xfrm>
-            <a:off x="988639" y="1027098"/>
-            <a:ext cx="102049" cy="102049"/>
+            <a:off x="645068" y="672454"/>
+            <a:ext cx="90000" cy="90000"/>
           </a:xfrm>
           <a:prstGeom prst="ellipse">
             <a:avLst/>
@@ -4100,7 +4100,7 @@
           <a:solidFill>
             <a:schemeClr val="bg1"/>
           </a:solidFill>
-          <a:ln w="15875">
+          <a:ln w="9525">
             <a:solidFill>
               <a:schemeClr val="tx1"/>
             </a:solidFill>
@@ -4123,12 +4123,12 @@
           </a:fontRef>
         </p:style>
         <p:txBody>
-          <a:bodyPr rtlCol="0" anchor="ctr"/>
+          <a:bodyPr lIns="0" tIns="0" rIns="0" bIns="0" rtlCol="0" anchor="ctr"/>
           <a:lstStyle/>
           <a:p>
             <a:pPr algn="ctr"/>
             <a:r>
-              <a:rPr lang="de-DE" sz="750" dirty="0">
+              <a:rPr lang="de-DE" sz="600" dirty="0">
                 <a:solidFill>
                   <a:schemeClr val="tx1"/>
                 </a:solidFill>
@@ -4146,8 +4146,8 @@
         </p:nvSpPr>
         <p:spPr>
           <a:xfrm>
-            <a:off x="1805494" y="1027098"/>
-            <a:ext cx="102049" cy="102049"/>
+            <a:off x="1189960" y="672454"/>
+            <a:ext cx="90000" cy="90000"/>
           </a:xfrm>
           <a:prstGeom prst="ellipse">
             <a:avLst/>
@@ -4155,7 +4155,7 @@
           <a:solidFill>
             <a:schemeClr val="bg1"/>
           </a:solidFill>
-          <a:ln w="15875">
+          <a:ln w="9525">
             <a:solidFill>
               <a:schemeClr val="tx1"/>
             </a:solidFill>
@@ -4178,12 +4178,12 @@
           </a:fontRef>
         </p:style>
         <p:txBody>
-          <a:bodyPr rtlCol="0" anchor="ctr"/>
+          <a:bodyPr lIns="0" tIns="0" rIns="0" bIns="0" rtlCol="0" anchor="ctr"/>
           <a:lstStyle/>
           <a:p>
             <a:pPr algn="ctr"/>
             <a:r>
-              <a:rPr lang="de-DE" sz="750" dirty="0">
+              <a:rPr lang="de-DE" sz="600" dirty="0">
                 <a:solidFill>
                   <a:schemeClr val="tx1"/>
                 </a:solidFill>
@@ -4201,8 +4201,8 @@
         </p:nvSpPr>
         <p:spPr>
           <a:xfrm>
-            <a:off x="1805494" y="1843489"/>
-            <a:ext cx="102049" cy="102049"/>
+            <a:off x="1189960" y="1216714"/>
+            <a:ext cx="90000" cy="90000"/>
           </a:xfrm>
           <a:prstGeom prst="ellipse">
             <a:avLst/>
@@ -4210,7 +4210,7 @@
           <a:solidFill>
             <a:schemeClr val="bg1"/>
           </a:solidFill>
-          <a:ln w="15875">
+          <a:ln w="9525">
             <a:solidFill>
               <a:schemeClr val="tx1"/>
             </a:solidFill>
@@ -4233,12 +4233,12 @@
           </a:fontRef>
         </p:style>
         <p:txBody>
-          <a:bodyPr rtlCol="0" anchor="ctr"/>
+          <a:bodyPr lIns="0" tIns="0" rIns="0" bIns="0" rtlCol="0" anchor="ctr"/>
           <a:lstStyle/>
           <a:p>
             <a:pPr algn="ctr"/>
             <a:r>
-              <a:rPr lang="de-DE" sz="750" dirty="0">
+              <a:rPr lang="de-DE" sz="600" dirty="0">
                 <a:solidFill>
                   <a:schemeClr val="tx1"/>
                 </a:solidFill>
@@ -4259,13 +4259,13 @@
         </p:nvCxnSpPr>
         <p:spPr>
           <a:xfrm flipV="1">
-            <a:off x="1039664" y="1129147"/>
-            <a:ext cx="0" cy="714342"/>
+            <a:off x="690068" y="762454"/>
+            <a:ext cx="0" cy="454260"/>
           </a:xfrm>
           <a:prstGeom prst="straightConnector1">
             <a:avLst/>
           </a:prstGeom>
-          <a:ln w="15875">
+          <a:ln w="9525">
             <a:solidFill>
               <a:schemeClr val="tx1"/>
             </a:solidFill>
@@ -4299,13 +4299,13 @@
         </p:nvCxnSpPr>
         <p:spPr>
           <a:xfrm>
-            <a:off x="1090688" y="1078122"/>
-            <a:ext cx="714806" cy="0"/>
+            <a:off x="735068" y="717454"/>
+            <a:ext cx="454892" cy="0"/>
           </a:xfrm>
           <a:prstGeom prst="straightConnector1">
             <a:avLst/>
           </a:prstGeom>
-          <a:ln w="15875">
+          <a:ln w="9525">
             <a:solidFill>
               <a:schemeClr val="tx1"/>
             </a:solidFill>
@@ -4339,13 +4339,13 @@
         </p:nvCxnSpPr>
         <p:spPr>
           <a:xfrm>
-            <a:off x="1856518" y="1129147"/>
-            <a:ext cx="0" cy="714342"/>
+            <a:off x="1234960" y="762454"/>
+            <a:ext cx="0" cy="454260"/>
           </a:xfrm>
           <a:prstGeom prst="straightConnector1">
             <a:avLst/>
           </a:prstGeom>
-          <a:ln w="15875">
+          <a:ln w="9525">
             <a:solidFill>
               <a:schemeClr val="tx1"/>
             </a:solidFill>
@@ -4379,13 +4379,13 @@
         </p:nvCxnSpPr>
         <p:spPr>
           <a:xfrm flipH="1">
-            <a:off x="1090688" y="1894513"/>
-            <a:ext cx="714806" cy="0"/>
+            <a:off x="735068" y="1261714"/>
+            <a:ext cx="454892" cy="0"/>
           </a:xfrm>
           <a:prstGeom prst="straightConnector1">
             <a:avLst/>
           </a:prstGeom>
-          <a:ln w="15875">
+          <a:ln w="9525">
             <a:solidFill>
               <a:schemeClr val="tx1"/>
             </a:solidFill>
@@ -4416,8 +4416,8 @@
         </p:nvSpPr>
         <p:spPr>
           <a:xfrm>
-            <a:off x="249661" y="2383118"/>
-            <a:ext cx="232756" cy="207749"/>
+            <a:off x="219320" y="1609772"/>
+            <a:ext cx="38472" cy="92333"/>
           </a:xfrm>
           <a:prstGeom prst="rect">
             <a:avLst/>
@@ -4425,13 +4425,14 @@
           <a:noFill/>
         </p:spPr>
         <p:txBody>
-          <a:bodyPr wrap="none" rtlCol="0">
+          <a:bodyPr wrap="none" lIns="0" tIns="0" rIns="0" bIns="0" rtlCol="0">
             <a:spAutoFit/>
           </a:bodyPr>
           <a:lstStyle/>
           <a:p>
-            <a:r>
-              <a:rPr lang="de-DE" sz="750" dirty="0"/>
+            <a:pPr algn="r"/>
+            <a:r>
+              <a:rPr lang="de-DE" sz="600" dirty="0"/>
               <a:t>0</a:t>
             </a:r>
           </a:p>
@@ -4445,8 +4446,8 @@
         </p:nvSpPr>
         <p:spPr>
           <a:xfrm>
-            <a:off x="251815" y="359293"/>
-            <a:ext cx="232756" cy="207749"/>
+            <a:off x="213509" y="260555"/>
+            <a:ext cx="45719" cy="92333"/>
           </a:xfrm>
           <a:prstGeom prst="rect">
             <a:avLst/>
@@ -4454,13 +4455,14 @@
           <a:noFill/>
         </p:spPr>
         <p:txBody>
-          <a:bodyPr wrap="none" rtlCol="0">
+          <a:bodyPr wrap="square" lIns="0" tIns="0" rIns="0" bIns="0" rtlCol="0">
             <a:spAutoFit/>
           </a:bodyPr>
           <a:lstStyle/>
           <a:p>
-            <a:r>
-              <a:rPr lang="de-DE" sz="750" dirty="0"/>
+            <a:pPr algn="r"/>
+            <a:r>
+              <a:rPr lang="de-DE" sz="600" dirty="0"/>
               <a:t>1</a:t>
             </a:r>
           </a:p>
@@ -4468,14 +4470,14 @@
       </p:sp>
       <p:sp>
         <p:nvSpPr>
-          <p:cNvPr id="44" name="Textfeld 43"/>
+          <p:cNvPr id="46" name="Textfeld 45"/>
           <p:cNvSpPr txBox="1"/>
           <p:nvPr/>
         </p:nvSpPr>
         <p:spPr>
           <a:xfrm>
-            <a:off x="308586" y="283836"/>
-            <a:ext cx="232756" cy="207749"/>
+            <a:off x="161612" y="1487678"/>
+            <a:ext cx="96180" cy="92333"/>
           </a:xfrm>
           <a:prstGeom prst="rect">
             <a:avLst/>
@@ -4483,100 +4485,14 @@
           <a:noFill/>
         </p:spPr>
         <p:txBody>
-          <a:bodyPr wrap="none" rtlCol="0">
+          <a:bodyPr wrap="none" lIns="0" tIns="0" rIns="0" bIns="0" rtlCol="0">
             <a:spAutoFit/>
           </a:bodyPr>
           <a:lstStyle/>
           <a:p>
-            <a:r>
-              <a:rPr lang="de-DE" sz="750" dirty="0"/>
-              <a:t>0</a:t>
-            </a:r>
-          </a:p>
-        </p:txBody>
-      </p:sp>
-      <p:sp>
-        <p:nvSpPr>
-          <p:cNvPr id="45" name="Textfeld 44"/>
-          <p:cNvSpPr txBox="1"/>
-          <p:nvPr/>
-        </p:nvSpPr>
-        <p:spPr>
-          <a:xfrm>
-            <a:off x="2348355" y="283836"/>
-            <a:ext cx="232756" cy="207749"/>
-          </a:xfrm>
-          <a:prstGeom prst="rect">
-            <a:avLst/>
-          </a:prstGeom>
-          <a:noFill/>
-        </p:spPr>
-        <p:txBody>
-          <a:bodyPr wrap="none" rtlCol="0">
-            <a:spAutoFit/>
-          </a:bodyPr>
-          <a:lstStyle/>
-          <a:p>
-            <a:r>
-              <a:rPr lang="de-DE" sz="750" dirty="0"/>
-              <a:t>1</a:t>
-            </a:r>
-          </a:p>
-        </p:txBody>
-      </p:sp>
-      <p:sp>
-        <p:nvSpPr>
-          <p:cNvPr id="46" name="Textfeld 45"/>
-          <p:cNvSpPr txBox="1"/>
-          <p:nvPr/>
-        </p:nvSpPr>
-        <p:spPr>
-          <a:xfrm>
-            <a:off x="176324" y="2179020"/>
-            <a:ext cx="304892" cy="207749"/>
-          </a:xfrm>
-          <a:prstGeom prst="rect">
-            <a:avLst/>
-          </a:prstGeom>
-          <a:noFill/>
-        </p:spPr>
-        <p:txBody>
-          <a:bodyPr wrap="none" rtlCol="0">
-            <a:spAutoFit/>
-          </a:bodyPr>
-          <a:lstStyle/>
-          <a:p>
-            <a:r>
-              <a:rPr lang="de-DE" sz="750" dirty="0"/>
-              <a:t>0.1</a:t>
-            </a:r>
-          </a:p>
-        </p:txBody>
-      </p:sp>
-      <p:sp>
-        <p:nvSpPr>
-          <p:cNvPr id="47" name="Textfeld 46"/>
-          <p:cNvSpPr txBox="1"/>
-          <p:nvPr/>
-        </p:nvSpPr>
-        <p:spPr>
-          <a:xfrm>
-            <a:off x="471414" y="283836"/>
-            <a:ext cx="304892" cy="207749"/>
-          </a:xfrm>
-          <a:prstGeom prst="rect">
-            <a:avLst/>
-          </a:prstGeom>
-          <a:noFill/>
-        </p:spPr>
-        <p:txBody>
-          <a:bodyPr wrap="none" rtlCol="0">
-            <a:spAutoFit/>
-          </a:bodyPr>
-          <a:lstStyle/>
-          <a:p>
-            <a:r>
-              <a:rPr lang="de-DE" sz="750" dirty="0"/>
+            <a:pPr algn="r"/>
+            <a:r>
+              <a:rPr lang="de-DE" sz="600" dirty="0"/>
               <a:t>0.1</a:t>
             </a:r>
           </a:p>
@@ -4590,8 +4506,8 @@
         </p:nvSpPr>
         <p:spPr>
           <a:xfrm>
-            <a:off x="1075046" y="2038418"/>
-            <a:ext cx="737469" cy="228070"/>
+            <a:off x="690068" y="1390748"/>
+            <a:ext cx="544892" cy="152047"/>
           </a:xfrm>
           <a:prstGeom prst="roundRect">
             <a:avLst/>
@@ -4622,12 +4538,12 @@
           </a:fontRef>
         </p:style>
         <p:txBody>
-          <a:bodyPr rtlCol="0" anchor="ctr"/>
+          <a:bodyPr lIns="0" tIns="0" rIns="0" bIns="0" rtlCol="0" anchor="ctr"/>
           <a:lstStyle/>
           <a:p>
             <a:pPr algn="ctr"/>
             <a:r>
-              <a:rPr lang="de-DE" sz="750" dirty="0" err="1">
+              <a:rPr lang="de-DE" sz="700" b="1" dirty="0" err="1">
                 <a:solidFill>
                   <a:schemeClr val="tx1"/>
                 </a:solidFill>
@@ -4635,18 +4551,108 @@
               <a:t>Patrol</a:t>
             </a:r>
             <a:r>
-              <a:rPr lang="de-DE" sz="750" dirty="0">
+              <a:rPr lang="de-DE" sz="700" b="1" dirty="0">
                 <a:solidFill>
                   <a:schemeClr val="tx1"/>
                 </a:solidFill>
               </a:rPr>
               <a:t> Plan 2</a:t>
             </a:r>
-            <a:endParaRPr lang="en-US" sz="750" dirty="0">
+            <a:endParaRPr lang="en-US" sz="700" b="1" dirty="0">
               <a:solidFill>
                 <a:schemeClr val="tx1"/>
               </a:solidFill>
             </a:endParaRPr>
+          </a:p>
+        </p:txBody>
+      </p:sp>
+      <p:sp>
+        <p:nvSpPr>
+          <p:cNvPr id="44" name="Textfeld 43"/>
+          <p:cNvSpPr txBox="1"/>
+          <p:nvPr/>
+        </p:nvSpPr>
+        <p:spPr>
+          <a:xfrm>
+            <a:off x="255485" y="208421"/>
+            <a:ext cx="45719" cy="92333"/>
+          </a:xfrm>
+          <a:prstGeom prst="rect">
+            <a:avLst/>
+          </a:prstGeom>
+          <a:noFill/>
+        </p:spPr>
+        <p:txBody>
+          <a:bodyPr wrap="square" lIns="0" tIns="0" rIns="0" bIns="0" rtlCol="0">
+            <a:spAutoFit/>
+          </a:bodyPr>
+          <a:lstStyle/>
+          <a:p>
+            <a:pPr algn="ctr"/>
+            <a:r>
+              <a:rPr lang="de-DE" sz="600" dirty="0"/>
+              <a:t>0</a:t>
+            </a:r>
+          </a:p>
+        </p:txBody>
+      </p:sp>
+      <p:sp>
+        <p:nvSpPr>
+          <p:cNvPr id="45" name="Textfeld 44"/>
+          <p:cNvSpPr txBox="1"/>
+          <p:nvPr/>
+        </p:nvSpPr>
+        <p:spPr>
+          <a:xfrm>
+            <a:off x="1622578" y="208421"/>
+            <a:ext cx="38472" cy="92333"/>
+          </a:xfrm>
+          <a:prstGeom prst="rect">
+            <a:avLst/>
+          </a:prstGeom>
+          <a:noFill/>
+        </p:spPr>
+        <p:txBody>
+          <a:bodyPr wrap="none" lIns="0" tIns="0" rIns="0" bIns="0" rtlCol="0">
+            <a:spAutoFit/>
+          </a:bodyPr>
+          <a:lstStyle/>
+          <a:p>
+            <a:pPr algn="ctr"/>
+            <a:r>
+              <a:rPr lang="de-DE" sz="600" dirty="0"/>
+              <a:t>1</a:t>
+            </a:r>
+          </a:p>
+        </p:txBody>
+      </p:sp>
+      <p:sp>
+        <p:nvSpPr>
+          <p:cNvPr id="47" name="Textfeld 46"/>
+          <p:cNvSpPr txBox="1"/>
+          <p:nvPr/>
+        </p:nvSpPr>
+        <p:spPr>
+          <a:xfrm>
+            <a:off x="370268" y="208421"/>
+            <a:ext cx="97196" cy="92333"/>
+          </a:xfrm>
+          <a:prstGeom prst="rect">
+            <a:avLst/>
+          </a:prstGeom>
+          <a:noFill/>
+        </p:spPr>
+        <p:txBody>
+          <a:bodyPr wrap="square" lIns="0" tIns="0" rIns="0" bIns="0" rtlCol="0">
+            <a:spAutoFit/>
+          </a:bodyPr>
+          <a:lstStyle/>
+          <a:p>
+            <a:pPr algn="ctr"/>
+            <a:r>
+              <a:rPr lang="de-DE" sz="600" dirty="0"/>
+              <a:t>0.1</a:t>
+            </a:r>
           </a:p>
         </p:txBody>
       </p:sp>
@@ -4715,8 +4721,8 @@
         </p:blipFill>
         <p:spPr>
           <a:xfrm>
-            <a:off x="427119" y="463168"/>
-            <a:ext cx="2037615" cy="2041300"/>
+            <a:off x="284746" y="309043"/>
+            <a:ext cx="1358410" cy="1360867"/>
           </a:xfrm>
           <a:prstGeom prst="rect">
             <a:avLst/>
@@ -4731,20 +4737,20 @@
       </p:pic>
       <p:sp>
         <p:nvSpPr>
-          <p:cNvPr id="8" name="Rechteck 7"/>
+          <p:cNvPr id="9" name="Rechteck 8"/>
           <p:cNvSpPr/>
           <p:nvPr/>
         </p:nvSpPr>
         <p:spPr>
           <a:xfrm>
-            <a:off x="424964" y="463491"/>
-            <a:ext cx="204098" cy="204098"/>
+            <a:off x="419374" y="309259"/>
+            <a:ext cx="136065" cy="136065"/>
           </a:xfrm>
           <a:prstGeom prst="rect">
             <a:avLst/>
           </a:prstGeom>
           <a:noFill/>
-          <a:ln w="15875">
+          <a:ln w="9525">
             <a:solidFill>
               <a:schemeClr val="tx1"/>
             </a:solidFill>
@@ -4767,30 +4773,30 @@
           </a:fontRef>
         </p:style>
         <p:txBody>
-          <a:bodyPr rtlCol="0" anchor="ctr"/>
+          <a:bodyPr lIns="0" tIns="0" rIns="0" bIns="0" rtlCol="0" anchor="ctr"/>
           <a:lstStyle/>
           <a:p>
             <a:pPr algn="ctr"/>
-            <a:endParaRPr lang="de-DE" sz="750"/>
-          </a:p>
-        </p:txBody>
-      </p:sp>
-      <p:sp>
-        <p:nvSpPr>
-          <p:cNvPr id="9" name="Rechteck 8"/>
+            <a:endParaRPr lang="de-DE" sz="600"/>
+          </a:p>
+        </p:txBody>
+      </p:sp>
+      <p:sp>
+        <p:nvSpPr>
+          <p:cNvPr id="10" name="Rechteck 9"/>
           <p:cNvSpPr/>
           <p:nvPr/>
         </p:nvSpPr>
         <p:spPr>
           <a:xfrm>
-            <a:off x="629061" y="463491"/>
-            <a:ext cx="204098" cy="204098"/>
+            <a:off x="554003" y="309259"/>
+            <a:ext cx="136065" cy="136065"/>
           </a:xfrm>
           <a:prstGeom prst="rect">
             <a:avLst/>
           </a:prstGeom>
           <a:noFill/>
-          <a:ln w="15875">
+          <a:ln w="9525">
             <a:solidFill>
               <a:schemeClr val="tx1"/>
             </a:solidFill>
@@ -4813,30 +4819,30 @@
           </a:fontRef>
         </p:style>
         <p:txBody>
-          <a:bodyPr rtlCol="0" anchor="ctr"/>
+          <a:bodyPr lIns="0" tIns="0" rIns="0" bIns="0" rtlCol="0" anchor="ctr"/>
           <a:lstStyle/>
           <a:p>
             <a:pPr algn="ctr"/>
-            <a:endParaRPr lang="de-DE" sz="750"/>
-          </a:p>
-        </p:txBody>
-      </p:sp>
-      <p:sp>
-        <p:nvSpPr>
-          <p:cNvPr id="10" name="Rechteck 9"/>
+            <a:endParaRPr lang="de-DE" sz="600"/>
+          </a:p>
+        </p:txBody>
+      </p:sp>
+      <p:sp>
+        <p:nvSpPr>
+          <p:cNvPr id="11" name="Rechteck 10"/>
           <p:cNvSpPr/>
           <p:nvPr/>
         </p:nvSpPr>
         <p:spPr>
           <a:xfrm>
-            <a:off x="831005" y="463491"/>
-            <a:ext cx="204098" cy="204098"/>
+            <a:off x="690068" y="309259"/>
+            <a:ext cx="136065" cy="136065"/>
           </a:xfrm>
           <a:prstGeom prst="rect">
             <a:avLst/>
           </a:prstGeom>
           <a:noFill/>
-          <a:ln w="15875">
+          <a:ln w="9525">
             <a:solidFill>
               <a:schemeClr val="tx1"/>
             </a:solidFill>
@@ -4859,30 +4865,30 @@
           </a:fontRef>
         </p:style>
         <p:txBody>
-          <a:bodyPr rtlCol="0" anchor="ctr"/>
+          <a:bodyPr lIns="0" tIns="0" rIns="0" bIns="0" rtlCol="0" anchor="ctr"/>
           <a:lstStyle/>
           <a:p>
             <a:pPr algn="ctr"/>
-            <a:endParaRPr lang="de-DE" sz="750"/>
-          </a:p>
-        </p:txBody>
-      </p:sp>
-      <p:sp>
-        <p:nvSpPr>
-          <p:cNvPr id="11" name="Rechteck 10"/>
+            <a:endParaRPr lang="de-DE" sz="600"/>
+          </a:p>
+        </p:txBody>
+      </p:sp>
+      <p:sp>
+        <p:nvSpPr>
+          <p:cNvPr id="12" name="Rechteck 11"/>
           <p:cNvSpPr/>
           <p:nvPr/>
         </p:nvSpPr>
         <p:spPr>
           <a:xfrm>
-            <a:off x="1035102" y="463491"/>
-            <a:ext cx="204098" cy="204098"/>
+            <a:off x="826455" y="309259"/>
+            <a:ext cx="136065" cy="136065"/>
           </a:xfrm>
           <a:prstGeom prst="rect">
             <a:avLst/>
           </a:prstGeom>
           <a:noFill/>
-          <a:ln w="15875">
+          <a:ln w="9525">
             <a:solidFill>
               <a:schemeClr val="tx1"/>
             </a:solidFill>
@@ -4905,30 +4911,30 @@
           </a:fontRef>
         </p:style>
         <p:txBody>
-          <a:bodyPr rtlCol="0" anchor="ctr"/>
+          <a:bodyPr lIns="0" tIns="0" rIns="0" bIns="0" rtlCol="0" anchor="ctr"/>
           <a:lstStyle/>
           <a:p>
             <a:pPr algn="ctr"/>
-            <a:endParaRPr lang="de-DE" sz="750"/>
-          </a:p>
-        </p:txBody>
-      </p:sp>
-      <p:sp>
-        <p:nvSpPr>
-          <p:cNvPr id="12" name="Rechteck 11"/>
+            <a:endParaRPr lang="de-DE" sz="600"/>
+          </a:p>
+        </p:txBody>
+      </p:sp>
+      <p:sp>
+        <p:nvSpPr>
+          <p:cNvPr id="13" name="Rechteck 12"/>
           <p:cNvSpPr/>
           <p:nvPr/>
         </p:nvSpPr>
         <p:spPr>
           <a:xfrm>
-            <a:off x="1239683" y="463491"/>
-            <a:ext cx="204098" cy="204098"/>
+            <a:off x="962829" y="309259"/>
+            <a:ext cx="136065" cy="136065"/>
           </a:xfrm>
           <a:prstGeom prst="rect">
             <a:avLst/>
           </a:prstGeom>
           <a:noFill/>
-          <a:ln w="15875">
+          <a:ln w="9525">
             <a:solidFill>
               <a:schemeClr val="tx1"/>
             </a:solidFill>
@@ -4951,30 +4957,30 @@
           </a:fontRef>
         </p:style>
         <p:txBody>
-          <a:bodyPr rtlCol="0" anchor="ctr"/>
+          <a:bodyPr lIns="0" tIns="0" rIns="0" bIns="0" rtlCol="0" anchor="ctr"/>
           <a:lstStyle/>
           <a:p>
             <a:pPr algn="ctr"/>
-            <a:endParaRPr lang="de-DE" sz="750"/>
-          </a:p>
-        </p:txBody>
-      </p:sp>
-      <p:sp>
-        <p:nvSpPr>
-          <p:cNvPr id="13" name="Rechteck 12"/>
+            <a:endParaRPr lang="de-DE" sz="600"/>
+          </a:p>
+        </p:txBody>
+      </p:sp>
+      <p:sp>
+        <p:nvSpPr>
+          <p:cNvPr id="14" name="Rechteck 13"/>
           <p:cNvSpPr/>
           <p:nvPr/>
         </p:nvSpPr>
         <p:spPr>
           <a:xfrm>
-            <a:off x="1444244" y="463491"/>
-            <a:ext cx="204098" cy="204098"/>
+            <a:off x="1098895" y="309259"/>
+            <a:ext cx="136065" cy="136065"/>
           </a:xfrm>
           <a:prstGeom prst="rect">
             <a:avLst/>
           </a:prstGeom>
           <a:noFill/>
-          <a:ln w="15875">
+          <a:ln w="9525">
             <a:solidFill>
               <a:schemeClr val="tx1"/>
             </a:solidFill>
@@ -4997,30 +5003,30 @@
           </a:fontRef>
         </p:style>
         <p:txBody>
-          <a:bodyPr rtlCol="0" anchor="ctr"/>
+          <a:bodyPr lIns="0" tIns="0" rIns="0" bIns="0" rtlCol="0" anchor="ctr"/>
           <a:lstStyle/>
           <a:p>
             <a:pPr algn="ctr"/>
-            <a:endParaRPr lang="de-DE" sz="750"/>
-          </a:p>
-        </p:txBody>
-      </p:sp>
-      <p:sp>
-        <p:nvSpPr>
-          <p:cNvPr id="14" name="Rechteck 13"/>
+            <a:endParaRPr lang="de-DE" sz="600"/>
+          </a:p>
+        </p:txBody>
+      </p:sp>
+      <p:sp>
+        <p:nvSpPr>
+          <p:cNvPr id="15" name="Rechteck 14"/>
           <p:cNvSpPr/>
           <p:nvPr/>
         </p:nvSpPr>
         <p:spPr>
           <a:xfrm>
-            <a:off x="1648343" y="463491"/>
-            <a:ext cx="204098" cy="204098"/>
+            <a:off x="1234960" y="309259"/>
+            <a:ext cx="136065" cy="136065"/>
           </a:xfrm>
           <a:prstGeom prst="rect">
             <a:avLst/>
           </a:prstGeom>
           <a:noFill/>
-          <a:ln w="15875">
+          <a:ln w="9525">
             <a:solidFill>
               <a:schemeClr val="tx1"/>
             </a:solidFill>
@@ -5043,30 +5049,30 @@
           </a:fontRef>
         </p:style>
         <p:txBody>
-          <a:bodyPr rtlCol="0" anchor="ctr"/>
+          <a:bodyPr lIns="0" tIns="0" rIns="0" bIns="0" rtlCol="0" anchor="ctr"/>
           <a:lstStyle/>
           <a:p>
             <a:pPr algn="ctr"/>
-            <a:endParaRPr lang="de-DE" sz="750"/>
-          </a:p>
-        </p:txBody>
-      </p:sp>
-      <p:sp>
-        <p:nvSpPr>
-          <p:cNvPr id="15" name="Rechteck 14"/>
+            <a:endParaRPr lang="de-DE" sz="600"/>
+          </a:p>
+        </p:txBody>
+      </p:sp>
+      <p:sp>
+        <p:nvSpPr>
+          <p:cNvPr id="16" name="Rechteck 15"/>
           <p:cNvSpPr/>
           <p:nvPr/>
         </p:nvSpPr>
         <p:spPr>
           <a:xfrm>
-            <a:off x="1852440" y="463491"/>
-            <a:ext cx="204098" cy="204098"/>
+            <a:off x="1371025" y="309259"/>
+            <a:ext cx="136065" cy="136065"/>
           </a:xfrm>
           <a:prstGeom prst="rect">
             <a:avLst/>
           </a:prstGeom>
           <a:noFill/>
-          <a:ln w="15875">
+          <a:ln w="9525">
             <a:solidFill>
               <a:schemeClr val="tx1"/>
             </a:solidFill>
@@ -5089,30 +5095,30 @@
           </a:fontRef>
         </p:style>
         <p:txBody>
-          <a:bodyPr rtlCol="0" anchor="ctr"/>
+          <a:bodyPr lIns="0" tIns="0" rIns="0" bIns="0" rtlCol="0" anchor="ctr"/>
           <a:lstStyle/>
           <a:p>
             <a:pPr algn="ctr"/>
-            <a:endParaRPr lang="de-DE" sz="750"/>
-          </a:p>
-        </p:txBody>
-      </p:sp>
-      <p:sp>
-        <p:nvSpPr>
-          <p:cNvPr id="16" name="Rechteck 15"/>
+            <a:endParaRPr lang="de-DE" sz="600"/>
+          </a:p>
+        </p:txBody>
+      </p:sp>
+      <p:sp>
+        <p:nvSpPr>
+          <p:cNvPr id="17" name="Rechteck 16"/>
           <p:cNvSpPr/>
           <p:nvPr/>
         </p:nvSpPr>
         <p:spPr>
           <a:xfrm>
-            <a:off x="2056538" y="463491"/>
-            <a:ext cx="204098" cy="204098"/>
+            <a:off x="1507090" y="309259"/>
+            <a:ext cx="136065" cy="136065"/>
           </a:xfrm>
           <a:prstGeom prst="rect">
             <a:avLst/>
           </a:prstGeom>
           <a:noFill/>
-          <a:ln w="15875">
+          <a:ln w="9525">
             <a:solidFill>
               <a:schemeClr val="tx1"/>
             </a:solidFill>
@@ -5135,30 +5141,32 @@
           </a:fontRef>
         </p:style>
         <p:txBody>
-          <a:bodyPr rtlCol="0" anchor="ctr"/>
+          <a:bodyPr lIns="0" tIns="0" rIns="0" bIns="0" rtlCol="0" anchor="ctr"/>
           <a:lstStyle/>
           <a:p>
             <a:pPr algn="ctr"/>
-            <a:endParaRPr lang="de-DE" sz="750"/>
-          </a:p>
-        </p:txBody>
-      </p:sp>
-      <p:sp>
-        <p:nvSpPr>
-          <p:cNvPr id="17" name="Rechteck 16"/>
+            <a:endParaRPr lang="de-DE" sz="600"/>
+          </a:p>
+        </p:txBody>
+      </p:sp>
+      <p:sp>
+        <p:nvSpPr>
+          <p:cNvPr id="27" name="Ellipse 26"/>
           <p:cNvSpPr/>
           <p:nvPr/>
         </p:nvSpPr>
         <p:spPr>
           <a:xfrm>
-            <a:off x="2260635" y="463491"/>
-            <a:ext cx="204098" cy="204098"/>
-          </a:xfrm>
-          <a:prstGeom prst="rect">
-            <a:avLst/>
-          </a:prstGeom>
-          <a:noFill/>
-          <a:ln w="15875">
+            <a:off x="645068" y="1216714"/>
+            <a:ext cx="90000" cy="90000"/>
+          </a:xfrm>
+          <a:prstGeom prst="ellipse">
+            <a:avLst/>
+          </a:prstGeom>
+          <a:solidFill>
+            <a:schemeClr val="bg1"/>
+          </a:solidFill>
+          <a:ln w="9525">
             <a:solidFill>
               <a:schemeClr val="tx1"/>
             </a:solidFill>
@@ -5181,30 +5189,39 @@
           </a:fontRef>
         </p:style>
         <p:txBody>
-          <a:bodyPr rtlCol="0" anchor="ctr"/>
+          <a:bodyPr lIns="0" tIns="0" rIns="0" bIns="0" rtlCol="0" anchor="ctr"/>
           <a:lstStyle/>
           <a:p>
             <a:pPr algn="ctr"/>
-            <a:endParaRPr lang="de-DE" sz="750"/>
-          </a:p>
-        </p:txBody>
-      </p:sp>
-      <p:sp>
-        <p:nvSpPr>
-          <p:cNvPr id="18" name="Rechteck 17"/>
+            <a:r>
+              <a:rPr lang="de-DE" sz="600" dirty="0">
+                <a:solidFill>
+                  <a:schemeClr val="tx1"/>
+                </a:solidFill>
+              </a:rPr>
+              <a:t>1</a:t>
+            </a:r>
+          </a:p>
+        </p:txBody>
+      </p:sp>
+      <p:sp>
+        <p:nvSpPr>
+          <p:cNvPr id="28" name="Ellipse 27"/>
           <p:cNvSpPr/>
           <p:nvPr/>
         </p:nvSpPr>
         <p:spPr>
           <a:xfrm>
-            <a:off x="424964" y="667588"/>
-            <a:ext cx="204098" cy="204098"/>
-          </a:xfrm>
-          <a:prstGeom prst="rect">
-            <a:avLst/>
-          </a:prstGeom>
-          <a:noFill/>
-          <a:ln w="15875">
+            <a:off x="645068" y="672454"/>
+            <a:ext cx="90000" cy="90000"/>
+          </a:xfrm>
+          <a:prstGeom prst="ellipse">
+            <a:avLst/>
+          </a:prstGeom>
+          <a:solidFill>
+            <a:schemeClr val="bg1"/>
+          </a:solidFill>
+          <a:ln w="9525">
             <a:solidFill>
               <a:schemeClr val="tx1"/>
             </a:solidFill>
@@ -5227,30 +5244,44 @@
           </a:fontRef>
         </p:style>
         <p:txBody>
-          <a:bodyPr rtlCol="0" anchor="ctr"/>
+          <a:bodyPr lIns="0" tIns="0" rIns="0" bIns="0" rtlCol="0" anchor="ctr"/>
           <a:lstStyle/>
           <a:p>
             <a:pPr algn="ctr"/>
-            <a:endParaRPr lang="de-DE" sz="750"/>
-          </a:p>
-        </p:txBody>
-      </p:sp>
-      <p:sp>
-        <p:nvSpPr>
-          <p:cNvPr id="19" name="Rechteck 18"/>
+            <a:r>
+              <a:rPr lang="de-DE" sz="600" dirty="0" smtClean="0">
+                <a:solidFill>
+                  <a:schemeClr val="tx1"/>
+                </a:solidFill>
+              </a:rPr>
+              <a:t>3</a:t>
+            </a:r>
+            <a:endParaRPr lang="de-DE" sz="600" dirty="0">
+              <a:solidFill>
+                <a:schemeClr val="tx1"/>
+              </a:solidFill>
+            </a:endParaRPr>
+          </a:p>
+        </p:txBody>
+      </p:sp>
+      <p:sp>
+        <p:nvSpPr>
+          <p:cNvPr id="29" name="Ellipse 28"/>
           <p:cNvSpPr/>
           <p:nvPr/>
         </p:nvSpPr>
         <p:spPr>
           <a:xfrm>
-            <a:off x="424964" y="871686"/>
-            <a:ext cx="204098" cy="204098"/>
-          </a:xfrm>
-          <a:prstGeom prst="rect">
-            <a:avLst/>
-          </a:prstGeom>
-          <a:noFill/>
-          <a:ln w="15875">
+            <a:off x="1189960" y="672454"/>
+            <a:ext cx="90000" cy="90000"/>
+          </a:xfrm>
+          <a:prstGeom prst="ellipse">
+            <a:avLst/>
+          </a:prstGeom>
+          <a:solidFill>
+            <a:schemeClr val="bg1"/>
+          </a:solidFill>
+          <a:ln w="9525">
             <a:solidFill>
               <a:schemeClr val="tx1"/>
             </a:solidFill>
@@ -5273,30 +5304,44 @@
           </a:fontRef>
         </p:style>
         <p:txBody>
-          <a:bodyPr rtlCol="0" anchor="ctr"/>
+          <a:bodyPr lIns="0" tIns="0" rIns="0" bIns="0" rtlCol="0" anchor="ctr"/>
           <a:lstStyle/>
           <a:p>
             <a:pPr algn="ctr"/>
-            <a:endParaRPr lang="de-DE" sz="750"/>
-          </a:p>
-        </p:txBody>
-      </p:sp>
-      <p:sp>
-        <p:nvSpPr>
-          <p:cNvPr id="20" name="Rechteck 19"/>
+            <a:r>
+              <a:rPr lang="de-DE" sz="600" dirty="0" smtClean="0">
+                <a:solidFill>
+                  <a:schemeClr val="tx1"/>
+                </a:solidFill>
+              </a:rPr>
+              <a:t>2</a:t>
+            </a:r>
+            <a:endParaRPr lang="de-DE" sz="600" dirty="0">
+              <a:solidFill>
+                <a:schemeClr val="tx1"/>
+              </a:solidFill>
+            </a:endParaRPr>
+          </a:p>
+        </p:txBody>
+      </p:sp>
+      <p:sp>
+        <p:nvSpPr>
+          <p:cNvPr id="30" name="Ellipse 29"/>
           <p:cNvSpPr/>
           <p:nvPr/>
         </p:nvSpPr>
         <p:spPr>
           <a:xfrm>
-            <a:off x="424964" y="1075783"/>
-            <a:ext cx="204098" cy="204098"/>
-          </a:xfrm>
-          <a:prstGeom prst="rect">
-            <a:avLst/>
-          </a:prstGeom>
-          <a:noFill/>
-          <a:ln w="15875">
+            <a:off x="1189960" y="1216714"/>
+            <a:ext cx="90000" cy="90000"/>
+          </a:xfrm>
+          <a:prstGeom prst="ellipse">
+            <a:avLst/>
+          </a:prstGeom>
+          <a:solidFill>
+            <a:schemeClr val="bg1"/>
+          </a:solidFill>
+          <a:ln w="9525">
             <a:solidFill>
               <a:schemeClr val="tx1"/>
             </a:solidFill>
@@ -5319,511 +5364,12 @@
           </a:fontRef>
         </p:style>
         <p:txBody>
-          <a:bodyPr rtlCol="0" anchor="ctr"/>
+          <a:bodyPr lIns="0" tIns="0" rIns="0" bIns="0" rtlCol="0" anchor="ctr"/>
           <a:lstStyle/>
           <a:p>
             <a:pPr algn="ctr"/>
-            <a:endParaRPr lang="de-DE" sz="750"/>
-          </a:p>
-        </p:txBody>
-      </p:sp>
-      <p:sp>
-        <p:nvSpPr>
-          <p:cNvPr id="21" name="Rechteck 20"/>
-          <p:cNvSpPr/>
-          <p:nvPr/>
-        </p:nvSpPr>
-        <p:spPr>
-          <a:xfrm>
-            <a:off x="424964" y="1279881"/>
-            <a:ext cx="204098" cy="204098"/>
-          </a:xfrm>
-          <a:prstGeom prst="rect">
-            <a:avLst/>
-          </a:prstGeom>
-          <a:noFill/>
-          <a:ln w="15875">
-            <a:solidFill>
-              <a:schemeClr val="tx1"/>
-            </a:solidFill>
-          </a:ln>
-        </p:spPr>
-        <p:style>
-          <a:lnRef idx="2">
-            <a:schemeClr val="accent1">
-              <a:shade val="50000"/>
-            </a:schemeClr>
-          </a:lnRef>
-          <a:fillRef idx="1">
-            <a:schemeClr val="accent1"/>
-          </a:fillRef>
-          <a:effectRef idx="0">
-            <a:schemeClr val="accent1"/>
-          </a:effectRef>
-          <a:fontRef idx="minor">
-            <a:schemeClr val="lt1"/>
-          </a:fontRef>
-        </p:style>
-        <p:txBody>
-          <a:bodyPr rtlCol="0" anchor="ctr"/>
-          <a:lstStyle/>
-          <a:p>
-            <a:pPr algn="ctr"/>
-            <a:endParaRPr lang="de-DE" sz="750"/>
-          </a:p>
-        </p:txBody>
-      </p:sp>
-      <p:sp>
-        <p:nvSpPr>
-          <p:cNvPr id="22" name="Rechteck 21"/>
-          <p:cNvSpPr/>
-          <p:nvPr/>
-        </p:nvSpPr>
-        <p:spPr>
-          <a:xfrm>
-            <a:off x="424964" y="1483979"/>
-            <a:ext cx="204098" cy="204098"/>
-          </a:xfrm>
-          <a:prstGeom prst="rect">
-            <a:avLst/>
-          </a:prstGeom>
-          <a:noFill/>
-          <a:ln w="15875">
-            <a:solidFill>
-              <a:schemeClr val="tx1"/>
-            </a:solidFill>
-          </a:ln>
-        </p:spPr>
-        <p:style>
-          <a:lnRef idx="2">
-            <a:schemeClr val="accent1">
-              <a:shade val="50000"/>
-            </a:schemeClr>
-          </a:lnRef>
-          <a:fillRef idx="1">
-            <a:schemeClr val="accent1"/>
-          </a:fillRef>
-          <a:effectRef idx="0">
-            <a:schemeClr val="accent1"/>
-          </a:effectRef>
-          <a:fontRef idx="minor">
-            <a:schemeClr val="lt1"/>
-          </a:fontRef>
-        </p:style>
-        <p:txBody>
-          <a:bodyPr rtlCol="0" anchor="ctr"/>
-          <a:lstStyle/>
-          <a:p>
-            <a:pPr algn="ctr"/>
-            <a:endParaRPr lang="de-DE" sz="750"/>
-          </a:p>
-        </p:txBody>
-      </p:sp>
-      <p:sp>
-        <p:nvSpPr>
-          <p:cNvPr id="23" name="Rechteck 22"/>
-          <p:cNvSpPr/>
-          <p:nvPr/>
-        </p:nvSpPr>
-        <p:spPr>
-          <a:xfrm>
-            <a:off x="427119" y="1688076"/>
-            <a:ext cx="201943" cy="204098"/>
-          </a:xfrm>
-          <a:prstGeom prst="rect">
-            <a:avLst/>
-          </a:prstGeom>
-          <a:noFill/>
-          <a:ln w="15875">
-            <a:solidFill>
-              <a:schemeClr val="tx1"/>
-            </a:solidFill>
-          </a:ln>
-        </p:spPr>
-        <p:style>
-          <a:lnRef idx="2">
-            <a:schemeClr val="accent1">
-              <a:shade val="50000"/>
-            </a:schemeClr>
-          </a:lnRef>
-          <a:fillRef idx="1">
-            <a:schemeClr val="accent1"/>
-          </a:fillRef>
-          <a:effectRef idx="0">
-            <a:schemeClr val="accent1"/>
-          </a:effectRef>
-          <a:fontRef idx="minor">
-            <a:schemeClr val="lt1"/>
-          </a:fontRef>
-        </p:style>
-        <p:txBody>
-          <a:bodyPr rtlCol="0" anchor="ctr"/>
-          <a:lstStyle/>
-          <a:p>
-            <a:pPr algn="ctr"/>
-            <a:endParaRPr lang="de-DE" sz="750"/>
-          </a:p>
-        </p:txBody>
-      </p:sp>
-      <p:sp>
-        <p:nvSpPr>
-          <p:cNvPr id="24" name="Rechteck 23"/>
-          <p:cNvSpPr/>
-          <p:nvPr/>
-        </p:nvSpPr>
-        <p:spPr>
-          <a:xfrm>
-            <a:off x="427119" y="1892174"/>
-            <a:ext cx="201943" cy="204098"/>
-          </a:xfrm>
-          <a:prstGeom prst="rect">
-            <a:avLst/>
-          </a:prstGeom>
-          <a:noFill/>
-          <a:ln w="15875">
-            <a:solidFill>
-              <a:schemeClr val="tx1"/>
-            </a:solidFill>
-          </a:ln>
-        </p:spPr>
-        <p:style>
-          <a:lnRef idx="2">
-            <a:schemeClr val="accent1">
-              <a:shade val="50000"/>
-            </a:schemeClr>
-          </a:lnRef>
-          <a:fillRef idx="1">
-            <a:schemeClr val="accent1"/>
-          </a:fillRef>
-          <a:effectRef idx="0">
-            <a:schemeClr val="accent1"/>
-          </a:effectRef>
-          <a:fontRef idx="minor">
-            <a:schemeClr val="lt1"/>
-          </a:fontRef>
-        </p:style>
-        <p:txBody>
-          <a:bodyPr rtlCol="0" anchor="ctr"/>
-          <a:lstStyle/>
-          <a:p>
-            <a:pPr algn="ctr"/>
-            <a:endParaRPr lang="de-DE" sz="750"/>
-          </a:p>
-        </p:txBody>
-      </p:sp>
-      <p:sp>
-        <p:nvSpPr>
-          <p:cNvPr id="25" name="Rechteck 24"/>
-          <p:cNvSpPr/>
-          <p:nvPr/>
-        </p:nvSpPr>
-        <p:spPr>
-          <a:xfrm>
-            <a:off x="427119" y="2096272"/>
-            <a:ext cx="201943" cy="204098"/>
-          </a:xfrm>
-          <a:prstGeom prst="rect">
-            <a:avLst/>
-          </a:prstGeom>
-          <a:noFill/>
-          <a:ln w="15875">
-            <a:solidFill>
-              <a:schemeClr val="tx1"/>
-            </a:solidFill>
-          </a:ln>
-        </p:spPr>
-        <p:style>
-          <a:lnRef idx="2">
-            <a:schemeClr val="accent1">
-              <a:shade val="50000"/>
-            </a:schemeClr>
-          </a:lnRef>
-          <a:fillRef idx="1">
-            <a:schemeClr val="accent1"/>
-          </a:fillRef>
-          <a:effectRef idx="0">
-            <a:schemeClr val="accent1"/>
-          </a:effectRef>
-          <a:fontRef idx="minor">
-            <a:schemeClr val="lt1"/>
-          </a:fontRef>
-        </p:style>
-        <p:txBody>
-          <a:bodyPr rtlCol="0" anchor="ctr"/>
-          <a:lstStyle/>
-          <a:p>
-            <a:pPr algn="ctr"/>
-            <a:endParaRPr lang="de-DE" sz="750"/>
-          </a:p>
-        </p:txBody>
-      </p:sp>
-      <p:sp>
-        <p:nvSpPr>
-          <p:cNvPr id="26" name="Rechteck 25"/>
-          <p:cNvSpPr/>
-          <p:nvPr/>
-        </p:nvSpPr>
-        <p:spPr>
-          <a:xfrm>
-            <a:off x="427119" y="2300370"/>
-            <a:ext cx="201943" cy="204098"/>
-          </a:xfrm>
-          <a:prstGeom prst="rect">
-            <a:avLst/>
-          </a:prstGeom>
-          <a:noFill/>
-          <a:ln w="15875">
-            <a:solidFill>
-              <a:schemeClr val="tx1"/>
-            </a:solidFill>
-          </a:ln>
-        </p:spPr>
-        <p:style>
-          <a:lnRef idx="2">
-            <a:schemeClr val="accent1">
-              <a:shade val="50000"/>
-            </a:schemeClr>
-          </a:lnRef>
-          <a:fillRef idx="1">
-            <a:schemeClr val="accent1"/>
-          </a:fillRef>
-          <a:effectRef idx="0">
-            <a:schemeClr val="accent1"/>
-          </a:effectRef>
-          <a:fontRef idx="minor">
-            <a:schemeClr val="lt1"/>
-          </a:fontRef>
-        </p:style>
-        <p:txBody>
-          <a:bodyPr rtlCol="0" anchor="ctr"/>
-          <a:lstStyle/>
-          <a:p>
-            <a:pPr algn="ctr"/>
-            <a:endParaRPr lang="de-DE" sz="750"/>
-          </a:p>
-        </p:txBody>
-      </p:sp>
-      <p:sp>
-        <p:nvSpPr>
-          <p:cNvPr id="27" name="Ellipse 26"/>
-          <p:cNvSpPr/>
-          <p:nvPr/>
-        </p:nvSpPr>
-        <p:spPr>
-          <a:xfrm>
-            <a:off x="988639" y="1843489"/>
-            <a:ext cx="102049" cy="102049"/>
-          </a:xfrm>
-          <a:prstGeom prst="ellipse">
-            <a:avLst/>
-          </a:prstGeom>
-          <a:solidFill>
-            <a:schemeClr val="bg1"/>
-          </a:solidFill>
-          <a:ln w="15875">
-            <a:solidFill>
-              <a:schemeClr val="tx1"/>
-            </a:solidFill>
-          </a:ln>
-        </p:spPr>
-        <p:style>
-          <a:lnRef idx="2">
-            <a:schemeClr val="accent1">
-              <a:shade val="50000"/>
-            </a:schemeClr>
-          </a:lnRef>
-          <a:fillRef idx="1">
-            <a:schemeClr val="accent1"/>
-          </a:fillRef>
-          <a:effectRef idx="0">
-            <a:schemeClr val="accent1"/>
-          </a:effectRef>
-          <a:fontRef idx="minor">
-            <a:schemeClr val="lt1"/>
-          </a:fontRef>
-        </p:style>
-        <p:txBody>
-          <a:bodyPr rtlCol="0" anchor="ctr"/>
-          <a:lstStyle/>
-          <a:p>
-            <a:pPr algn="ctr"/>
-            <a:r>
-              <a:rPr lang="de-DE" sz="750" dirty="0">
-                <a:solidFill>
-                  <a:schemeClr val="tx1"/>
-                </a:solidFill>
-              </a:rPr>
-              <a:t>1</a:t>
-            </a:r>
-          </a:p>
-        </p:txBody>
-      </p:sp>
-      <p:sp>
-        <p:nvSpPr>
-          <p:cNvPr id="28" name="Ellipse 27"/>
-          <p:cNvSpPr/>
-          <p:nvPr/>
-        </p:nvSpPr>
-        <p:spPr>
-          <a:xfrm>
-            <a:off x="988639" y="1027098"/>
-            <a:ext cx="102049" cy="102049"/>
-          </a:xfrm>
-          <a:prstGeom prst="ellipse">
-            <a:avLst/>
-          </a:prstGeom>
-          <a:solidFill>
-            <a:schemeClr val="bg1"/>
-          </a:solidFill>
-          <a:ln w="15875">
-            <a:solidFill>
-              <a:schemeClr val="tx1"/>
-            </a:solidFill>
-          </a:ln>
-        </p:spPr>
-        <p:style>
-          <a:lnRef idx="2">
-            <a:schemeClr val="accent1">
-              <a:shade val="50000"/>
-            </a:schemeClr>
-          </a:lnRef>
-          <a:fillRef idx="1">
-            <a:schemeClr val="accent1"/>
-          </a:fillRef>
-          <a:effectRef idx="0">
-            <a:schemeClr val="accent1"/>
-          </a:effectRef>
-          <a:fontRef idx="minor">
-            <a:schemeClr val="lt1"/>
-          </a:fontRef>
-        </p:style>
-        <p:txBody>
-          <a:bodyPr rtlCol="0" anchor="ctr"/>
-          <a:lstStyle/>
-          <a:p>
-            <a:pPr algn="ctr"/>
-            <a:r>
-              <a:rPr lang="de-DE" sz="750" dirty="0" smtClean="0">
-                <a:solidFill>
-                  <a:schemeClr val="tx1"/>
-                </a:solidFill>
-              </a:rPr>
-              <a:t>3</a:t>
-            </a:r>
-            <a:endParaRPr lang="de-DE" sz="750" dirty="0">
-              <a:solidFill>
-                <a:schemeClr val="tx1"/>
-              </a:solidFill>
-            </a:endParaRPr>
-          </a:p>
-        </p:txBody>
-      </p:sp>
-      <p:sp>
-        <p:nvSpPr>
-          <p:cNvPr id="29" name="Ellipse 28"/>
-          <p:cNvSpPr/>
-          <p:nvPr/>
-        </p:nvSpPr>
-        <p:spPr>
-          <a:xfrm>
-            <a:off x="1805494" y="1027098"/>
-            <a:ext cx="102049" cy="102049"/>
-          </a:xfrm>
-          <a:prstGeom prst="ellipse">
-            <a:avLst/>
-          </a:prstGeom>
-          <a:solidFill>
-            <a:schemeClr val="bg1"/>
-          </a:solidFill>
-          <a:ln w="15875">
-            <a:solidFill>
-              <a:schemeClr val="tx1"/>
-            </a:solidFill>
-          </a:ln>
-        </p:spPr>
-        <p:style>
-          <a:lnRef idx="2">
-            <a:schemeClr val="accent1">
-              <a:shade val="50000"/>
-            </a:schemeClr>
-          </a:lnRef>
-          <a:fillRef idx="1">
-            <a:schemeClr val="accent1"/>
-          </a:fillRef>
-          <a:effectRef idx="0">
-            <a:schemeClr val="accent1"/>
-          </a:effectRef>
-          <a:fontRef idx="minor">
-            <a:schemeClr val="lt1"/>
-          </a:fontRef>
-        </p:style>
-        <p:txBody>
-          <a:bodyPr rtlCol="0" anchor="ctr"/>
-          <a:lstStyle/>
-          <a:p>
-            <a:pPr algn="ctr"/>
-            <a:r>
-              <a:rPr lang="de-DE" sz="750" dirty="0" smtClean="0">
-                <a:solidFill>
-                  <a:schemeClr val="tx1"/>
-                </a:solidFill>
-              </a:rPr>
-              <a:t>2</a:t>
-            </a:r>
-            <a:endParaRPr lang="de-DE" sz="750" dirty="0">
-              <a:solidFill>
-                <a:schemeClr val="tx1"/>
-              </a:solidFill>
-            </a:endParaRPr>
-          </a:p>
-        </p:txBody>
-      </p:sp>
-      <p:sp>
-        <p:nvSpPr>
-          <p:cNvPr id="30" name="Ellipse 29"/>
-          <p:cNvSpPr/>
-          <p:nvPr/>
-        </p:nvSpPr>
-        <p:spPr>
-          <a:xfrm>
-            <a:off x="1805494" y="1843489"/>
-            <a:ext cx="102049" cy="102049"/>
-          </a:xfrm>
-          <a:prstGeom prst="ellipse">
-            <a:avLst/>
-          </a:prstGeom>
-          <a:solidFill>
-            <a:schemeClr val="bg1"/>
-          </a:solidFill>
-          <a:ln w="15875">
-            <a:solidFill>
-              <a:schemeClr val="tx1"/>
-            </a:solidFill>
-          </a:ln>
-        </p:spPr>
-        <p:style>
-          <a:lnRef idx="2">
-            <a:schemeClr val="accent1">
-              <a:shade val="50000"/>
-            </a:schemeClr>
-          </a:lnRef>
-          <a:fillRef idx="1">
-            <a:schemeClr val="accent1"/>
-          </a:fillRef>
-          <a:effectRef idx="0">
-            <a:schemeClr val="accent1"/>
-          </a:effectRef>
-          <a:fontRef idx="minor">
-            <a:schemeClr val="lt1"/>
-          </a:fontRef>
-        </p:style>
-        <p:txBody>
-          <a:bodyPr rtlCol="0" anchor="ctr"/>
-          <a:lstStyle/>
-          <a:p>
-            <a:pPr algn="ctr"/>
-            <a:r>
-              <a:rPr lang="de-DE" sz="750" dirty="0">
+            <a:r>
+              <a:rPr lang="de-DE" sz="600" dirty="0">
                 <a:solidFill>
                   <a:schemeClr val="tx1"/>
                 </a:solidFill>
@@ -5844,13 +5390,13 @@
         </p:nvCxnSpPr>
         <p:spPr>
           <a:xfrm flipV="1">
-            <a:off x="1075743" y="1114202"/>
-            <a:ext cx="744696" cy="744232"/>
+            <a:off x="721888" y="749274"/>
+            <a:ext cx="481252" cy="480620"/>
           </a:xfrm>
           <a:prstGeom prst="straightConnector1">
             <a:avLst/>
           </a:prstGeom>
-          <a:ln w="15875">
+          <a:ln w="9525">
             <a:solidFill>
               <a:schemeClr val="tx1"/>
             </a:solidFill>
@@ -5884,13 +5430,13 @@
         </p:nvCxnSpPr>
         <p:spPr>
           <a:xfrm>
-            <a:off x="1075743" y="1114202"/>
-            <a:ext cx="744696" cy="744232"/>
+            <a:off x="721888" y="749274"/>
+            <a:ext cx="481252" cy="480620"/>
           </a:xfrm>
           <a:prstGeom prst="straightConnector1">
             <a:avLst/>
           </a:prstGeom>
-          <a:ln w="15875">
+          <a:ln w="9525">
             <a:solidFill>
               <a:schemeClr val="tx1"/>
             </a:solidFill>
@@ -5918,19 +5464,18 @@
           <p:cNvPr id="36" name="Gerade Verbindung mit Pfeil 35"/>
           <p:cNvCxnSpPr>
             <a:stCxn id="29" idx="2"/>
-            <a:endCxn id="28" idx="6"/>
           </p:cNvCxnSpPr>
           <p:nvPr/>
         </p:nvCxnSpPr>
         <p:spPr>
           <a:xfrm flipH="1">
-            <a:off x="1090688" y="1078123"/>
-            <a:ext cx="714806" cy="0"/>
+            <a:off x="735068" y="717454"/>
+            <a:ext cx="454892" cy="0"/>
           </a:xfrm>
           <a:prstGeom prst="straightConnector1">
             <a:avLst/>
           </a:prstGeom>
-          <a:ln w="15875">
+          <a:ln w="9525">
             <a:solidFill>
               <a:schemeClr val="tx1"/>
             </a:solidFill>
@@ -5964,13 +5509,13 @@
         </p:nvCxnSpPr>
         <p:spPr>
           <a:xfrm flipH="1">
-            <a:off x="1090688" y="1894513"/>
-            <a:ext cx="714806" cy="0"/>
+            <a:off x="735068" y="1261714"/>
+            <a:ext cx="454892" cy="0"/>
           </a:xfrm>
           <a:prstGeom prst="straightConnector1">
             <a:avLst/>
           </a:prstGeom>
-          <a:ln w="15875">
+          <a:ln w="9525">
             <a:solidFill>
               <a:schemeClr val="tx1"/>
             </a:solidFill>
@@ -6001,8 +5546,8 @@
         </p:nvSpPr>
         <p:spPr>
           <a:xfrm>
-            <a:off x="249661" y="2383118"/>
-            <a:ext cx="232756" cy="207749"/>
+            <a:off x="219320" y="1609772"/>
+            <a:ext cx="38472" cy="92333"/>
           </a:xfrm>
           <a:prstGeom prst="rect">
             <a:avLst/>
@@ -6010,13 +5555,14 @@
           <a:noFill/>
         </p:spPr>
         <p:txBody>
-          <a:bodyPr wrap="none" rtlCol="0">
+          <a:bodyPr wrap="none" lIns="0" tIns="0" rIns="0" bIns="0" rtlCol="0">
             <a:spAutoFit/>
           </a:bodyPr>
           <a:lstStyle/>
           <a:p>
-            <a:r>
-              <a:rPr lang="de-DE" sz="750" dirty="0"/>
+            <a:pPr algn="r"/>
+            <a:r>
+              <a:rPr lang="de-DE" sz="600" dirty="0"/>
               <a:t>0</a:t>
             </a:r>
           </a:p>
@@ -6030,8 +5576,8 @@
         </p:nvSpPr>
         <p:spPr>
           <a:xfrm>
-            <a:off x="251815" y="359293"/>
-            <a:ext cx="232756" cy="207749"/>
+            <a:off x="220756" y="260555"/>
+            <a:ext cx="38472" cy="92333"/>
           </a:xfrm>
           <a:prstGeom prst="rect">
             <a:avLst/>
@@ -6039,13 +5585,14 @@
           <a:noFill/>
         </p:spPr>
         <p:txBody>
-          <a:bodyPr wrap="none" rtlCol="0">
+          <a:bodyPr wrap="none" lIns="0" tIns="0" rIns="0" bIns="0" rtlCol="0">
             <a:spAutoFit/>
           </a:bodyPr>
           <a:lstStyle/>
           <a:p>
-            <a:r>
-              <a:rPr lang="de-DE" sz="750" dirty="0"/>
+            <a:pPr algn="r"/>
+            <a:r>
+              <a:rPr lang="de-DE" sz="600" dirty="0"/>
               <a:t>1</a:t>
             </a:r>
           </a:p>
@@ -6053,14 +5600,14 @@
       </p:sp>
       <p:sp>
         <p:nvSpPr>
-          <p:cNvPr id="44" name="Textfeld 43"/>
+          <p:cNvPr id="46" name="Textfeld 45"/>
           <p:cNvSpPr txBox="1"/>
           <p:nvPr/>
         </p:nvSpPr>
         <p:spPr>
           <a:xfrm>
-            <a:off x="308586" y="283836"/>
-            <a:ext cx="232756" cy="207749"/>
+            <a:off x="161612" y="1487678"/>
+            <a:ext cx="96180" cy="92333"/>
           </a:xfrm>
           <a:prstGeom prst="rect">
             <a:avLst/>
@@ -6068,71 +5615,14 @@
           <a:noFill/>
         </p:spPr>
         <p:txBody>
-          <a:bodyPr wrap="none" rtlCol="0">
+          <a:bodyPr wrap="none" lIns="0" tIns="0" rIns="0" bIns="0" rtlCol="0">
             <a:spAutoFit/>
           </a:bodyPr>
           <a:lstStyle/>
           <a:p>
-            <a:r>
-              <a:rPr lang="de-DE" sz="750" dirty="0"/>
-              <a:t>0</a:t>
-            </a:r>
-          </a:p>
-        </p:txBody>
-      </p:sp>
-      <p:sp>
-        <p:nvSpPr>
-          <p:cNvPr id="45" name="Textfeld 44"/>
-          <p:cNvSpPr txBox="1"/>
-          <p:nvPr/>
-        </p:nvSpPr>
-        <p:spPr>
-          <a:xfrm>
-            <a:off x="2348355" y="283836"/>
-            <a:ext cx="232756" cy="207749"/>
-          </a:xfrm>
-          <a:prstGeom prst="rect">
-            <a:avLst/>
-          </a:prstGeom>
-          <a:noFill/>
-        </p:spPr>
-        <p:txBody>
-          <a:bodyPr wrap="none" rtlCol="0">
-            <a:spAutoFit/>
-          </a:bodyPr>
-          <a:lstStyle/>
-          <a:p>
-            <a:r>
-              <a:rPr lang="de-DE" sz="750" dirty="0"/>
-              <a:t>1</a:t>
-            </a:r>
-          </a:p>
-        </p:txBody>
-      </p:sp>
-      <p:sp>
-        <p:nvSpPr>
-          <p:cNvPr id="46" name="Textfeld 45"/>
-          <p:cNvSpPr txBox="1"/>
-          <p:nvPr/>
-        </p:nvSpPr>
-        <p:spPr>
-          <a:xfrm>
-            <a:off x="176324" y="2179020"/>
-            <a:ext cx="304892" cy="207749"/>
-          </a:xfrm>
-          <a:prstGeom prst="rect">
-            <a:avLst/>
-          </a:prstGeom>
-          <a:noFill/>
-        </p:spPr>
-        <p:txBody>
-          <a:bodyPr wrap="none" rtlCol="0">
-            <a:spAutoFit/>
-          </a:bodyPr>
-          <a:lstStyle/>
-          <a:p>
-            <a:r>
-              <a:rPr lang="de-DE" sz="750" dirty="0"/>
+            <a:pPr algn="r"/>
+            <a:r>
+              <a:rPr lang="de-DE" sz="600" dirty="0"/>
               <a:t>0.1</a:t>
             </a:r>
           </a:p>
@@ -6140,43 +5630,14 @@
       </p:sp>
       <p:sp>
         <p:nvSpPr>
-          <p:cNvPr id="47" name="Textfeld 46"/>
-          <p:cNvSpPr txBox="1"/>
-          <p:nvPr/>
-        </p:nvSpPr>
-        <p:spPr>
-          <a:xfrm>
-            <a:off x="471414" y="283836"/>
-            <a:ext cx="304892" cy="207749"/>
-          </a:xfrm>
-          <a:prstGeom prst="rect">
-            <a:avLst/>
-          </a:prstGeom>
-          <a:noFill/>
-        </p:spPr>
-        <p:txBody>
-          <a:bodyPr wrap="none" rtlCol="0">
-            <a:spAutoFit/>
-          </a:bodyPr>
-          <a:lstStyle/>
-          <a:p>
-            <a:r>
-              <a:rPr lang="de-DE" sz="750" dirty="0"/>
-              <a:t>0.1</a:t>
-            </a:r>
-          </a:p>
-        </p:txBody>
-      </p:sp>
-      <p:sp>
-        <p:nvSpPr>
-          <p:cNvPr id="37" name="Abgerundetes Rechteck 36"/>
+          <p:cNvPr id="4" name="Abgerundetes Rechteck 3"/>
           <p:cNvSpPr/>
           <p:nvPr/>
         </p:nvSpPr>
         <p:spPr>
           <a:xfrm>
-            <a:off x="1075046" y="2038418"/>
-            <a:ext cx="737469" cy="228070"/>
+            <a:off x="690068" y="1390748"/>
+            <a:ext cx="544892" cy="152047"/>
           </a:xfrm>
           <a:prstGeom prst="roundRect">
             <a:avLst/>
@@ -6207,12 +5668,12 @@
           </a:fontRef>
         </p:style>
         <p:txBody>
-          <a:bodyPr rtlCol="0" anchor="ctr"/>
+          <a:bodyPr lIns="0" tIns="0" rIns="0" bIns="0" rtlCol="0" anchor="ctr"/>
           <a:lstStyle/>
           <a:p>
             <a:pPr algn="ctr"/>
             <a:r>
-              <a:rPr lang="de-DE" sz="750" dirty="0" err="1">
+              <a:rPr lang="de-DE" sz="700" b="1" dirty="0" err="1">
                 <a:solidFill>
                   <a:schemeClr val="tx1"/>
                 </a:solidFill>
@@ -6220,7 +5681,7 @@
               <a:t>Patrol</a:t>
             </a:r>
             <a:r>
-              <a:rPr lang="de-DE" sz="750" dirty="0">
+              <a:rPr lang="de-DE" sz="700" b="1" dirty="0">
                 <a:solidFill>
                   <a:schemeClr val="tx1"/>
                 </a:solidFill>
@@ -6228,14 +5689,14 @@
               <a:t> Plan </a:t>
             </a:r>
             <a:r>
-              <a:rPr lang="de-DE" sz="750" dirty="0" smtClean="0">
+              <a:rPr lang="de-DE" sz="700" b="1" dirty="0" smtClean="0">
                 <a:solidFill>
                   <a:schemeClr val="tx1"/>
                 </a:solidFill>
               </a:rPr>
               <a:t>3</a:t>
             </a:r>
-            <a:endParaRPr lang="en-US" sz="750" dirty="0">
+            <a:endParaRPr lang="en-US" sz="700" b="1" dirty="0">
               <a:solidFill>
                 <a:schemeClr val="tx1"/>
               </a:solidFill>
@@ -6243,10 +5704,560 @@
           </a:p>
         </p:txBody>
       </p:sp>
+      <p:sp>
+        <p:nvSpPr>
+          <p:cNvPr id="44" name="Textfeld 43"/>
+          <p:cNvSpPr txBox="1"/>
+          <p:nvPr/>
+        </p:nvSpPr>
+        <p:spPr>
+          <a:xfrm>
+            <a:off x="262732" y="208421"/>
+            <a:ext cx="38472" cy="92333"/>
+          </a:xfrm>
+          <a:prstGeom prst="rect">
+            <a:avLst/>
+          </a:prstGeom>
+          <a:noFill/>
+        </p:spPr>
+        <p:txBody>
+          <a:bodyPr wrap="none" lIns="0" tIns="0" rIns="0" bIns="0" rtlCol="0">
+            <a:spAutoFit/>
+          </a:bodyPr>
+          <a:lstStyle/>
+          <a:p>
+            <a:pPr algn="ctr"/>
+            <a:r>
+              <a:rPr lang="de-DE" sz="600" dirty="0"/>
+              <a:t>0</a:t>
+            </a:r>
+          </a:p>
+        </p:txBody>
+      </p:sp>
+      <p:sp>
+        <p:nvSpPr>
+          <p:cNvPr id="45" name="Textfeld 44"/>
+          <p:cNvSpPr txBox="1"/>
+          <p:nvPr/>
+        </p:nvSpPr>
+        <p:spPr>
+          <a:xfrm>
+            <a:off x="1622578" y="208421"/>
+            <a:ext cx="38472" cy="92333"/>
+          </a:xfrm>
+          <a:prstGeom prst="rect">
+            <a:avLst/>
+          </a:prstGeom>
+          <a:noFill/>
+        </p:spPr>
+        <p:txBody>
+          <a:bodyPr wrap="none" lIns="0" tIns="0" rIns="0" bIns="0" rtlCol="0">
+            <a:spAutoFit/>
+          </a:bodyPr>
+          <a:lstStyle/>
+          <a:p>
+            <a:pPr algn="ctr"/>
+            <a:r>
+              <a:rPr lang="de-DE" sz="600" dirty="0"/>
+              <a:t>1</a:t>
+            </a:r>
+          </a:p>
+        </p:txBody>
+      </p:sp>
+      <p:sp>
+        <p:nvSpPr>
+          <p:cNvPr id="47" name="Textfeld 46"/>
+          <p:cNvSpPr txBox="1"/>
+          <p:nvPr/>
+        </p:nvSpPr>
+        <p:spPr>
+          <a:xfrm>
+            <a:off x="371284" y="208421"/>
+            <a:ext cx="96180" cy="92333"/>
+          </a:xfrm>
+          <a:prstGeom prst="rect">
+            <a:avLst/>
+          </a:prstGeom>
+          <a:noFill/>
+        </p:spPr>
+        <p:txBody>
+          <a:bodyPr wrap="none" lIns="0" tIns="0" rIns="0" bIns="0" rtlCol="0">
+            <a:spAutoFit/>
+          </a:bodyPr>
+          <a:lstStyle/>
+          <a:p>
+            <a:pPr algn="ctr"/>
+            <a:r>
+              <a:rPr lang="de-DE" sz="600" dirty="0"/>
+              <a:t>0.1</a:t>
+            </a:r>
+          </a:p>
+        </p:txBody>
+      </p:sp>
+      <p:sp>
+        <p:nvSpPr>
+          <p:cNvPr id="37" name="Rechteck 36"/>
+          <p:cNvSpPr/>
+          <p:nvPr/>
+        </p:nvSpPr>
+        <p:spPr>
+          <a:xfrm>
+            <a:off x="281873" y="309259"/>
+            <a:ext cx="137502" cy="136065"/>
+          </a:xfrm>
+          <a:prstGeom prst="rect">
+            <a:avLst/>
+          </a:prstGeom>
+          <a:noFill/>
+          <a:ln w="9525">
+            <a:solidFill>
+              <a:schemeClr val="tx1"/>
+            </a:solidFill>
+          </a:ln>
+        </p:spPr>
+        <p:style>
+          <a:lnRef idx="2">
+            <a:schemeClr val="accent1">
+              <a:shade val="50000"/>
+            </a:schemeClr>
+          </a:lnRef>
+          <a:fillRef idx="1">
+            <a:schemeClr val="accent1"/>
+          </a:fillRef>
+          <a:effectRef idx="0">
+            <a:schemeClr val="accent1"/>
+          </a:effectRef>
+          <a:fontRef idx="minor">
+            <a:schemeClr val="lt1"/>
+          </a:fontRef>
+        </p:style>
+        <p:txBody>
+          <a:bodyPr lIns="0" tIns="0" rIns="0" bIns="0" rtlCol="0" anchor="ctr"/>
+          <a:lstStyle/>
+          <a:p>
+            <a:pPr algn="ctr"/>
+            <a:endParaRPr lang="de-DE" sz="600"/>
+          </a:p>
+        </p:txBody>
+      </p:sp>
+      <p:sp>
+        <p:nvSpPr>
+          <p:cNvPr id="38" name="Rechteck 37"/>
+          <p:cNvSpPr/>
+          <p:nvPr/>
+        </p:nvSpPr>
+        <p:spPr>
+          <a:xfrm>
+            <a:off x="281873" y="445324"/>
+            <a:ext cx="137502" cy="136065"/>
+          </a:xfrm>
+          <a:prstGeom prst="rect">
+            <a:avLst/>
+          </a:prstGeom>
+          <a:noFill/>
+          <a:ln w="9525">
+            <a:solidFill>
+              <a:schemeClr val="tx1"/>
+            </a:solidFill>
+          </a:ln>
+        </p:spPr>
+        <p:style>
+          <a:lnRef idx="2">
+            <a:schemeClr val="accent1">
+              <a:shade val="50000"/>
+            </a:schemeClr>
+          </a:lnRef>
+          <a:fillRef idx="1">
+            <a:schemeClr val="accent1"/>
+          </a:fillRef>
+          <a:effectRef idx="0">
+            <a:schemeClr val="accent1"/>
+          </a:effectRef>
+          <a:fontRef idx="minor">
+            <a:schemeClr val="lt1"/>
+          </a:fontRef>
+        </p:style>
+        <p:txBody>
+          <a:bodyPr lIns="0" tIns="0" rIns="0" bIns="0" rtlCol="0" anchor="ctr"/>
+          <a:lstStyle/>
+          <a:p>
+            <a:pPr algn="ctr"/>
+            <a:endParaRPr lang="de-DE" sz="600"/>
+          </a:p>
+        </p:txBody>
+      </p:sp>
+      <p:sp>
+        <p:nvSpPr>
+          <p:cNvPr id="40" name="Rechteck 39"/>
+          <p:cNvSpPr/>
+          <p:nvPr/>
+        </p:nvSpPr>
+        <p:spPr>
+          <a:xfrm>
+            <a:off x="281873" y="581389"/>
+            <a:ext cx="137502" cy="136065"/>
+          </a:xfrm>
+          <a:prstGeom prst="rect">
+            <a:avLst/>
+          </a:prstGeom>
+          <a:noFill/>
+          <a:ln w="9525">
+            <a:solidFill>
+              <a:schemeClr val="tx1"/>
+            </a:solidFill>
+          </a:ln>
+        </p:spPr>
+        <p:style>
+          <a:lnRef idx="2">
+            <a:schemeClr val="accent1">
+              <a:shade val="50000"/>
+            </a:schemeClr>
+          </a:lnRef>
+          <a:fillRef idx="1">
+            <a:schemeClr val="accent1"/>
+          </a:fillRef>
+          <a:effectRef idx="0">
+            <a:schemeClr val="accent1"/>
+          </a:effectRef>
+          <a:fontRef idx="minor">
+            <a:schemeClr val="lt1"/>
+          </a:fontRef>
+        </p:style>
+        <p:txBody>
+          <a:bodyPr lIns="0" tIns="0" rIns="0" bIns="0" rtlCol="0" anchor="ctr"/>
+          <a:lstStyle/>
+          <a:p>
+            <a:pPr algn="ctr"/>
+            <a:endParaRPr lang="de-DE" sz="600"/>
+          </a:p>
+        </p:txBody>
+      </p:sp>
+      <p:sp>
+        <p:nvSpPr>
+          <p:cNvPr id="41" name="Rechteck 40"/>
+          <p:cNvSpPr/>
+          <p:nvPr/>
+        </p:nvSpPr>
+        <p:spPr>
+          <a:xfrm>
+            <a:off x="281873" y="717454"/>
+            <a:ext cx="137502" cy="136065"/>
+          </a:xfrm>
+          <a:prstGeom prst="rect">
+            <a:avLst/>
+          </a:prstGeom>
+          <a:noFill/>
+          <a:ln w="9525">
+            <a:solidFill>
+              <a:schemeClr val="tx1"/>
+            </a:solidFill>
+          </a:ln>
+        </p:spPr>
+        <p:style>
+          <a:lnRef idx="2">
+            <a:schemeClr val="accent1">
+              <a:shade val="50000"/>
+            </a:schemeClr>
+          </a:lnRef>
+          <a:fillRef idx="1">
+            <a:schemeClr val="accent1"/>
+          </a:fillRef>
+          <a:effectRef idx="0">
+            <a:schemeClr val="accent1"/>
+          </a:effectRef>
+          <a:fontRef idx="minor">
+            <a:schemeClr val="lt1"/>
+          </a:fontRef>
+        </p:style>
+        <p:txBody>
+          <a:bodyPr lIns="0" tIns="0" rIns="0" bIns="0" rtlCol="0" anchor="ctr"/>
+          <a:lstStyle/>
+          <a:p>
+            <a:pPr algn="ctr"/>
+            <a:endParaRPr lang="de-DE" sz="600"/>
+          </a:p>
+        </p:txBody>
+      </p:sp>
+      <p:sp>
+        <p:nvSpPr>
+          <p:cNvPr id="48" name="Rechteck 47"/>
+          <p:cNvSpPr/>
+          <p:nvPr/>
+        </p:nvSpPr>
+        <p:spPr>
+          <a:xfrm>
+            <a:off x="281873" y="853519"/>
+            <a:ext cx="137502" cy="136065"/>
+          </a:xfrm>
+          <a:prstGeom prst="rect">
+            <a:avLst/>
+          </a:prstGeom>
+          <a:noFill/>
+          <a:ln w="9525">
+            <a:solidFill>
+              <a:schemeClr val="tx1"/>
+            </a:solidFill>
+          </a:ln>
+        </p:spPr>
+        <p:style>
+          <a:lnRef idx="2">
+            <a:schemeClr val="accent1">
+              <a:shade val="50000"/>
+            </a:schemeClr>
+          </a:lnRef>
+          <a:fillRef idx="1">
+            <a:schemeClr val="accent1"/>
+          </a:fillRef>
+          <a:effectRef idx="0">
+            <a:schemeClr val="accent1"/>
+          </a:effectRef>
+          <a:fontRef idx="minor">
+            <a:schemeClr val="lt1"/>
+          </a:fontRef>
+        </p:style>
+        <p:txBody>
+          <a:bodyPr lIns="0" tIns="0" rIns="0" bIns="0" rtlCol="0" anchor="ctr"/>
+          <a:lstStyle/>
+          <a:p>
+            <a:pPr algn="ctr"/>
+            <a:endParaRPr lang="de-DE" sz="600"/>
+          </a:p>
+        </p:txBody>
+      </p:sp>
+      <p:sp>
+        <p:nvSpPr>
+          <p:cNvPr id="49" name="Rechteck 48"/>
+          <p:cNvSpPr/>
+          <p:nvPr/>
+        </p:nvSpPr>
+        <p:spPr>
+          <a:xfrm>
+            <a:off x="281873" y="989584"/>
+            <a:ext cx="137502" cy="136065"/>
+          </a:xfrm>
+          <a:prstGeom prst="rect">
+            <a:avLst/>
+          </a:prstGeom>
+          <a:noFill/>
+          <a:ln w="9525">
+            <a:solidFill>
+              <a:schemeClr val="tx1"/>
+            </a:solidFill>
+          </a:ln>
+        </p:spPr>
+        <p:style>
+          <a:lnRef idx="2">
+            <a:schemeClr val="accent1">
+              <a:shade val="50000"/>
+            </a:schemeClr>
+          </a:lnRef>
+          <a:fillRef idx="1">
+            <a:schemeClr val="accent1"/>
+          </a:fillRef>
+          <a:effectRef idx="0">
+            <a:schemeClr val="accent1"/>
+          </a:effectRef>
+          <a:fontRef idx="minor">
+            <a:schemeClr val="lt1"/>
+          </a:fontRef>
+        </p:style>
+        <p:txBody>
+          <a:bodyPr lIns="0" tIns="0" rIns="0" bIns="0" rtlCol="0" anchor="ctr"/>
+          <a:lstStyle/>
+          <a:p>
+            <a:pPr algn="ctr"/>
+            <a:endParaRPr lang="de-DE" sz="600"/>
+          </a:p>
+        </p:txBody>
+      </p:sp>
+      <p:sp>
+        <p:nvSpPr>
+          <p:cNvPr id="50" name="Rechteck 49"/>
+          <p:cNvSpPr/>
+          <p:nvPr/>
+        </p:nvSpPr>
+        <p:spPr>
+          <a:xfrm>
+            <a:off x="281872" y="1125649"/>
+            <a:ext cx="137503" cy="136065"/>
+          </a:xfrm>
+          <a:prstGeom prst="rect">
+            <a:avLst/>
+          </a:prstGeom>
+          <a:noFill/>
+          <a:ln w="9525">
+            <a:solidFill>
+              <a:schemeClr val="tx1"/>
+            </a:solidFill>
+          </a:ln>
+        </p:spPr>
+        <p:style>
+          <a:lnRef idx="2">
+            <a:schemeClr val="accent1">
+              <a:shade val="50000"/>
+            </a:schemeClr>
+          </a:lnRef>
+          <a:fillRef idx="1">
+            <a:schemeClr val="accent1"/>
+          </a:fillRef>
+          <a:effectRef idx="0">
+            <a:schemeClr val="accent1"/>
+          </a:effectRef>
+          <a:fontRef idx="minor">
+            <a:schemeClr val="lt1"/>
+          </a:fontRef>
+        </p:style>
+        <p:txBody>
+          <a:bodyPr lIns="0" tIns="0" rIns="0" bIns="0" rtlCol="0" anchor="ctr"/>
+          <a:lstStyle/>
+          <a:p>
+            <a:pPr algn="ctr"/>
+            <a:endParaRPr lang="de-DE" sz="600"/>
+          </a:p>
+        </p:txBody>
+      </p:sp>
+      <p:sp>
+        <p:nvSpPr>
+          <p:cNvPr id="51" name="Rechteck 50"/>
+          <p:cNvSpPr/>
+          <p:nvPr/>
+        </p:nvSpPr>
+        <p:spPr>
+          <a:xfrm>
+            <a:off x="281872" y="1261714"/>
+            <a:ext cx="137503" cy="136065"/>
+          </a:xfrm>
+          <a:prstGeom prst="rect">
+            <a:avLst/>
+          </a:prstGeom>
+          <a:noFill/>
+          <a:ln w="9525">
+            <a:solidFill>
+              <a:schemeClr val="tx1"/>
+            </a:solidFill>
+          </a:ln>
+        </p:spPr>
+        <p:style>
+          <a:lnRef idx="2">
+            <a:schemeClr val="accent1">
+              <a:shade val="50000"/>
+            </a:schemeClr>
+          </a:lnRef>
+          <a:fillRef idx="1">
+            <a:schemeClr val="accent1"/>
+          </a:fillRef>
+          <a:effectRef idx="0">
+            <a:schemeClr val="accent1"/>
+          </a:effectRef>
+          <a:fontRef idx="minor">
+            <a:schemeClr val="lt1"/>
+          </a:fontRef>
+        </p:style>
+        <p:txBody>
+          <a:bodyPr lIns="0" tIns="0" rIns="0" bIns="0" rtlCol="0" anchor="ctr"/>
+          <a:lstStyle/>
+          <a:p>
+            <a:pPr algn="ctr"/>
+            <a:endParaRPr lang="de-DE" sz="600"/>
+          </a:p>
+        </p:txBody>
+      </p:sp>
+      <p:sp>
+        <p:nvSpPr>
+          <p:cNvPr id="52" name="Rechteck 51"/>
+          <p:cNvSpPr/>
+          <p:nvPr/>
+        </p:nvSpPr>
+        <p:spPr>
+          <a:xfrm>
+            <a:off x="281872" y="1397780"/>
+            <a:ext cx="137503" cy="136065"/>
+          </a:xfrm>
+          <a:prstGeom prst="rect">
+            <a:avLst/>
+          </a:prstGeom>
+          <a:noFill/>
+          <a:ln w="9525">
+            <a:solidFill>
+              <a:schemeClr val="tx1"/>
+            </a:solidFill>
+          </a:ln>
+        </p:spPr>
+        <p:style>
+          <a:lnRef idx="2">
+            <a:schemeClr val="accent1">
+              <a:shade val="50000"/>
+            </a:schemeClr>
+          </a:lnRef>
+          <a:fillRef idx="1">
+            <a:schemeClr val="accent1"/>
+          </a:fillRef>
+          <a:effectRef idx="0">
+            <a:schemeClr val="accent1"/>
+          </a:effectRef>
+          <a:fontRef idx="minor">
+            <a:schemeClr val="lt1"/>
+          </a:fontRef>
+        </p:style>
+        <p:txBody>
+          <a:bodyPr lIns="0" tIns="0" rIns="0" bIns="0" rtlCol="0" anchor="ctr"/>
+          <a:lstStyle/>
+          <a:p>
+            <a:pPr algn="ctr"/>
+            <a:endParaRPr lang="de-DE" sz="600"/>
+          </a:p>
+        </p:txBody>
+      </p:sp>
+      <p:sp>
+        <p:nvSpPr>
+          <p:cNvPr id="53" name="Rechteck 52"/>
+          <p:cNvSpPr/>
+          <p:nvPr/>
+        </p:nvSpPr>
+        <p:spPr>
+          <a:xfrm>
+            <a:off x="281872" y="1533845"/>
+            <a:ext cx="137503" cy="136065"/>
+          </a:xfrm>
+          <a:prstGeom prst="rect">
+            <a:avLst/>
+          </a:prstGeom>
+          <a:noFill/>
+          <a:ln w="9525">
+            <a:solidFill>
+              <a:schemeClr val="tx1"/>
+            </a:solidFill>
+          </a:ln>
+        </p:spPr>
+        <p:style>
+          <a:lnRef idx="2">
+            <a:schemeClr val="accent1">
+              <a:shade val="50000"/>
+            </a:schemeClr>
+          </a:lnRef>
+          <a:fillRef idx="1">
+            <a:schemeClr val="accent1"/>
+          </a:fillRef>
+          <a:effectRef idx="0">
+            <a:schemeClr val="accent1"/>
+          </a:effectRef>
+          <a:fontRef idx="minor">
+            <a:schemeClr val="lt1"/>
+          </a:fontRef>
+        </p:style>
+        <p:txBody>
+          <a:bodyPr lIns="0" tIns="0" rIns="0" bIns="0" rtlCol="0" anchor="ctr"/>
+          <a:lstStyle/>
+          <a:p>
+            <a:pPr algn="ctr"/>
+            <a:endParaRPr lang="de-DE" sz="600"/>
+          </a:p>
+        </p:txBody>
+      </p:sp>
     </p:spTree>
     <p:extLst>
       <p:ext uri="{BB962C8B-B14F-4D97-AF65-F5344CB8AC3E}">
-        <p14:creationId xmlns:p14="http://schemas.microsoft.com/office/powerpoint/2010/main" val="711291497"/>
+        <p14:creationId xmlns:p14="http://schemas.microsoft.com/office/powerpoint/2010/main" val="1156572049"/>
       </p:ext>
     </p:extLst>
   </p:cSld>

</xml_diff>

<commit_message>
bdi quickstart exercise C0
</commit_message>
<xml_diff>
--- a/docs/mkdocs-ng/docs/tutorials/quickstart-bdi/patrol.pptx
+++ b/docs/mkdocs-ng/docs/tutorials/quickstart-bdi/patrol.pptx
@@ -7,6 +7,7 @@
   <p:sldIdLst>
     <p:sldId id="258" r:id="rId2"/>
     <p:sldId id="259" r:id="rId3"/>
+    <p:sldId id="260" r:id="rId4"/>
   </p:sldIdLst>
   <p:sldSz cx="2879725" cy="2160588"/>
   <p:notesSz cx="6858000" cy="9144000"/>
@@ -6274,6 +6275,1045 @@
 </p:sld>
 </file>
 
+<file path=ppt/slides/slide3.xml><?xml version="1.0" encoding="utf-8"?>
+<p:sld xmlns:a="http://schemas.openxmlformats.org/drawingml/2006/main" xmlns:r="http://schemas.openxmlformats.org/officeDocument/2006/relationships" xmlns:p="http://schemas.openxmlformats.org/presentationml/2006/main">
+  <p:cSld>
+    <p:spTree>
+      <p:nvGrpSpPr>
+        <p:cNvPr id="1" name=""/>
+        <p:cNvGrpSpPr/>
+        <p:nvPr/>
+      </p:nvGrpSpPr>
+      <p:grpSpPr>
+        <a:xfrm>
+          <a:off x="0" y="0"/>
+          <a:ext cx="0" cy="0"/>
+          <a:chOff x="0" y="0"/>
+          <a:chExt cx="0" cy="0"/>
+        </a:xfrm>
+      </p:grpSpPr>
+      <p:sp>
+        <p:nvSpPr>
+          <p:cNvPr id="68" name="Titel 67"/>
+          <p:cNvSpPr>
+            <a:spLocks noGrp="1"/>
+          </p:cNvSpPr>
+          <p:nvPr>
+            <p:ph type="title"/>
+          </p:nvPr>
+        </p:nvSpPr>
+        <p:spPr>
+          <a:xfrm>
+            <a:off x="195540" y="380596"/>
+            <a:ext cx="1182661" cy="360098"/>
+          </a:xfrm>
+        </p:spPr>
+        <p:txBody>
+          <a:bodyPr>
+            <a:normAutofit fontScale="90000"/>
+          </a:bodyPr>
+          <a:lstStyle/>
+          <a:p>
+            <a:r>
+              <a:rPr lang="en-US" dirty="0" smtClean="0"/>
+              <a:t>Goal </a:t>
+            </a:r>
+            <a:r>
+              <a:rPr lang="en-US" dirty="0" smtClean="0"/>
+              <a:t>Plan </a:t>
+            </a:r>
+            <a:r>
+              <a:rPr lang="en-US" dirty="0"/>
+              <a:t>Tree Example</a:t>
+            </a:r>
+            <a:endParaRPr lang="en-US" dirty="0"/>
+          </a:p>
+        </p:txBody>
+      </p:sp>
+      <p:sp>
+        <p:nvSpPr>
+          <p:cNvPr id="65" name="Textfeld 64"/>
+          <p:cNvSpPr txBox="1"/>
+          <p:nvPr/>
+        </p:nvSpPr>
+        <p:spPr>
+          <a:xfrm>
+            <a:off x="1941082" y="339194"/>
+            <a:ext cx="293670" cy="169918"/>
+          </a:xfrm>
+          <a:prstGeom prst="rect">
+            <a:avLst/>
+          </a:prstGeom>
+          <a:noFill/>
+        </p:spPr>
+        <p:txBody>
+          <a:bodyPr wrap="none" rtlCol="0">
+            <a:spAutoFit/>
+          </a:bodyPr>
+          <a:lstStyle/>
+          <a:p>
+            <a:r>
+              <a:rPr lang="de-DE" sz="504" dirty="0" err="1"/>
+              <a:t>goal</a:t>
+            </a:r>
+            <a:endParaRPr lang="de-DE" sz="504" dirty="0"/>
+          </a:p>
+        </p:txBody>
+      </p:sp>
+      <p:sp>
+        <p:nvSpPr>
+          <p:cNvPr id="7" name="Ellipse 6"/>
+          <p:cNvSpPr/>
+          <p:nvPr/>
+        </p:nvSpPr>
+        <p:spPr>
+          <a:xfrm>
+            <a:off x="1611109" y="250829"/>
+            <a:ext cx="287973" cy="287973"/>
+          </a:xfrm>
+          <a:prstGeom prst="ellipse">
+            <a:avLst/>
+          </a:prstGeom>
+          <a:ln w="9525">
+            <a:solidFill>
+              <a:schemeClr val="tx1"/>
+            </a:solidFill>
+          </a:ln>
+        </p:spPr>
+        <p:style>
+          <a:lnRef idx="2">
+            <a:schemeClr val="accent1">
+              <a:shade val="50000"/>
+            </a:schemeClr>
+          </a:lnRef>
+          <a:fillRef idx="1">
+            <a:schemeClr val="accent1"/>
+          </a:fillRef>
+          <a:effectRef idx="0">
+            <a:schemeClr val="accent1"/>
+          </a:effectRef>
+          <a:fontRef idx="minor">
+            <a:schemeClr val="lt1"/>
+          </a:fontRef>
+        </p:style>
+        <p:txBody>
+          <a:bodyPr lIns="0" tIns="0" rIns="0" bIns="0" rtlCol="0" anchor="ctr"/>
+          <a:lstStyle/>
+          <a:p>
+            <a:pPr algn="ctr"/>
+            <a:r>
+              <a:rPr lang="de-DE" sz="504" dirty="0" err="1"/>
+              <a:t>Eat</a:t>
+            </a:r>
+            <a:r>
+              <a:rPr lang="de-DE" sz="504" dirty="0"/>
+              <a:t> </a:t>
+            </a:r>
+            <a:r>
+              <a:rPr lang="de-DE" sz="504" dirty="0"/>
+              <a:t>pan-</a:t>
+            </a:r>
+            <a:r>
+              <a:rPr lang="de-DE" sz="504" dirty="0" err="1"/>
+              <a:t>cakes</a:t>
+            </a:r>
+            <a:endParaRPr lang="de-DE" sz="504" dirty="0"/>
+          </a:p>
+        </p:txBody>
+      </p:sp>
+      <p:cxnSp>
+        <p:nvCxnSpPr>
+          <p:cNvPr id="18" name="Gewinkelter Verbinder 17"/>
+          <p:cNvCxnSpPr>
+            <a:stCxn id="8" idx="2"/>
+            <a:endCxn id="9" idx="0"/>
+          </p:cNvCxnSpPr>
+          <p:nvPr/>
+        </p:nvCxnSpPr>
+        <p:spPr>
+          <a:xfrm rot="5400000">
+            <a:off x="1223290" y="513004"/>
+            <a:ext cx="117044" cy="946567"/>
+          </a:xfrm>
+          <a:prstGeom prst="bentConnector3">
+            <a:avLst/>
+          </a:prstGeom>
+        </p:spPr>
+        <p:style>
+          <a:lnRef idx="1">
+            <a:schemeClr val="accent1"/>
+          </a:lnRef>
+          <a:fillRef idx="0">
+            <a:schemeClr val="accent1"/>
+          </a:fillRef>
+          <a:effectRef idx="0">
+            <a:schemeClr val="accent1"/>
+          </a:effectRef>
+          <a:fontRef idx="minor">
+            <a:schemeClr val="tx1"/>
+          </a:fontRef>
+        </p:style>
+      </p:cxnSp>
+      <p:cxnSp>
+        <p:nvCxnSpPr>
+          <p:cNvPr id="20" name="Gewinkelter Verbinder 19"/>
+          <p:cNvCxnSpPr>
+            <a:stCxn id="8" idx="2"/>
+            <a:endCxn id="10" idx="0"/>
+          </p:cNvCxnSpPr>
+          <p:nvPr/>
+        </p:nvCxnSpPr>
+        <p:spPr>
+          <a:xfrm rot="16200000" flipH="1">
+            <a:off x="1927791" y="755071"/>
+            <a:ext cx="117044" cy="462435"/>
+          </a:xfrm>
+          <a:prstGeom prst="bentConnector3">
+            <a:avLst/>
+          </a:prstGeom>
+        </p:spPr>
+        <p:style>
+          <a:lnRef idx="1">
+            <a:schemeClr val="accent1"/>
+          </a:lnRef>
+          <a:fillRef idx="0">
+            <a:schemeClr val="accent1"/>
+          </a:fillRef>
+          <a:effectRef idx="0">
+            <a:schemeClr val="accent1"/>
+          </a:effectRef>
+          <a:fontRef idx="minor">
+            <a:schemeClr val="tx1"/>
+          </a:fontRef>
+        </p:style>
+      </p:cxnSp>
+      <p:sp>
+        <p:nvSpPr>
+          <p:cNvPr id="59" name="Textfeld 58"/>
+          <p:cNvSpPr txBox="1"/>
+          <p:nvPr/>
+        </p:nvSpPr>
+        <p:spPr>
+          <a:xfrm>
+            <a:off x="1422868" y="1136413"/>
+            <a:ext cx="636713" cy="169918"/>
+          </a:xfrm>
+          <a:prstGeom prst="rect">
+            <a:avLst/>
+          </a:prstGeom>
+          <a:noFill/>
+        </p:spPr>
+        <p:txBody>
+          <a:bodyPr wrap="none" rtlCol="0">
+            <a:spAutoFit/>
+          </a:bodyPr>
+          <a:lstStyle/>
+          <a:p>
+            <a:r>
+              <a:rPr lang="de-DE" sz="504" dirty="0" err="1"/>
+              <a:t>s</a:t>
+            </a:r>
+            <a:r>
+              <a:rPr lang="de-DE" sz="504" dirty="0" err="1"/>
+              <a:t>equential</a:t>
+            </a:r>
+            <a:r>
+              <a:rPr lang="de-DE" sz="504" dirty="0"/>
+              <a:t> = AND</a:t>
+            </a:r>
+            <a:endParaRPr lang="de-DE" sz="504" dirty="0"/>
+          </a:p>
+        </p:txBody>
+      </p:sp>
+      <p:sp>
+        <p:nvSpPr>
+          <p:cNvPr id="67" name="Textfeld 66"/>
+          <p:cNvSpPr txBox="1"/>
+          <p:nvPr/>
+        </p:nvSpPr>
+        <p:spPr>
+          <a:xfrm>
+            <a:off x="1123136" y="1120851"/>
+            <a:ext cx="229550" cy="169918"/>
+          </a:xfrm>
+          <a:prstGeom prst="rect">
+            <a:avLst/>
+          </a:prstGeom>
+          <a:noFill/>
+        </p:spPr>
+        <p:txBody>
+          <a:bodyPr wrap="none" rtlCol="0">
+            <a:spAutoFit/>
+          </a:bodyPr>
+          <a:lstStyle/>
+          <a:p>
+            <a:r>
+              <a:rPr lang="de-DE" sz="504" dirty="0"/>
+              <a:t>…</a:t>
+            </a:r>
+            <a:endParaRPr lang="de-DE" sz="504" dirty="0"/>
+          </a:p>
+        </p:txBody>
+      </p:sp>
+      <p:sp>
+        <p:nvSpPr>
+          <p:cNvPr id="9" name="Ellipse 8"/>
+          <p:cNvSpPr/>
+          <p:nvPr/>
+        </p:nvSpPr>
+        <p:spPr>
+          <a:xfrm>
+            <a:off x="664542" y="1044810"/>
+            <a:ext cx="287973" cy="287972"/>
+          </a:xfrm>
+          <a:prstGeom prst="ellipse">
+            <a:avLst/>
+          </a:prstGeom>
+          <a:ln w="9525">
+            <a:solidFill>
+              <a:schemeClr val="tx1"/>
+            </a:solidFill>
+          </a:ln>
+        </p:spPr>
+        <p:style>
+          <a:lnRef idx="2">
+            <a:schemeClr val="accent1">
+              <a:shade val="50000"/>
+            </a:schemeClr>
+          </a:lnRef>
+          <a:fillRef idx="1">
+            <a:schemeClr val="accent1"/>
+          </a:fillRef>
+          <a:effectRef idx="0">
+            <a:schemeClr val="accent1"/>
+          </a:effectRef>
+          <a:fontRef idx="minor">
+            <a:schemeClr val="lt1"/>
+          </a:fontRef>
+        </p:style>
+        <p:txBody>
+          <a:bodyPr wrap="none" lIns="0" tIns="0" rIns="0" bIns="0" rtlCol="0" anchor="ctr"/>
+          <a:lstStyle/>
+          <a:p>
+            <a:pPr algn="ctr"/>
+            <a:r>
+              <a:rPr lang="de-DE" sz="504" dirty="0"/>
+              <a:t>Pan-</a:t>
+            </a:r>
+            <a:br>
+              <a:rPr lang="de-DE" sz="504" dirty="0"/>
+            </a:br>
+            <a:r>
+              <a:rPr lang="de-DE" sz="504" dirty="0" err="1"/>
+              <a:t>cake</a:t>
+            </a:r>
+            <a:r>
+              <a:rPr lang="de-DE" sz="504" dirty="0"/>
+              <a:t> mix</a:t>
+            </a:r>
+            <a:br>
+              <a:rPr lang="de-DE" sz="504" dirty="0"/>
+            </a:br>
+            <a:r>
+              <a:rPr lang="de-DE" sz="504" dirty="0" err="1"/>
+              <a:t>ready</a:t>
+            </a:r>
+            <a:endParaRPr lang="de-DE" sz="504" dirty="0"/>
+          </a:p>
+        </p:txBody>
+      </p:sp>
+      <p:sp>
+        <p:nvSpPr>
+          <p:cNvPr id="10" name="Ellipse 9"/>
+          <p:cNvSpPr/>
+          <p:nvPr/>
+        </p:nvSpPr>
+        <p:spPr>
+          <a:xfrm>
+            <a:off x="2073544" y="1044811"/>
+            <a:ext cx="287973" cy="287972"/>
+          </a:xfrm>
+          <a:prstGeom prst="ellipse">
+            <a:avLst/>
+          </a:prstGeom>
+          <a:ln w="9525">
+            <a:solidFill>
+              <a:schemeClr val="tx1"/>
+            </a:solidFill>
+          </a:ln>
+        </p:spPr>
+        <p:style>
+          <a:lnRef idx="2">
+            <a:schemeClr val="accent1">
+              <a:shade val="50000"/>
+            </a:schemeClr>
+          </a:lnRef>
+          <a:fillRef idx="1">
+            <a:schemeClr val="accent1"/>
+          </a:fillRef>
+          <a:effectRef idx="0">
+            <a:schemeClr val="accent1"/>
+          </a:effectRef>
+          <a:fontRef idx="minor">
+            <a:schemeClr val="lt1"/>
+          </a:fontRef>
+        </p:style>
+        <p:txBody>
+          <a:bodyPr lIns="0" tIns="0" rIns="0" bIns="0" rtlCol="0" anchor="ctr"/>
+          <a:lstStyle/>
+          <a:p>
+            <a:pPr algn="ctr"/>
+            <a:r>
+              <a:rPr lang="de-DE" sz="504" dirty="0"/>
+              <a:t>Pan-</a:t>
+            </a:r>
+            <a:r>
+              <a:rPr lang="de-DE" sz="504" dirty="0" err="1"/>
+              <a:t>cake</a:t>
+            </a:r>
+            <a:r>
+              <a:rPr lang="de-DE" sz="504" dirty="0"/>
+              <a:t> </a:t>
+            </a:r>
+            <a:r>
+              <a:rPr lang="de-DE" sz="504" dirty="0" err="1"/>
+              <a:t>flipped</a:t>
+            </a:r>
+            <a:endParaRPr lang="de-DE" sz="504" dirty="0"/>
+          </a:p>
+        </p:txBody>
+      </p:sp>
+      <p:cxnSp>
+        <p:nvCxnSpPr>
+          <p:cNvPr id="39" name="Gewinkelter Verbinder 38"/>
+          <p:cNvCxnSpPr>
+            <a:stCxn id="9" idx="4"/>
+            <a:endCxn id="14" idx="0"/>
+          </p:cNvCxnSpPr>
+          <p:nvPr/>
+        </p:nvCxnSpPr>
+        <p:spPr>
+          <a:xfrm rot="5400000">
+            <a:off x="491077" y="1181232"/>
+            <a:ext cx="165901" cy="469002"/>
+          </a:xfrm>
+          <a:prstGeom prst="bentConnector3">
+            <a:avLst>
+              <a:gd name="adj1" fmla="val 50000"/>
+            </a:avLst>
+          </a:prstGeom>
+        </p:spPr>
+        <p:style>
+          <a:lnRef idx="1">
+            <a:schemeClr val="accent1"/>
+          </a:lnRef>
+          <a:fillRef idx="0">
+            <a:schemeClr val="accent1"/>
+          </a:fillRef>
+          <a:effectRef idx="0">
+            <a:schemeClr val="accent1"/>
+          </a:effectRef>
+          <a:fontRef idx="minor">
+            <a:schemeClr val="tx1"/>
+          </a:fontRef>
+        </p:style>
+      </p:cxnSp>
+      <p:cxnSp>
+        <p:nvCxnSpPr>
+          <p:cNvPr id="41" name="Gewinkelter Verbinder 40"/>
+          <p:cNvCxnSpPr>
+            <a:stCxn id="9" idx="4"/>
+            <a:endCxn id="11" idx="0"/>
+          </p:cNvCxnSpPr>
+          <p:nvPr/>
+        </p:nvCxnSpPr>
+        <p:spPr>
+          <a:xfrm rot="16200000" flipH="1">
+            <a:off x="810889" y="1330422"/>
+            <a:ext cx="165901" cy="170621"/>
+          </a:xfrm>
+          <a:prstGeom prst="bentConnector3">
+            <a:avLst/>
+          </a:prstGeom>
+        </p:spPr>
+        <p:style>
+          <a:lnRef idx="1">
+            <a:schemeClr val="accent1"/>
+          </a:lnRef>
+          <a:fillRef idx="0">
+            <a:schemeClr val="accent1"/>
+          </a:fillRef>
+          <a:effectRef idx="0">
+            <a:schemeClr val="accent1"/>
+          </a:effectRef>
+          <a:fontRef idx="minor">
+            <a:schemeClr val="tx1"/>
+          </a:fontRef>
+        </p:style>
+      </p:cxnSp>
+      <p:sp>
+        <p:nvSpPr>
+          <p:cNvPr id="61" name="Textfeld 60"/>
+          <p:cNvSpPr txBox="1"/>
+          <p:nvPr/>
+        </p:nvSpPr>
+        <p:spPr>
+          <a:xfrm>
+            <a:off x="427319" y="1536109"/>
+            <a:ext cx="468398" cy="247504"/>
+          </a:xfrm>
+          <a:prstGeom prst="rect">
+            <a:avLst/>
+          </a:prstGeom>
+          <a:noFill/>
+        </p:spPr>
+        <p:txBody>
+          <a:bodyPr wrap="none" rtlCol="0">
+            <a:spAutoFit/>
+          </a:bodyPr>
+          <a:lstStyle/>
+          <a:p>
+            <a:pPr algn="ctr"/>
+            <a:r>
+              <a:rPr lang="de-DE" sz="504" dirty="0"/>
+              <a:t>alternative</a:t>
+            </a:r>
+            <a:br>
+              <a:rPr lang="de-DE" sz="504" dirty="0"/>
+            </a:br>
+            <a:r>
+              <a:rPr lang="de-DE" sz="504" dirty="0"/>
+              <a:t>= OR</a:t>
+            </a:r>
+            <a:endParaRPr lang="de-DE" sz="504" dirty="0"/>
+          </a:p>
+        </p:txBody>
+      </p:sp>
+      <p:sp>
+        <p:nvSpPr>
+          <p:cNvPr id="11" name="Abgerundetes Rechteck 10"/>
+          <p:cNvSpPr/>
+          <p:nvPr/>
+        </p:nvSpPr>
+        <p:spPr>
+          <a:xfrm>
+            <a:off x="835163" y="1498684"/>
+            <a:ext cx="287973" cy="287972"/>
+          </a:xfrm>
+          <a:prstGeom prst="roundRect">
+            <a:avLst/>
+          </a:prstGeom>
+          <a:ln w="9525">
+            <a:solidFill>
+              <a:schemeClr val="tx1"/>
+            </a:solidFill>
+          </a:ln>
+        </p:spPr>
+        <p:style>
+          <a:lnRef idx="2">
+            <a:schemeClr val="accent1">
+              <a:shade val="50000"/>
+            </a:schemeClr>
+          </a:lnRef>
+          <a:fillRef idx="1">
+            <a:schemeClr val="accent1"/>
+          </a:fillRef>
+          <a:effectRef idx="0">
+            <a:schemeClr val="accent1"/>
+          </a:effectRef>
+          <a:fontRef idx="minor">
+            <a:schemeClr val="lt1"/>
+          </a:fontRef>
+        </p:style>
+        <p:txBody>
+          <a:bodyPr lIns="0" tIns="0" rIns="0" bIns="0" rtlCol="0" anchor="ctr"/>
+          <a:lstStyle/>
+          <a:p>
+            <a:pPr algn="ctr"/>
+            <a:r>
+              <a:rPr lang="de-DE" sz="472" dirty="0" err="1"/>
+              <a:t>Buy</a:t>
+            </a:r>
+            <a:r>
+              <a:rPr lang="de-DE" sz="472" dirty="0"/>
+              <a:t> </a:t>
+            </a:r>
+            <a:r>
+              <a:rPr lang="de-DE" sz="472" dirty="0" err="1"/>
+              <a:t>missing</a:t>
+            </a:r>
+            <a:r>
+              <a:rPr lang="de-DE" sz="472" dirty="0"/>
+              <a:t> </a:t>
+            </a:r>
+            <a:r>
+              <a:rPr lang="de-DE" sz="472" dirty="0" err="1"/>
+              <a:t>ingredi-ents</a:t>
+            </a:r>
+            <a:endParaRPr lang="de-DE" sz="472" dirty="0"/>
+          </a:p>
+        </p:txBody>
+      </p:sp>
+      <p:sp>
+        <p:nvSpPr>
+          <p:cNvPr id="14" name="Abgerundetes Rechteck 13"/>
+          <p:cNvSpPr/>
+          <p:nvPr/>
+        </p:nvSpPr>
+        <p:spPr>
+          <a:xfrm>
+            <a:off x="195540" y="1498684"/>
+            <a:ext cx="287973" cy="287972"/>
+          </a:xfrm>
+          <a:prstGeom prst="roundRect">
+            <a:avLst/>
+          </a:prstGeom>
+          <a:ln w="9525">
+            <a:solidFill>
+              <a:schemeClr val="tx1"/>
+            </a:solidFill>
+          </a:ln>
+        </p:spPr>
+        <p:style>
+          <a:lnRef idx="2">
+            <a:schemeClr val="accent1">
+              <a:shade val="50000"/>
+            </a:schemeClr>
+          </a:lnRef>
+          <a:fillRef idx="1">
+            <a:schemeClr val="accent1"/>
+          </a:fillRef>
+          <a:effectRef idx="0">
+            <a:schemeClr val="accent1"/>
+          </a:effectRef>
+          <a:fontRef idx="minor">
+            <a:schemeClr val="lt1"/>
+          </a:fontRef>
+        </p:style>
+        <p:txBody>
+          <a:bodyPr wrap="none" lIns="0" tIns="0" rIns="0" bIns="0" rtlCol="0" anchor="ctr"/>
+          <a:lstStyle/>
+          <a:p>
+            <a:pPr algn="ctr"/>
+            <a:r>
+              <a:rPr lang="de-DE" sz="472" dirty="0" err="1"/>
+              <a:t>Get</a:t>
+            </a:r>
+            <a:r>
+              <a:rPr lang="de-DE" sz="472" dirty="0"/>
+              <a:t> in-</a:t>
+            </a:r>
+            <a:br>
+              <a:rPr lang="de-DE" sz="472" dirty="0"/>
+            </a:br>
+            <a:r>
+              <a:rPr lang="de-DE" sz="472" dirty="0" err="1"/>
+              <a:t>gredients</a:t>
+            </a:r>
+            <a:r>
+              <a:rPr lang="de-DE" sz="472" dirty="0"/>
+              <a:t/>
+            </a:r>
+            <a:br>
+              <a:rPr lang="de-DE" sz="472" dirty="0"/>
+            </a:br>
+            <a:r>
+              <a:rPr lang="de-DE" sz="472" dirty="0" err="1"/>
+              <a:t>from</a:t>
+            </a:r>
+            <a:r>
+              <a:rPr lang="de-DE" sz="472" dirty="0"/>
+              <a:t> </a:t>
+            </a:r>
+            <a:r>
+              <a:rPr lang="de-DE" sz="472" dirty="0" err="1"/>
+              <a:t>shelf</a:t>
+            </a:r>
+            <a:r>
+              <a:rPr lang="de-DE" sz="472" dirty="0"/>
+              <a:t> </a:t>
+            </a:r>
+            <a:endParaRPr lang="de-DE" sz="472" dirty="0"/>
+          </a:p>
+        </p:txBody>
+      </p:sp>
+      <p:cxnSp>
+        <p:nvCxnSpPr>
+          <p:cNvPr id="48" name="Gewinkelter Verbinder 47"/>
+          <p:cNvCxnSpPr>
+            <a:stCxn id="12" idx="0"/>
+            <a:endCxn id="10" idx="4"/>
+          </p:cNvCxnSpPr>
+          <p:nvPr/>
+        </p:nvCxnSpPr>
+        <p:spPr>
+          <a:xfrm rot="5400000" flipH="1" flipV="1">
+            <a:off x="1898326" y="1179478"/>
+            <a:ext cx="165901" cy="472510"/>
+          </a:xfrm>
+          <a:prstGeom prst="bentConnector3">
+            <a:avLst/>
+          </a:prstGeom>
+        </p:spPr>
+        <p:style>
+          <a:lnRef idx="1">
+            <a:schemeClr val="accent1"/>
+          </a:lnRef>
+          <a:fillRef idx="0">
+            <a:schemeClr val="accent1"/>
+          </a:fillRef>
+          <a:effectRef idx="0">
+            <a:schemeClr val="accent1"/>
+          </a:effectRef>
+          <a:fontRef idx="minor">
+            <a:schemeClr val="tx1"/>
+          </a:fontRef>
+        </p:style>
+      </p:cxnSp>
+      <p:cxnSp>
+        <p:nvCxnSpPr>
+          <p:cNvPr id="51" name="Gewinkelter Verbinder 50"/>
+          <p:cNvCxnSpPr>
+            <a:stCxn id="10" idx="4"/>
+            <a:endCxn id="49" idx="0"/>
+          </p:cNvCxnSpPr>
+          <p:nvPr/>
+        </p:nvCxnSpPr>
+        <p:spPr>
+          <a:xfrm rot="16200000" flipH="1">
+            <a:off x="2220323" y="1329990"/>
+            <a:ext cx="165901" cy="171485"/>
+          </a:xfrm>
+          <a:prstGeom prst="bentConnector3">
+            <a:avLst/>
+          </a:prstGeom>
+        </p:spPr>
+        <p:style>
+          <a:lnRef idx="1">
+            <a:schemeClr val="accent1"/>
+          </a:lnRef>
+          <a:fillRef idx="0">
+            <a:schemeClr val="accent1"/>
+          </a:fillRef>
+          <a:effectRef idx="0">
+            <a:schemeClr val="accent1"/>
+          </a:effectRef>
+          <a:fontRef idx="minor">
+            <a:schemeClr val="tx1"/>
+          </a:fontRef>
+        </p:style>
+      </p:cxnSp>
+      <p:sp>
+        <p:nvSpPr>
+          <p:cNvPr id="60" name="Textfeld 59"/>
+          <p:cNvSpPr txBox="1"/>
+          <p:nvPr/>
+        </p:nvSpPr>
+        <p:spPr>
+          <a:xfrm>
+            <a:off x="1832813" y="1536108"/>
+            <a:ext cx="468398" cy="247504"/>
+          </a:xfrm>
+          <a:prstGeom prst="rect">
+            <a:avLst/>
+          </a:prstGeom>
+          <a:noFill/>
+        </p:spPr>
+        <p:txBody>
+          <a:bodyPr wrap="none" rtlCol="0">
+            <a:spAutoFit/>
+          </a:bodyPr>
+          <a:lstStyle/>
+          <a:p>
+            <a:pPr algn="ctr"/>
+            <a:r>
+              <a:rPr lang="de-DE" sz="504" dirty="0"/>
+              <a:t>alternative</a:t>
+            </a:r>
+            <a:br>
+              <a:rPr lang="de-DE" sz="504" dirty="0"/>
+            </a:br>
+            <a:r>
+              <a:rPr lang="de-DE" sz="504" dirty="0"/>
+              <a:t>= OR</a:t>
+            </a:r>
+            <a:endParaRPr lang="de-DE" sz="504" dirty="0"/>
+          </a:p>
+        </p:txBody>
+      </p:sp>
+      <p:sp>
+        <p:nvSpPr>
+          <p:cNvPr id="12" name="Abgerundetes Rechteck 11"/>
+          <p:cNvSpPr/>
+          <p:nvPr/>
+        </p:nvSpPr>
+        <p:spPr>
+          <a:xfrm>
+            <a:off x="1601035" y="1498684"/>
+            <a:ext cx="287972" cy="287972"/>
+          </a:xfrm>
+          <a:prstGeom prst="roundRect">
+            <a:avLst/>
+          </a:prstGeom>
+          <a:ln w="9525">
+            <a:solidFill>
+              <a:schemeClr val="tx1"/>
+            </a:solidFill>
+          </a:ln>
+        </p:spPr>
+        <p:style>
+          <a:lnRef idx="2">
+            <a:schemeClr val="accent1">
+              <a:shade val="50000"/>
+            </a:schemeClr>
+          </a:lnRef>
+          <a:fillRef idx="1">
+            <a:schemeClr val="accent1"/>
+          </a:fillRef>
+          <a:effectRef idx="0">
+            <a:schemeClr val="accent1"/>
+          </a:effectRef>
+          <a:fontRef idx="minor">
+            <a:schemeClr val="lt1"/>
+          </a:fontRef>
+        </p:style>
+        <p:txBody>
+          <a:bodyPr lIns="0" tIns="0" rIns="0" bIns="0" rtlCol="0" anchor="ctr"/>
+          <a:lstStyle/>
+          <a:p>
+            <a:pPr algn="ctr"/>
+            <a:r>
+              <a:rPr lang="de-DE" sz="504" dirty="0" err="1"/>
+              <a:t>Throw</a:t>
+            </a:r>
+            <a:r>
+              <a:rPr lang="de-DE" sz="504" dirty="0"/>
+              <a:t> </a:t>
+            </a:r>
+            <a:r>
+              <a:rPr lang="de-DE" sz="504" dirty="0" err="1"/>
+              <a:t>p</a:t>
+            </a:r>
+            <a:r>
+              <a:rPr lang="de-DE" sz="504" dirty="0" err="1"/>
+              <a:t>ancake</a:t>
+            </a:r>
+            <a:endParaRPr lang="de-DE" sz="504" dirty="0"/>
+          </a:p>
+        </p:txBody>
+      </p:sp>
+      <p:sp>
+        <p:nvSpPr>
+          <p:cNvPr id="49" name="Abgerundetes Rechteck 48"/>
+          <p:cNvSpPr/>
+          <p:nvPr/>
+        </p:nvSpPr>
+        <p:spPr>
+          <a:xfrm>
+            <a:off x="2245030" y="1498684"/>
+            <a:ext cx="287972" cy="287972"/>
+          </a:xfrm>
+          <a:prstGeom prst="roundRect">
+            <a:avLst/>
+          </a:prstGeom>
+          <a:ln w="9525">
+            <a:solidFill>
+              <a:schemeClr val="tx1"/>
+            </a:solidFill>
+          </a:ln>
+        </p:spPr>
+        <p:style>
+          <a:lnRef idx="2">
+            <a:schemeClr val="accent1">
+              <a:shade val="50000"/>
+            </a:schemeClr>
+          </a:lnRef>
+          <a:fillRef idx="1">
+            <a:schemeClr val="accent1"/>
+          </a:fillRef>
+          <a:effectRef idx="0">
+            <a:schemeClr val="accent1"/>
+          </a:effectRef>
+          <a:fontRef idx="minor">
+            <a:schemeClr val="lt1"/>
+          </a:fontRef>
+        </p:style>
+        <p:txBody>
+          <a:bodyPr lIns="0" tIns="0" rIns="0" bIns="0" rtlCol="0" anchor="ctr"/>
+          <a:lstStyle/>
+          <a:p>
+            <a:pPr algn="ctr"/>
+            <a:r>
+              <a:rPr lang="de-DE" sz="504" dirty="0"/>
+              <a:t>Flip </a:t>
+            </a:r>
+            <a:r>
+              <a:rPr lang="de-DE" sz="504" dirty="0" err="1"/>
+              <a:t>with</a:t>
+            </a:r>
+            <a:r>
+              <a:rPr lang="de-DE" sz="504" dirty="0"/>
+              <a:t> </a:t>
+            </a:r>
+            <a:r>
+              <a:rPr lang="de-DE" sz="504" dirty="0" err="1"/>
+              <a:t>spatula</a:t>
+            </a:r>
+            <a:endParaRPr lang="de-DE" sz="504" dirty="0"/>
+          </a:p>
+        </p:txBody>
+      </p:sp>
+      <p:cxnSp>
+        <p:nvCxnSpPr>
+          <p:cNvPr id="35" name="Gerader Verbinder 34"/>
+          <p:cNvCxnSpPr>
+            <a:stCxn id="7" idx="4"/>
+          </p:cNvCxnSpPr>
+          <p:nvPr/>
+        </p:nvCxnSpPr>
+        <p:spPr>
+          <a:xfrm>
+            <a:off x="1755095" y="538802"/>
+            <a:ext cx="0" cy="230639"/>
+          </a:xfrm>
+          <a:prstGeom prst="line">
+            <a:avLst/>
+          </a:prstGeom>
+        </p:spPr>
+        <p:style>
+          <a:lnRef idx="1">
+            <a:schemeClr val="accent1"/>
+          </a:lnRef>
+          <a:fillRef idx="0">
+            <a:schemeClr val="accent1"/>
+          </a:fillRef>
+          <a:effectRef idx="0">
+            <a:schemeClr val="accent1"/>
+          </a:effectRef>
+          <a:fontRef idx="minor">
+            <a:schemeClr val="tx1"/>
+          </a:fontRef>
+        </p:style>
+      </p:cxnSp>
+      <p:sp>
+        <p:nvSpPr>
+          <p:cNvPr id="66" name="Textfeld 65"/>
+          <p:cNvSpPr txBox="1"/>
+          <p:nvPr/>
+        </p:nvSpPr>
+        <p:spPr>
+          <a:xfrm>
+            <a:off x="1941082" y="707012"/>
+            <a:ext cx="296876" cy="169918"/>
+          </a:xfrm>
+          <a:prstGeom prst="rect">
+            <a:avLst/>
+          </a:prstGeom>
+          <a:noFill/>
+        </p:spPr>
+        <p:txBody>
+          <a:bodyPr wrap="none" rtlCol="0">
+            <a:spAutoFit/>
+          </a:bodyPr>
+          <a:lstStyle/>
+          <a:p>
+            <a:r>
+              <a:rPr lang="de-DE" sz="504" dirty="0"/>
+              <a:t>plan</a:t>
+            </a:r>
+            <a:endParaRPr lang="de-DE" sz="504" dirty="0"/>
+          </a:p>
+        </p:txBody>
+      </p:sp>
+      <p:sp>
+        <p:nvSpPr>
+          <p:cNvPr id="8" name="Abgerundetes Rechteck 7"/>
+          <p:cNvSpPr/>
+          <p:nvPr/>
+        </p:nvSpPr>
+        <p:spPr>
+          <a:xfrm>
+            <a:off x="1611109" y="639794"/>
+            <a:ext cx="287972" cy="287972"/>
+          </a:xfrm>
+          <a:prstGeom prst="roundRect">
+            <a:avLst/>
+          </a:prstGeom>
+          <a:ln w="9525">
+            <a:solidFill>
+              <a:schemeClr val="tx1"/>
+            </a:solidFill>
+          </a:ln>
+        </p:spPr>
+        <p:style>
+          <a:lnRef idx="2">
+            <a:schemeClr val="accent1">
+              <a:shade val="50000"/>
+            </a:schemeClr>
+          </a:lnRef>
+          <a:fillRef idx="1">
+            <a:schemeClr val="accent1"/>
+          </a:fillRef>
+          <a:effectRef idx="0">
+            <a:schemeClr val="accent1"/>
+          </a:effectRef>
+          <a:fontRef idx="minor">
+            <a:schemeClr val="lt1"/>
+          </a:fontRef>
+        </p:style>
+        <p:txBody>
+          <a:bodyPr lIns="0" tIns="0" rIns="0" bIns="0" rtlCol="0" anchor="ctr"/>
+          <a:lstStyle/>
+          <a:p>
+            <a:pPr algn="ctr"/>
+            <a:r>
+              <a:rPr lang="de-DE" sz="504" dirty="0" err="1"/>
+              <a:t>Make</a:t>
+            </a:r>
+            <a:r>
+              <a:rPr lang="de-DE" sz="504" dirty="0"/>
+              <a:t> </a:t>
+            </a:r>
+            <a:r>
+              <a:rPr lang="de-DE" sz="504" dirty="0" err="1"/>
+              <a:t>p</a:t>
+            </a:r>
+            <a:r>
+              <a:rPr lang="de-DE" sz="504" dirty="0" err="1"/>
+              <a:t>ancake</a:t>
+            </a:r>
+            <a:endParaRPr lang="de-DE" sz="504" dirty="0"/>
+          </a:p>
+        </p:txBody>
+      </p:sp>
+    </p:spTree>
+    <p:extLst>
+      <p:ext uri="{BB962C8B-B14F-4D97-AF65-F5344CB8AC3E}">
+        <p14:creationId xmlns:p14="http://schemas.microsoft.com/office/powerpoint/2010/main" val="263173259"/>
+      </p:ext>
+    </p:extLst>
+  </p:cSld>
+  <p:clrMapOvr>
+    <a:masterClrMapping/>
+  </p:clrMapOvr>
+  <mc:AlternateContent xmlns:mc="http://schemas.openxmlformats.org/markup-compatibility/2006" xmlns:p14="http://schemas.microsoft.com/office/powerpoint/2010/main">
+    <mc:Choice Requires="p14">
+      <p:transition spd="slow" p14:dur="2000"/>
+    </mc:Choice>
+    <mc:Fallback xmlns="">
+      <p:transition spd="slow"/>
+    </mc:Fallback>
+  </mc:AlternateContent>
+  <p:timing>
+    <p:tnLst>
+      <p:par>
+        <p:cTn id="1" dur="indefinite" restart="never" nodeType="tmRoot"/>
+      </p:par>
+    </p:tnLst>
+  </p:timing>
+</p:sld>
+</file>
+
 <file path=ppt/theme/theme1.xml><?xml version="1.0" encoding="utf-8"?>
 <a:theme xmlns:a="http://schemas.openxmlformats.org/drawingml/2006/main" name="Larissa">
   <a:themeElements>

</xml_diff>

<commit_message>
bdi quickstart exercise C
</commit_message>
<xml_diff>
--- a/docs/mkdocs-ng/docs/tutorials/quickstart-bdi/patrol.pptx
+++ b/docs/mkdocs-ng/docs/tutorials/quickstart-bdi/patrol.pptx
@@ -8,6 +8,7 @@
     <p:sldId id="258" r:id="rId2"/>
     <p:sldId id="259" r:id="rId3"/>
     <p:sldId id="260" r:id="rId4"/>
+    <p:sldId id="261" r:id="rId5"/>
   </p:sldIdLst>
   <p:sldSz cx="2879725" cy="2160588"/>
   <p:notesSz cx="6858000" cy="9144000"/>
@@ -306,7 +307,7 @@
           <a:p>
             <a:fld id="{87CB0DDD-8CA0-4903-99FB-3FB32E8355B3}" type="datetimeFigureOut">
               <a:rPr lang="de-DE" smtClean="0"/>
-              <a:t>17.10.2018</a:t>
+              <a:t>18.10.2018</a:t>
             </a:fld>
             <a:endParaRPr lang="de-DE"/>
           </a:p>
@@ -476,7 +477,7 @@
           <a:p>
             <a:fld id="{87CB0DDD-8CA0-4903-99FB-3FB32E8355B3}" type="datetimeFigureOut">
               <a:rPr lang="de-DE" smtClean="0"/>
-              <a:t>17.10.2018</a:t>
+              <a:t>18.10.2018</a:t>
             </a:fld>
             <a:endParaRPr lang="de-DE"/>
           </a:p>
@@ -656,7 +657,7 @@
           <a:p>
             <a:fld id="{87CB0DDD-8CA0-4903-99FB-3FB32E8355B3}" type="datetimeFigureOut">
               <a:rPr lang="de-DE" smtClean="0"/>
-              <a:t>17.10.2018</a:t>
+              <a:t>18.10.2018</a:t>
             </a:fld>
             <a:endParaRPr lang="de-DE"/>
           </a:p>
@@ -826,7 +827,7 @@
           <a:p>
             <a:fld id="{87CB0DDD-8CA0-4903-99FB-3FB32E8355B3}" type="datetimeFigureOut">
               <a:rPr lang="de-DE" smtClean="0"/>
-              <a:t>17.10.2018</a:t>
+              <a:t>18.10.2018</a:t>
             </a:fld>
             <a:endParaRPr lang="de-DE"/>
           </a:p>
@@ -1072,7 +1073,7 @@
           <a:p>
             <a:fld id="{87CB0DDD-8CA0-4903-99FB-3FB32E8355B3}" type="datetimeFigureOut">
               <a:rPr lang="de-DE" smtClean="0"/>
-              <a:t>17.10.2018</a:t>
+              <a:t>18.10.2018</a:t>
             </a:fld>
             <a:endParaRPr lang="de-DE"/>
           </a:p>
@@ -1360,7 +1361,7 @@
           <a:p>
             <a:fld id="{87CB0DDD-8CA0-4903-99FB-3FB32E8355B3}" type="datetimeFigureOut">
               <a:rPr lang="de-DE" smtClean="0"/>
-              <a:t>17.10.2018</a:t>
+              <a:t>18.10.2018</a:t>
             </a:fld>
             <a:endParaRPr lang="de-DE"/>
           </a:p>
@@ -1782,7 +1783,7 @@
           <a:p>
             <a:fld id="{87CB0DDD-8CA0-4903-99FB-3FB32E8355B3}" type="datetimeFigureOut">
               <a:rPr lang="de-DE" smtClean="0"/>
-              <a:t>17.10.2018</a:t>
+              <a:t>18.10.2018</a:t>
             </a:fld>
             <a:endParaRPr lang="de-DE"/>
           </a:p>
@@ -1900,7 +1901,7 @@
           <a:p>
             <a:fld id="{87CB0DDD-8CA0-4903-99FB-3FB32E8355B3}" type="datetimeFigureOut">
               <a:rPr lang="de-DE" smtClean="0"/>
-              <a:t>17.10.2018</a:t>
+              <a:t>18.10.2018</a:t>
             </a:fld>
             <a:endParaRPr lang="de-DE"/>
           </a:p>
@@ -1995,7 +1996,7 @@
           <a:p>
             <a:fld id="{87CB0DDD-8CA0-4903-99FB-3FB32E8355B3}" type="datetimeFigureOut">
               <a:rPr lang="de-DE" smtClean="0"/>
-              <a:t>17.10.2018</a:t>
+              <a:t>18.10.2018</a:t>
             </a:fld>
             <a:endParaRPr lang="de-DE"/>
           </a:p>
@@ -2272,7 +2273,7 @@
           <a:p>
             <a:fld id="{87CB0DDD-8CA0-4903-99FB-3FB32E8355B3}" type="datetimeFigureOut">
               <a:rPr lang="de-DE" smtClean="0"/>
-              <a:t>17.10.2018</a:t>
+              <a:t>18.10.2018</a:t>
             </a:fld>
             <a:endParaRPr lang="de-DE"/>
           </a:p>
@@ -2525,7 +2526,7 @@
           <a:p>
             <a:fld id="{87CB0DDD-8CA0-4903-99FB-3FB32E8355B3}" type="datetimeFigureOut">
               <a:rPr lang="de-DE" smtClean="0"/>
-              <a:t>17.10.2018</a:t>
+              <a:t>18.10.2018</a:t>
             </a:fld>
             <a:endParaRPr lang="de-DE"/>
           </a:p>
@@ -2738,7 +2739,7 @@
           <a:p>
             <a:fld id="{87CB0DDD-8CA0-4903-99FB-3FB32E8355B3}" type="datetimeFigureOut">
               <a:rPr lang="de-DE" smtClean="0"/>
-              <a:t>17.10.2018</a:t>
+              <a:t>18.10.2018</a:t>
             </a:fld>
             <a:endParaRPr lang="de-DE"/>
           </a:p>
@@ -6294,6 +6295,1861 @@
       </p:grpSpPr>
       <p:sp>
         <p:nvSpPr>
+          <p:cNvPr id="54" name="Abgerundetes Rechteck 53"/>
+          <p:cNvSpPr/>
+          <p:nvPr/>
+        </p:nvSpPr>
+        <p:spPr>
+          <a:xfrm>
+            <a:off x="2344636" y="1424756"/>
+            <a:ext cx="360001" cy="288000"/>
+          </a:xfrm>
+          <a:prstGeom prst="roundRect">
+            <a:avLst/>
+          </a:prstGeom>
+          <a:solidFill>
+            <a:schemeClr val="bg1"/>
+          </a:solidFill>
+          <a:ln w="9525">
+            <a:solidFill>
+              <a:schemeClr val="bg1">
+                <a:lumMod val="75000"/>
+              </a:schemeClr>
+            </a:solidFill>
+            <a:prstDash val="sysDot"/>
+          </a:ln>
+        </p:spPr>
+        <p:style>
+          <a:lnRef idx="2">
+            <a:schemeClr val="accent1">
+              <a:shade val="50000"/>
+            </a:schemeClr>
+          </a:lnRef>
+          <a:fillRef idx="1">
+            <a:schemeClr val="accent1"/>
+          </a:fillRef>
+          <a:effectRef idx="0">
+            <a:schemeClr val="accent1"/>
+          </a:effectRef>
+          <a:fontRef idx="minor">
+            <a:schemeClr val="lt1"/>
+          </a:fontRef>
+        </p:style>
+        <p:txBody>
+          <a:bodyPr lIns="0" tIns="0" rIns="0" bIns="0" rtlCol="0" anchor="ctr"/>
+          <a:lstStyle/>
+          <a:p>
+            <a:pPr algn="ctr"/>
+            <a:r>
+              <a:rPr lang="de-DE" sz="472" dirty="0" err="1" smtClean="0">
+                <a:solidFill>
+                  <a:schemeClr val="bg1">
+                    <a:lumMod val="75000"/>
+                  </a:schemeClr>
+                </a:solidFill>
+              </a:rPr>
+              <a:t>Patrol</a:t>
+            </a:r>
+            <a:r>
+              <a:rPr lang="de-DE" sz="472" dirty="0" smtClean="0">
+                <a:solidFill>
+                  <a:schemeClr val="bg1">
+                    <a:lumMod val="75000"/>
+                  </a:schemeClr>
+                </a:solidFill>
+              </a:rPr>
+              <a:t> Plan 3</a:t>
+            </a:r>
+            <a:endParaRPr lang="de-DE" sz="472" dirty="0">
+              <a:solidFill>
+                <a:schemeClr val="bg1">
+                  <a:lumMod val="75000"/>
+                </a:schemeClr>
+              </a:solidFill>
+            </a:endParaRPr>
+          </a:p>
+        </p:txBody>
+      </p:sp>
+      <p:sp>
+        <p:nvSpPr>
+          <p:cNvPr id="53" name="Abgerundetes Rechteck 52"/>
+          <p:cNvSpPr/>
+          <p:nvPr/>
+        </p:nvSpPr>
+        <p:spPr>
+          <a:xfrm>
+            <a:off x="2087221" y="1526421"/>
+            <a:ext cx="360001" cy="288000"/>
+          </a:xfrm>
+          <a:prstGeom prst="roundRect">
+            <a:avLst/>
+          </a:prstGeom>
+          <a:solidFill>
+            <a:schemeClr val="bg1"/>
+          </a:solidFill>
+          <a:ln w="9525">
+            <a:solidFill>
+              <a:schemeClr val="bg1">
+                <a:lumMod val="75000"/>
+              </a:schemeClr>
+            </a:solidFill>
+            <a:prstDash val="sysDot"/>
+          </a:ln>
+        </p:spPr>
+        <p:style>
+          <a:lnRef idx="2">
+            <a:schemeClr val="accent1">
+              <a:shade val="50000"/>
+            </a:schemeClr>
+          </a:lnRef>
+          <a:fillRef idx="1">
+            <a:schemeClr val="accent1"/>
+          </a:fillRef>
+          <a:effectRef idx="0">
+            <a:schemeClr val="accent1"/>
+          </a:effectRef>
+          <a:fontRef idx="minor">
+            <a:schemeClr val="lt1"/>
+          </a:fontRef>
+        </p:style>
+        <p:txBody>
+          <a:bodyPr lIns="0" tIns="0" rIns="0" bIns="0" rtlCol="0" anchor="ctr"/>
+          <a:lstStyle/>
+          <a:p>
+            <a:pPr algn="ctr"/>
+            <a:r>
+              <a:rPr lang="de-DE" sz="472" dirty="0" err="1" smtClean="0">
+                <a:solidFill>
+                  <a:schemeClr val="bg1">
+                    <a:lumMod val="75000"/>
+                  </a:schemeClr>
+                </a:solidFill>
+              </a:rPr>
+              <a:t>Patrol</a:t>
+            </a:r>
+            <a:r>
+              <a:rPr lang="de-DE" sz="472" dirty="0" smtClean="0">
+                <a:solidFill>
+                  <a:schemeClr val="bg1">
+                    <a:lumMod val="75000"/>
+                  </a:schemeClr>
+                </a:solidFill>
+              </a:rPr>
+              <a:t> Plan 2</a:t>
+            </a:r>
+            <a:endParaRPr lang="de-DE" sz="472" dirty="0">
+              <a:solidFill>
+                <a:schemeClr val="bg1">
+                  <a:lumMod val="75000"/>
+                </a:schemeClr>
+              </a:solidFill>
+            </a:endParaRPr>
+          </a:p>
+        </p:txBody>
+      </p:sp>
+      <p:cxnSp>
+        <p:nvCxnSpPr>
+          <p:cNvPr id="55" name="Gewinkelter Verbinder 54"/>
+          <p:cNvCxnSpPr>
+            <a:stCxn id="10" idx="4"/>
+            <a:endCxn id="53" idx="0"/>
+          </p:cNvCxnSpPr>
+          <p:nvPr/>
+        </p:nvCxnSpPr>
+        <p:spPr>
+          <a:xfrm rot="5400000">
+            <a:off x="2177581" y="1436066"/>
+            <a:ext cx="179997" cy="713"/>
+          </a:xfrm>
+          <a:prstGeom prst="bentConnector3">
+            <a:avLst/>
+          </a:prstGeom>
+          <a:ln>
+            <a:solidFill>
+              <a:schemeClr val="bg1">
+                <a:lumMod val="75000"/>
+              </a:schemeClr>
+            </a:solidFill>
+            <a:prstDash val="sysDot"/>
+          </a:ln>
+        </p:spPr>
+        <p:style>
+          <a:lnRef idx="1">
+            <a:schemeClr val="accent1"/>
+          </a:lnRef>
+          <a:fillRef idx="0">
+            <a:schemeClr val="accent1"/>
+          </a:fillRef>
+          <a:effectRef idx="0">
+            <a:schemeClr val="accent1"/>
+          </a:effectRef>
+          <a:fontRef idx="minor">
+            <a:schemeClr val="tx1"/>
+          </a:fontRef>
+        </p:style>
+      </p:cxnSp>
+      <p:cxnSp>
+        <p:nvCxnSpPr>
+          <p:cNvPr id="56" name="Gewinkelter Verbinder 55"/>
+          <p:cNvCxnSpPr>
+            <a:stCxn id="10" idx="4"/>
+            <a:endCxn id="54" idx="0"/>
+          </p:cNvCxnSpPr>
+          <p:nvPr/>
+        </p:nvCxnSpPr>
+        <p:spPr>
+          <a:xfrm rot="16200000" flipH="1">
+            <a:off x="2357120" y="1257239"/>
+            <a:ext cx="78332" cy="256702"/>
+          </a:xfrm>
+          <a:prstGeom prst="bentConnector3">
+            <a:avLst/>
+          </a:prstGeom>
+          <a:ln>
+            <a:solidFill>
+              <a:schemeClr val="bg1">
+                <a:lumMod val="75000"/>
+              </a:schemeClr>
+            </a:solidFill>
+            <a:prstDash val="sysDot"/>
+          </a:ln>
+        </p:spPr>
+        <p:style>
+          <a:lnRef idx="1">
+            <a:schemeClr val="accent1"/>
+          </a:lnRef>
+          <a:fillRef idx="0">
+            <a:schemeClr val="accent1"/>
+          </a:fillRef>
+          <a:effectRef idx="0">
+            <a:schemeClr val="accent1"/>
+          </a:effectRef>
+          <a:fontRef idx="minor">
+            <a:schemeClr val="tx1"/>
+          </a:fontRef>
+        </p:style>
+      </p:cxnSp>
+      <p:cxnSp>
+        <p:nvCxnSpPr>
+          <p:cNvPr id="73" name="Gewinkelter Verbinder 72"/>
+          <p:cNvCxnSpPr>
+            <a:stCxn id="70" idx="4"/>
+            <a:endCxn id="74" idx="0"/>
+          </p:cNvCxnSpPr>
+          <p:nvPr/>
+        </p:nvCxnSpPr>
+        <p:spPr>
+          <a:xfrm rot="5400000">
+            <a:off x="143725" y="485877"/>
+            <a:ext cx="179999" cy="1"/>
+          </a:xfrm>
+          <a:prstGeom prst="bentConnector3">
+            <a:avLst/>
+          </a:prstGeom>
+          <a:ln>
+            <a:solidFill>
+              <a:schemeClr val="bg1">
+                <a:lumMod val="75000"/>
+              </a:schemeClr>
+            </a:solidFill>
+            <a:prstDash val="sysDot"/>
+          </a:ln>
+        </p:spPr>
+        <p:style>
+          <a:lnRef idx="1">
+            <a:schemeClr val="accent1"/>
+          </a:lnRef>
+          <a:fillRef idx="0">
+            <a:schemeClr val="accent1"/>
+          </a:fillRef>
+          <a:effectRef idx="0">
+            <a:schemeClr val="accent1"/>
+          </a:effectRef>
+          <a:fontRef idx="minor">
+            <a:schemeClr val="tx1"/>
+          </a:fontRef>
+        </p:style>
+      </p:cxnSp>
+      <p:sp>
+        <p:nvSpPr>
+          <p:cNvPr id="74" name="Abgerundetes Rechteck 73"/>
+          <p:cNvSpPr/>
+          <p:nvPr/>
+        </p:nvSpPr>
+        <p:spPr>
+          <a:xfrm>
+            <a:off x="53723" y="575877"/>
+            <a:ext cx="360000" cy="288000"/>
+          </a:xfrm>
+          <a:prstGeom prst="roundRect">
+            <a:avLst/>
+          </a:prstGeom>
+          <a:solidFill>
+            <a:schemeClr val="bg1"/>
+          </a:solidFill>
+          <a:ln w="9525">
+            <a:solidFill>
+              <a:schemeClr val="bg1">
+                <a:lumMod val="75000"/>
+              </a:schemeClr>
+            </a:solidFill>
+            <a:prstDash val="sysDot"/>
+          </a:ln>
+        </p:spPr>
+        <p:style>
+          <a:lnRef idx="2">
+            <a:schemeClr val="accent1">
+              <a:shade val="50000"/>
+            </a:schemeClr>
+          </a:lnRef>
+          <a:fillRef idx="1">
+            <a:schemeClr val="accent1"/>
+          </a:fillRef>
+          <a:effectRef idx="0">
+            <a:schemeClr val="accent1"/>
+          </a:effectRef>
+          <a:fontRef idx="minor">
+            <a:schemeClr val="lt1"/>
+          </a:fontRef>
+        </p:style>
+        <p:txBody>
+          <a:bodyPr lIns="0" tIns="0" rIns="0" bIns="0" rtlCol="0" anchor="ctr"/>
+          <a:lstStyle/>
+          <a:p>
+            <a:pPr algn="ctr"/>
+            <a:r>
+              <a:rPr lang="de-DE" sz="472" dirty="0">
+                <a:solidFill>
+                  <a:schemeClr val="bg1">
+                    <a:lumMod val="75000"/>
+                  </a:schemeClr>
+                </a:solidFill>
+              </a:rPr>
+              <a:t>Load</a:t>
+            </a:r>
+            <a:br>
+              <a:rPr lang="de-DE" sz="472" dirty="0">
+                <a:solidFill>
+                  <a:schemeClr val="bg1">
+                    <a:lumMod val="75000"/>
+                  </a:schemeClr>
+                </a:solidFill>
+              </a:rPr>
+            </a:br>
+            <a:r>
+              <a:rPr lang="de-DE" sz="472" dirty="0" err="1">
+                <a:solidFill>
+                  <a:schemeClr val="bg1">
+                    <a:lumMod val="75000"/>
+                  </a:schemeClr>
+                </a:solidFill>
+              </a:rPr>
+              <a:t>Battery</a:t>
+            </a:r>
+            <a:endParaRPr lang="de-DE" sz="472" dirty="0">
+              <a:solidFill>
+                <a:schemeClr val="bg1">
+                  <a:lumMod val="75000"/>
+                </a:schemeClr>
+              </a:solidFill>
+            </a:endParaRPr>
+          </a:p>
+        </p:txBody>
+      </p:sp>
+      <p:sp>
+        <p:nvSpPr>
+          <p:cNvPr id="76" name="Abgerundetes Rechteck 75"/>
+          <p:cNvSpPr/>
+          <p:nvPr/>
+        </p:nvSpPr>
+        <p:spPr>
+          <a:xfrm>
+            <a:off x="1120500" y="474212"/>
+            <a:ext cx="360001" cy="288000"/>
+          </a:xfrm>
+          <a:prstGeom prst="roundRect">
+            <a:avLst/>
+          </a:prstGeom>
+          <a:solidFill>
+            <a:schemeClr val="bg1"/>
+          </a:solidFill>
+          <a:ln w="9525">
+            <a:solidFill>
+              <a:schemeClr val="bg1">
+                <a:lumMod val="75000"/>
+              </a:schemeClr>
+            </a:solidFill>
+            <a:prstDash val="sysDot"/>
+          </a:ln>
+        </p:spPr>
+        <p:style>
+          <a:lnRef idx="2">
+            <a:schemeClr val="accent1">
+              <a:shade val="50000"/>
+            </a:schemeClr>
+          </a:lnRef>
+          <a:fillRef idx="1">
+            <a:schemeClr val="accent1"/>
+          </a:fillRef>
+          <a:effectRef idx="0">
+            <a:schemeClr val="accent1"/>
+          </a:effectRef>
+          <a:fontRef idx="minor">
+            <a:schemeClr val="lt1"/>
+          </a:fontRef>
+        </p:style>
+        <p:txBody>
+          <a:bodyPr lIns="0" tIns="0" rIns="0" bIns="0" rtlCol="0" anchor="ctr"/>
+          <a:lstStyle/>
+          <a:p>
+            <a:pPr algn="ctr"/>
+            <a:r>
+              <a:rPr lang="de-DE" sz="472" dirty="0" err="1" smtClean="0">
+                <a:solidFill>
+                  <a:schemeClr val="bg1">
+                    <a:lumMod val="75000"/>
+                  </a:schemeClr>
+                </a:solidFill>
+              </a:rPr>
+              <a:t>Patrol</a:t>
+            </a:r>
+            <a:r>
+              <a:rPr lang="de-DE" sz="472" dirty="0" smtClean="0">
+                <a:solidFill>
+                  <a:schemeClr val="bg1">
+                    <a:lumMod val="75000"/>
+                  </a:schemeClr>
+                </a:solidFill>
+              </a:rPr>
+              <a:t> Plan 3</a:t>
+            </a:r>
+            <a:endParaRPr lang="de-DE" sz="472" dirty="0">
+              <a:solidFill>
+                <a:schemeClr val="bg1">
+                  <a:lumMod val="75000"/>
+                </a:schemeClr>
+              </a:solidFill>
+            </a:endParaRPr>
+          </a:p>
+        </p:txBody>
+      </p:sp>
+      <p:sp>
+        <p:nvSpPr>
+          <p:cNvPr id="77" name="Abgerundetes Rechteck 76"/>
+          <p:cNvSpPr/>
+          <p:nvPr/>
+        </p:nvSpPr>
+        <p:spPr>
+          <a:xfrm>
+            <a:off x="863085" y="575877"/>
+            <a:ext cx="360001" cy="288000"/>
+          </a:xfrm>
+          <a:prstGeom prst="roundRect">
+            <a:avLst/>
+          </a:prstGeom>
+          <a:solidFill>
+            <a:schemeClr val="bg1"/>
+          </a:solidFill>
+          <a:ln w="9525">
+            <a:solidFill>
+              <a:schemeClr val="bg1">
+                <a:lumMod val="75000"/>
+              </a:schemeClr>
+            </a:solidFill>
+            <a:prstDash val="sysDot"/>
+          </a:ln>
+        </p:spPr>
+        <p:style>
+          <a:lnRef idx="2">
+            <a:schemeClr val="accent1">
+              <a:shade val="50000"/>
+            </a:schemeClr>
+          </a:lnRef>
+          <a:fillRef idx="1">
+            <a:schemeClr val="accent1"/>
+          </a:fillRef>
+          <a:effectRef idx="0">
+            <a:schemeClr val="accent1"/>
+          </a:effectRef>
+          <a:fontRef idx="minor">
+            <a:schemeClr val="lt1"/>
+          </a:fontRef>
+        </p:style>
+        <p:txBody>
+          <a:bodyPr lIns="0" tIns="0" rIns="0" bIns="0" rtlCol="0" anchor="ctr"/>
+          <a:lstStyle/>
+          <a:p>
+            <a:pPr algn="ctr"/>
+            <a:r>
+              <a:rPr lang="de-DE" sz="472" dirty="0" err="1" smtClean="0">
+                <a:solidFill>
+                  <a:schemeClr val="bg1">
+                    <a:lumMod val="75000"/>
+                  </a:schemeClr>
+                </a:solidFill>
+              </a:rPr>
+              <a:t>Patrol</a:t>
+            </a:r>
+            <a:r>
+              <a:rPr lang="de-DE" sz="472" dirty="0" smtClean="0">
+                <a:solidFill>
+                  <a:schemeClr val="bg1">
+                    <a:lumMod val="75000"/>
+                  </a:schemeClr>
+                </a:solidFill>
+              </a:rPr>
+              <a:t> Plan 2</a:t>
+            </a:r>
+            <a:endParaRPr lang="de-DE" sz="472" dirty="0">
+              <a:solidFill>
+                <a:schemeClr val="bg1">
+                  <a:lumMod val="75000"/>
+                </a:schemeClr>
+              </a:solidFill>
+            </a:endParaRPr>
+          </a:p>
+        </p:txBody>
+      </p:sp>
+      <p:cxnSp>
+        <p:nvCxnSpPr>
+          <p:cNvPr id="79" name="Gewinkelter Verbinder 78"/>
+          <p:cNvCxnSpPr>
+            <a:stCxn id="71" idx="4"/>
+            <a:endCxn id="77" idx="0"/>
+          </p:cNvCxnSpPr>
+          <p:nvPr/>
+        </p:nvCxnSpPr>
+        <p:spPr>
+          <a:xfrm rot="5400000">
+            <a:off x="953445" y="485522"/>
+            <a:ext cx="179997" cy="713"/>
+          </a:xfrm>
+          <a:prstGeom prst="bentConnector3">
+            <a:avLst/>
+          </a:prstGeom>
+          <a:ln>
+            <a:solidFill>
+              <a:schemeClr val="bg1">
+                <a:lumMod val="75000"/>
+              </a:schemeClr>
+            </a:solidFill>
+            <a:prstDash val="sysDot"/>
+          </a:ln>
+        </p:spPr>
+        <p:style>
+          <a:lnRef idx="1">
+            <a:schemeClr val="accent1"/>
+          </a:lnRef>
+          <a:fillRef idx="0">
+            <a:schemeClr val="accent1"/>
+          </a:fillRef>
+          <a:effectRef idx="0">
+            <a:schemeClr val="accent1"/>
+          </a:effectRef>
+          <a:fontRef idx="minor">
+            <a:schemeClr val="tx1"/>
+          </a:fontRef>
+        </p:style>
+      </p:cxnSp>
+      <p:cxnSp>
+        <p:nvCxnSpPr>
+          <p:cNvPr id="80" name="Gewinkelter Verbinder 79"/>
+          <p:cNvCxnSpPr>
+            <a:stCxn id="71" idx="4"/>
+            <a:endCxn id="76" idx="0"/>
+          </p:cNvCxnSpPr>
+          <p:nvPr/>
+        </p:nvCxnSpPr>
+        <p:spPr>
+          <a:xfrm rot="16200000" flipH="1">
+            <a:off x="1132984" y="306695"/>
+            <a:ext cx="78332" cy="256702"/>
+          </a:xfrm>
+          <a:prstGeom prst="bentConnector3">
+            <a:avLst/>
+          </a:prstGeom>
+          <a:ln>
+            <a:solidFill>
+              <a:schemeClr val="bg1">
+                <a:lumMod val="75000"/>
+              </a:schemeClr>
+            </a:solidFill>
+            <a:prstDash val="sysDot"/>
+          </a:ln>
+        </p:spPr>
+        <p:style>
+          <a:lnRef idx="1">
+            <a:schemeClr val="accent1"/>
+          </a:lnRef>
+          <a:fillRef idx="0">
+            <a:schemeClr val="accent1"/>
+          </a:fillRef>
+          <a:effectRef idx="0">
+            <a:schemeClr val="accent1"/>
+          </a:effectRef>
+          <a:fontRef idx="minor">
+            <a:schemeClr val="tx1"/>
+          </a:fontRef>
+        </p:style>
+      </p:cxnSp>
+      <p:sp>
+        <p:nvSpPr>
+          <p:cNvPr id="59" name="Textfeld 58"/>
+          <p:cNvSpPr txBox="1"/>
+          <p:nvPr/>
+        </p:nvSpPr>
+        <p:spPr>
+          <a:xfrm>
+            <a:off x="1647180" y="1065800"/>
+            <a:ext cx="360002" cy="77585"/>
+          </a:xfrm>
+          <a:prstGeom prst="rect">
+            <a:avLst/>
+          </a:prstGeom>
+          <a:noFill/>
+        </p:spPr>
+        <p:txBody>
+          <a:bodyPr wrap="square" lIns="0" tIns="0" rIns="0" bIns="0" rtlCol="0">
+            <a:spAutoFit/>
+          </a:bodyPr>
+          <a:lstStyle/>
+          <a:p>
+            <a:pPr algn="ctr"/>
+            <a:r>
+              <a:rPr lang="de-DE" sz="504" b="1" dirty="0" err="1" smtClean="0">
+                <a:solidFill>
+                  <a:schemeClr val="accent2"/>
+                </a:solidFill>
+              </a:rPr>
+              <a:t>inhibits</a:t>
+            </a:r>
+            <a:endParaRPr lang="de-DE" sz="504" b="1" dirty="0">
+              <a:solidFill>
+                <a:schemeClr val="accent2"/>
+              </a:solidFill>
+            </a:endParaRPr>
+          </a:p>
+        </p:txBody>
+      </p:sp>
+      <p:sp>
+        <p:nvSpPr>
+          <p:cNvPr id="9" name="Ellipse 8"/>
+          <p:cNvSpPr>
+            <a:spLocks noChangeAspect="1"/>
+          </p:cNvSpPr>
+          <p:nvPr/>
+        </p:nvSpPr>
+        <p:spPr>
+          <a:xfrm>
+            <a:off x="1277859" y="986422"/>
+            <a:ext cx="360001" cy="360000"/>
+          </a:xfrm>
+          <a:prstGeom prst="ellipse">
+            <a:avLst/>
+          </a:prstGeom>
+          <a:ln w="9525">
+            <a:solidFill>
+              <a:schemeClr val="tx1"/>
+            </a:solidFill>
+          </a:ln>
+        </p:spPr>
+        <p:style>
+          <a:lnRef idx="2">
+            <a:schemeClr val="accent1">
+              <a:shade val="50000"/>
+            </a:schemeClr>
+          </a:lnRef>
+          <a:fillRef idx="1">
+            <a:schemeClr val="accent1"/>
+          </a:fillRef>
+          <a:effectRef idx="0">
+            <a:schemeClr val="accent1"/>
+          </a:effectRef>
+          <a:fontRef idx="minor">
+            <a:schemeClr val="lt1"/>
+          </a:fontRef>
+        </p:style>
+        <p:txBody>
+          <a:bodyPr wrap="none" lIns="0" tIns="0" rIns="0" bIns="0" rtlCol="0" anchor="ctr"/>
+          <a:lstStyle/>
+          <a:p>
+            <a:pPr algn="ctr"/>
+            <a:r>
+              <a:rPr lang="de-DE" sz="504" dirty="0" err="1" smtClean="0"/>
+              <a:t>Maintain</a:t>
+            </a:r>
+            <a:r>
+              <a:rPr lang="de-DE" sz="504" dirty="0" smtClean="0"/>
+              <a:t/>
+            </a:r>
+            <a:br>
+              <a:rPr lang="de-DE" sz="504" dirty="0" smtClean="0"/>
+            </a:br>
+            <a:r>
+              <a:rPr lang="de-DE" sz="504" dirty="0" err="1" smtClean="0"/>
+              <a:t>Battery</a:t>
+            </a:r>
+            <a:r>
+              <a:rPr lang="de-DE" sz="504" dirty="0" smtClean="0"/>
+              <a:t/>
+            </a:r>
+            <a:br>
+              <a:rPr lang="de-DE" sz="504" dirty="0" smtClean="0"/>
+            </a:br>
+            <a:r>
+              <a:rPr lang="de-DE" sz="504" dirty="0" err="1" smtClean="0"/>
+              <a:t>Loaded</a:t>
+            </a:r>
+            <a:endParaRPr lang="de-DE" sz="504" dirty="0"/>
+          </a:p>
+        </p:txBody>
+      </p:sp>
+      <p:sp>
+        <p:nvSpPr>
+          <p:cNvPr id="10" name="Ellipse 9"/>
+          <p:cNvSpPr>
+            <a:spLocks noChangeAspect="1"/>
+          </p:cNvSpPr>
+          <p:nvPr/>
+        </p:nvSpPr>
+        <p:spPr>
+          <a:xfrm>
+            <a:off x="2087934" y="986424"/>
+            <a:ext cx="360001" cy="360000"/>
+          </a:xfrm>
+          <a:prstGeom prst="ellipse">
+            <a:avLst/>
+          </a:prstGeom>
+          <a:ln w="9525">
+            <a:solidFill>
+              <a:schemeClr val="accent2"/>
+            </a:solidFill>
+            <a:prstDash val="sysDash"/>
+          </a:ln>
+        </p:spPr>
+        <p:style>
+          <a:lnRef idx="2">
+            <a:schemeClr val="accent1">
+              <a:shade val="50000"/>
+            </a:schemeClr>
+          </a:lnRef>
+          <a:fillRef idx="1">
+            <a:schemeClr val="accent1"/>
+          </a:fillRef>
+          <a:effectRef idx="0">
+            <a:schemeClr val="accent1"/>
+          </a:effectRef>
+          <a:fontRef idx="minor">
+            <a:schemeClr val="lt1"/>
+          </a:fontRef>
+        </p:style>
+        <p:txBody>
+          <a:bodyPr lIns="0" tIns="0" rIns="0" bIns="0" rtlCol="0" anchor="ctr"/>
+          <a:lstStyle/>
+          <a:p>
+            <a:pPr algn="ctr"/>
+            <a:r>
+              <a:rPr lang="de-DE" sz="504" dirty="0" err="1" smtClean="0"/>
+              <a:t>Perform</a:t>
+            </a:r>
+            <a:r>
+              <a:rPr lang="de-DE" sz="504" dirty="0" smtClean="0"/>
+              <a:t/>
+            </a:r>
+            <a:br>
+              <a:rPr lang="de-DE" sz="504" dirty="0" smtClean="0"/>
+            </a:br>
+            <a:r>
+              <a:rPr lang="de-DE" sz="504" dirty="0" err="1" smtClean="0"/>
+              <a:t>Patrol</a:t>
+            </a:r>
+            <a:endParaRPr lang="de-DE" sz="504" dirty="0"/>
+          </a:p>
+        </p:txBody>
+      </p:sp>
+      <p:cxnSp>
+        <p:nvCxnSpPr>
+          <p:cNvPr id="39" name="Gewinkelter Verbinder 38"/>
+          <p:cNvCxnSpPr>
+            <a:stCxn id="9" idx="6"/>
+            <a:endCxn id="10" idx="2"/>
+          </p:cNvCxnSpPr>
+          <p:nvPr/>
+        </p:nvCxnSpPr>
+        <p:spPr>
+          <a:xfrm>
+            <a:off x="1637860" y="1166422"/>
+            <a:ext cx="450074" cy="2"/>
+          </a:xfrm>
+          <a:prstGeom prst="bentConnector3">
+            <a:avLst>
+              <a:gd name="adj1" fmla="val 50000"/>
+            </a:avLst>
+          </a:prstGeom>
+          <a:ln w="22225">
+            <a:solidFill>
+              <a:schemeClr val="accent2"/>
+            </a:solidFill>
+            <a:tailEnd type="arrow"/>
+          </a:ln>
+        </p:spPr>
+        <p:style>
+          <a:lnRef idx="1">
+            <a:schemeClr val="accent1"/>
+          </a:lnRef>
+          <a:fillRef idx="0">
+            <a:schemeClr val="accent1"/>
+          </a:fillRef>
+          <a:effectRef idx="0">
+            <a:schemeClr val="accent1"/>
+          </a:effectRef>
+          <a:fontRef idx="minor">
+            <a:schemeClr val="tx1"/>
+          </a:fontRef>
+        </p:style>
+      </p:cxnSp>
+      <p:cxnSp>
+        <p:nvCxnSpPr>
+          <p:cNvPr id="41" name="Gewinkelter Verbinder 40"/>
+          <p:cNvCxnSpPr>
+            <a:stCxn id="9" idx="4"/>
+            <a:endCxn id="11" idx="0"/>
+          </p:cNvCxnSpPr>
+          <p:nvPr/>
+        </p:nvCxnSpPr>
+        <p:spPr>
+          <a:xfrm rot="5400000">
+            <a:off x="1367861" y="1436421"/>
+            <a:ext cx="179999" cy="1"/>
+          </a:xfrm>
+          <a:prstGeom prst="bentConnector3">
+            <a:avLst/>
+          </a:prstGeom>
+        </p:spPr>
+        <p:style>
+          <a:lnRef idx="1">
+            <a:schemeClr val="accent1"/>
+          </a:lnRef>
+          <a:fillRef idx="0">
+            <a:schemeClr val="accent1"/>
+          </a:fillRef>
+          <a:effectRef idx="0">
+            <a:schemeClr val="accent1"/>
+          </a:effectRef>
+          <a:fontRef idx="minor">
+            <a:schemeClr val="tx1"/>
+          </a:fontRef>
+        </p:style>
+      </p:cxnSp>
+      <p:sp>
+        <p:nvSpPr>
+          <p:cNvPr id="11" name="Abgerundetes Rechteck 10"/>
+          <p:cNvSpPr/>
+          <p:nvPr/>
+        </p:nvSpPr>
+        <p:spPr>
+          <a:xfrm>
+            <a:off x="1277859" y="1526421"/>
+            <a:ext cx="360000" cy="288000"/>
+          </a:xfrm>
+          <a:prstGeom prst="roundRect">
+            <a:avLst/>
+          </a:prstGeom>
+          <a:ln w="9525">
+            <a:solidFill>
+              <a:schemeClr val="tx1"/>
+            </a:solidFill>
+          </a:ln>
+        </p:spPr>
+        <p:style>
+          <a:lnRef idx="2">
+            <a:schemeClr val="accent1">
+              <a:shade val="50000"/>
+            </a:schemeClr>
+          </a:lnRef>
+          <a:fillRef idx="1">
+            <a:schemeClr val="accent1"/>
+          </a:fillRef>
+          <a:effectRef idx="0">
+            <a:schemeClr val="accent1"/>
+          </a:effectRef>
+          <a:fontRef idx="minor">
+            <a:schemeClr val="lt1"/>
+          </a:fontRef>
+        </p:style>
+        <p:txBody>
+          <a:bodyPr lIns="0" tIns="0" rIns="0" bIns="0" rtlCol="0" anchor="ctr"/>
+          <a:lstStyle/>
+          <a:p>
+            <a:pPr algn="ctr"/>
+            <a:r>
+              <a:rPr lang="de-DE" sz="472" dirty="0" smtClean="0"/>
+              <a:t>Load</a:t>
+            </a:r>
+            <a:br>
+              <a:rPr lang="de-DE" sz="472" dirty="0" smtClean="0"/>
+            </a:br>
+            <a:r>
+              <a:rPr lang="de-DE" sz="472" dirty="0" err="1" smtClean="0"/>
+              <a:t>Battery</a:t>
+            </a:r>
+            <a:endParaRPr lang="de-DE" sz="472" dirty="0"/>
+          </a:p>
+        </p:txBody>
+      </p:sp>
+      <p:cxnSp>
+        <p:nvCxnSpPr>
+          <p:cNvPr id="36" name="Gewinkelter Verbinder 35"/>
+          <p:cNvCxnSpPr>
+            <a:stCxn id="10" idx="4"/>
+            <a:endCxn id="37" idx="0"/>
+          </p:cNvCxnSpPr>
+          <p:nvPr/>
+        </p:nvCxnSpPr>
+        <p:spPr>
+          <a:xfrm rot="5400000">
+            <a:off x="2005341" y="1335376"/>
+            <a:ext cx="251547" cy="273642"/>
+          </a:xfrm>
+          <a:prstGeom prst="bentConnector3">
+            <a:avLst/>
+          </a:prstGeom>
+          <a:ln>
+            <a:solidFill>
+              <a:schemeClr val="accent2"/>
+            </a:solidFill>
+            <a:prstDash val="solid"/>
+          </a:ln>
+        </p:spPr>
+        <p:style>
+          <a:lnRef idx="1">
+            <a:schemeClr val="accent1"/>
+          </a:lnRef>
+          <a:fillRef idx="0">
+            <a:schemeClr val="accent1"/>
+          </a:fillRef>
+          <a:effectRef idx="0">
+            <a:schemeClr val="accent1"/>
+          </a:effectRef>
+          <a:fontRef idx="minor">
+            <a:schemeClr val="tx1"/>
+          </a:fontRef>
+        </p:style>
+      </p:cxnSp>
+      <p:sp>
+        <p:nvSpPr>
+          <p:cNvPr id="37" name="Abgerundetes Rechteck 36"/>
+          <p:cNvSpPr/>
+          <p:nvPr/>
+        </p:nvSpPr>
+        <p:spPr>
+          <a:xfrm>
+            <a:off x="1814292" y="1597971"/>
+            <a:ext cx="360001" cy="288000"/>
+          </a:xfrm>
+          <a:prstGeom prst="roundRect">
+            <a:avLst/>
+          </a:prstGeom>
+          <a:solidFill>
+            <a:schemeClr val="bg1"/>
+          </a:solidFill>
+          <a:ln w="9525">
+            <a:solidFill>
+              <a:schemeClr val="accent2"/>
+            </a:solidFill>
+            <a:prstDash val="sysDash"/>
+          </a:ln>
+        </p:spPr>
+        <p:style>
+          <a:lnRef idx="2">
+            <a:schemeClr val="accent1">
+              <a:shade val="50000"/>
+            </a:schemeClr>
+          </a:lnRef>
+          <a:fillRef idx="1">
+            <a:schemeClr val="accent1"/>
+          </a:fillRef>
+          <a:effectRef idx="0">
+            <a:schemeClr val="accent1"/>
+          </a:effectRef>
+          <a:fontRef idx="minor">
+            <a:schemeClr val="lt1"/>
+          </a:fontRef>
+        </p:style>
+        <p:txBody>
+          <a:bodyPr lIns="0" tIns="0" rIns="0" bIns="0" rtlCol="0" anchor="ctr"/>
+          <a:lstStyle/>
+          <a:p>
+            <a:pPr algn="ctr"/>
+            <a:r>
+              <a:rPr lang="de-DE" sz="472" dirty="0" err="1" smtClean="0">
+                <a:solidFill>
+                  <a:schemeClr val="accent2"/>
+                </a:solidFill>
+              </a:rPr>
+              <a:t>Patrol</a:t>
+            </a:r>
+            <a:r>
+              <a:rPr lang="de-DE" sz="472" dirty="0" smtClean="0">
+                <a:solidFill>
+                  <a:schemeClr val="accent2"/>
+                </a:solidFill>
+              </a:rPr>
+              <a:t> Plan 1</a:t>
+            </a:r>
+            <a:endParaRPr lang="de-DE" sz="472" dirty="0">
+              <a:solidFill>
+                <a:schemeClr val="accent2"/>
+              </a:solidFill>
+            </a:endParaRPr>
+          </a:p>
+        </p:txBody>
+      </p:sp>
+      <p:sp>
+        <p:nvSpPr>
+          <p:cNvPr id="69" name="Textfeld 68"/>
+          <p:cNvSpPr txBox="1"/>
+          <p:nvPr/>
+        </p:nvSpPr>
+        <p:spPr>
+          <a:xfrm>
+            <a:off x="423044" y="115256"/>
+            <a:ext cx="360002" cy="77585"/>
+          </a:xfrm>
+          <a:prstGeom prst="rect">
+            <a:avLst/>
+          </a:prstGeom>
+          <a:noFill/>
+        </p:spPr>
+        <p:txBody>
+          <a:bodyPr wrap="square" lIns="0" tIns="0" rIns="0" bIns="0" rtlCol="0">
+            <a:spAutoFit/>
+          </a:bodyPr>
+          <a:lstStyle/>
+          <a:p>
+            <a:pPr algn="ctr"/>
+            <a:r>
+              <a:rPr lang="de-DE" sz="504" b="1" dirty="0" err="1" smtClean="0">
+                <a:solidFill>
+                  <a:schemeClr val="accent3"/>
+                </a:solidFill>
+              </a:rPr>
+              <a:t>inhibits</a:t>
+            </a:r>
+            <a:endParaRPr lang="de-DE" sz="504" b="1" dirty="0">
+              <a:solidFill>
+                <a:schemeClr val="accent3"/>
+              </a:solidFill>
+            </a:endParaRPr>
+          </a:p>
+        </p:txBody>
+      </p:sp>
+      <p:sp>
+        <p:nvSpPr>
+          <p:cNvPr id="70" name="Ellipse 69"/>
+          <p:cNvSpPr>
+            <a:spLocks noChangeAspect="1"/>
+          </p:cNvSpPr>
+          <p:nvPr/>
+        </p:nvSpPr>
+        <p:spPr>
+          <a:xfrm>
+            <a:off x="53723" y="35878"/>
+            <a:ext cx="360001" cy="360000"/>
+          </a:xfrm>
+          <a:prstGeom prst="ellipse">
+            <a:avLst/>
+          </a:prstGeom>
+          <a:ln w="9525">
+            <a:solidFill>
+              <a:schemeClr val="tx1"/>
+            </a:solidFill>
+            <a:prstDash val="sysDot"/>
+          </a:ln>
+        </p:spPr>
+        <p:style>
+          <a:lnRef idx="2">
+            <a:schemeClr val="accent1">
+              <a:shade val="50000"/>
+            </a:schemeClr>
+          </a:lnRef>
+          <a:fillRef idx="1">
+            <a:schemeClr val="accent1"/>
+          </a:fillRef>
+          <a:effectRef idx="0">
+            <a:schemeClr val="accent1"/>
+          </a:effectRef>
+          <a:fontRef idx="minor">
+            <a:schemeClr val="lt1"/>
+          </a:fontRef>
+        </p:style>
+        <p:txBody>
+          <a:bodyPr wrap="none" lIns="0" tIns="0" rIns="0" bIns="0" rtlCol="0" anchor="ctr"/>
+          <a:lstStyle/>
+          <a:p>
+            <a:pPr algn="ctr"/>
+            <a:r>
+              <a:rPr lang="de-DE" sz="504" dirty="0" err="1" smtClean="0"/>
+              <a:t>Maintain</a:t>
+            </a:r>
+            <a:r>
+              <a:rPr lang="de-DE" sz="504" dirty="0" smtClean="0"/>
+              <a:t/>
+            </a:r>
+            <a:br>
+              <a:rPr lang="de-DE" sz="504" dirty="0" smtClean="0"/>
+            </a:br>
+            <a:r>
+              <a:rPr lang="de-DE" sz="504" dirty="0" err="1" smtClean="0"/>
+              <a:t>Battery</a:t>
+            </a:r>
+            <a:r>
+              <a:rPr lang="de-DE" sz="504" dirty="0" smtClean="0"/>
+              <a:t/>
+            </a:r>
+            <a:br>
+              <a:rPr lang="de-DE" sz="504" dirty="0" smtClean="0"/>
+            </a:br>
+            <a:r>
+              <a:rPr lang="de-DE" sz="504" dirty="0" err="1" smtClean="0"/>
+              <a:t>Loaded</a:t>
+            </a:r>
+            <a:endParaRPr lang="de-DE" sz="504" dirty="0"/>
+          </a:p>
+        </p:txBody>
+      </p:sp>
+      <p:sp>
+        <p:nvSpPr>
+          <p:cNvPr id="71" name="Ellipse 70"/>
+          <p:cNvSpPr>
+            <a:spLocks noChangeAspect="1"/>
+          </p:cNvSpPr>
+          <p:nvPr/>
+        </p:nvSpPr>
+        <p:spPr>
+          <a:xfrm>
+            <a:off x="863798" y="35880"/>
+            <a:ext cx="360001" cy="360000"/>
+          </a:xfrm>
+          <a:prstGeom prst="ellipse">
+            <a:avLst/>
+          </a:prstGeom>
+          <a:ln w="9525">
+            <a:solidFill>
+              <a:schemeClr val="tx1"/>
+            </a:solidFill>
+          </a:ln>
+        </p:spPr>
+        <p:style>
+          <a:lnRef idx="2">
+            <a:schemeClr val="accent1">
+              <a:shade val="50000"/>
+            </a:schemeClr>
+          </a:lnRef>
+          <a:fillRef idx="1">
+            <a:schemeClr val="accent1"/>
+          </a:fillRef>
+          <a:effectRef idx="0">
+            <a:schemeClr val="accent1"/>
+          </a:effectRef>
+          <a:fontRef idx="minor">
+            <a:schemeClr val="lt1"/>
+          </a:fontRef>
+        </p:style>
+        <p:txBody>
+          <a:bodyPr lIns="0" tIns="0" rIns="0" bIns="0" rtlCol="0" anchor="ctr"/>
+          <a:lstStyle/>
+          <a:p>
+            <a:pPr algn="ctr"/>
+            <a:r>
+              <a:rPr lang="de-DE" sz="504" dirty="0" err="1" smtClean="0"/>
+              <a:t>Perform</a:t>
+            </a:r>
+            <a:r>
+              <a:rPr lang="de-DE" sz="504" dirty="0" smtClean="0"/>
+              <a:t/>
+            </a:r>
+            <a:br>
+              <a:rPr lang="de-DE" sz="504" dirty="0" smtClean="0"/>
+            </a:br>
+            <a:r>
+              <a:rPr lang="de-DE" sz="504" dirty="0" err="1" smtClean="0"/>
+              <a:t>Patrol</a:t>
+            </a:r>
+            <a:endParaRPr lang="de-DE" sz="504" dirty="0"/>
+          </a:p>
+        </p:txBody>
+      </p:sp>
+      <p:cxnSp>
+        <p:nvCxnSpPr>
+          <p:cNvPr id="72" name="Gewinkelter Verbinder 71"/>
+          <p:cNvCxnSpPr>
+            <a:stCxn id="70" idx="6"/>
+            <a:endCxn id="71" idx="2"/>
+          </p:cNvCxnSpPr>
+          <p:nvPr/>
+        </p:nvCxnSpPr>
+        <p:spPr>
+          <a:xfrm>
+            <a:off x="413724" y="215878"/>
+            <a:ext cx="450074" cy="2"/>
+          </a:xfrm>
+          <a:prstGeom prst="bentConnector3">
+            <a:avLst>
+              <a:gd name="adj1" fmla="val 50000"/>
+            </a:avLst>
+          </a:prstGeom>
+          <a:ln w="22225">
+            <a:solidFill>
+              <a:schemeClr val="accent3"/>
+            </a:solidFill>
+            <a:prstDash val="solid"/>
+            <a:tailEnd type="arrow"/>
+          </a:ln>
+        </p:spPr>
+        <p:style>
+          <a:lnRef idx="1">
+            <a:schemeClr val="accent1"/>
+          </a:lnRef>
+          <a:fillRef idx="0">
+            <a:schemeClr val="accent1"/>
+          </a:fillRef>
+          <a:effectRef idx="0">
+            <a:schemeClr val="accent1"/>
+          </a:effectRef>
+          <a:fontRef idx="minor">
+            <a:schemeClr val="tx1"/>
+          </a:fontRef>
+        </p:style>
+      </p:cxnSp>
+      <p:cxnSp>
+        <p:nvCxnSpPr>
+          <p:cNvPr id="75" name="Gewinkelter Verbinder 74"/>
+          <p:cNvCxnSpPr>
+            <a:stCxn id="71" idx="4"/>
+            <a:endCxn id="78" idx="0"/>
+          </p:cNvCxnSpPr>
+          <p:nvPr/>
+        </p:nvCxnSpPr>
+        <p:spPr>
+          <a:xfrm rot="5400000">
+            <a:off x="781205" y="384832"/>
+            <a:ext cx="251547" cy="273642"/>
+          </a:xfrm>
+          <a:prstGeom prst="bentConnector3">
+            <a:avLst/>
+          </a:prstGeom>
+        </p:spPr>
+        <p:style>
+          <a:lnRef idx="1">
+            <a:schemeClr val="accent1"/>
+          </a:lnRef>
+          <a:fillRef idx="0">
+            <a:schemeClr val="accent1"/>
+          </a:fillRef>
+          <a:effectRef idx="0">
+            <a:schemeClr val="accent1"/>
+          </a:effectRef>
+          <a:fontRef idx="minor">
+            <a:schemeClr val="tx1"/>
+          </a:fontRef>
+        </p:style>
+      </p:cxnSp>
+      <p:sp>
+        <p:nvSpPr>
+          <p:cNvPr id="78" name="Abgerundetes Rechteck 77"/>
+          <p:cNvSpPr/>
+          <p:nvPr/>
+        </p:nvSpPr>
+        <p:spPr>
+          <a:xfrm>
+            <a:off x="590156" y="647427"/>
+            <a:ext cx="360001" cy="288000"/>
+          </a:xfrm>
+          <a:prstGeom prst="roundRect">
+            <a:avLst/>
+          </a:prstGeom>
+          <a:ln w="9525">
+            <a:solidFill>
+              <a:schemeClr val="tx1"/>
+            </a:solidFill>
+          </a:ln>
+        </p:spPr>
+        <p:style>
+          <a:lnRef idx="2">
+            <a:schemeClr val="accent1">
+              <a:shade val="50000"/>
+            </a:schemeClr>
+          </a:lnRef>
+          <a:fillRef idx="1">
+            <a:schemeClr val="accent1"/>
+          </a:fillRef>
+          <a:effectRef idx="0">
+            <a:schemeClr val="accent1"/>
+          </a:effectRef>
+          <a:fontRef idx="minor">
+            <a:schemeClr val="lt1"/>
+          </a:fontRef>
+        </p:style>
+        <p:txBody>
+          <a:bodyPr lIns="0" tIns="0" rIns="0" bIns="0" rtlCol="0" anchor="ctr"/>
+          <a:lstStyle/>
+          <a:p>
+            <a:pPr algn="ctr"/>
+            <a:r>
+              <a:rPr lang="de-DE" sz="472" dirty="0" err="1" smtClean="0"/>
+              <a:t>Patrol</a:t>
+            </a:r>
+            <a:r>
+              <a:rPr lang="de-DE" sz="472" dirty="0" smtClean="0"/>
+              <a:t> Plan 1</a:t>
+            </a:r>
+            <a:endParaRPr lang="de-DE" sz="472" dirty="0"/>
+          </a:p>
+        </p:txBody>
+      </p:sp>
+      <p:sp>
+        <p:nvSpPr>
+          <p:cNvPr id="81" name="Textfeld 80"/>
+          <p:cNvSpPr txBox="1"/>
+          <p:nvPr/>
+        </p:nvSpPr>
+        <p:spPr>
+          <a:xfrm>
+            <a:off x="279173" y="357460"/>
+            <a:ext cx="301546" cy="155171"/>
+          </a:xfrm>
+          <a:prstGeom prst="rect">
+            <a:avLst/>
+          </a:prstGeom>
+          <a:noFill/>
+        </p:spPr>
+        <p:txBody>
+          <a:bodyPr wrap="square" lIns="0" tIns="0" rIns="0" bIns="0" rtlCol="0">
+            <a:spAutoFit/>
+          </a:bodyPr>
+          <a:lstStyle/>
+          <a:p>
+            <a:pPr algn="ctr"/>
+            <a:r>
+              <a:rPr lang="de-DE" sz="504" dirty="0"/>
+              <a:t>Goal</a:t>
+            </a:r>
+            <a:br>
+              <a:rPr lang="de-DE" sz="504" dirty="0"/>
+            </a:br>
+            <a:r>
+              <a:rPr lang="de-DE" sz="504" b="1" i="1" dirty="0" err="1"/>
+              <a:t>idle</a:t>
+            </a:r>
+            <a:endParaRPr lang="de-DE" sz="504" b="1" i="1" dirty="0"/>
+          </a:p>
+        </p:txBody>
+      </p:sp>
+      <p:sp>
+        <p:nvSpPr>
+          <p:cNvPr id="82" name="Rechteckiger Pfeil 81"/>
+          <p:cNvSpPr/>
+          <p:nvPr/>
+        </p:nvSpPr>
+        <p:spPr>
+          <a:xfrm flipV="1">
+            <a:off x="566344" y="1094692"/>
+            <a:ext cx="575351" cy="461248"/>
+          </a:xfrm>
+          <a:prstGeom prst="bentArrow">
+            <a:avLst/>
+          </a:prstGeom>
+          <a:solidFill>
+            <a:schemeClr val="bg1">
+              <a:lumMod val="75000"/>
+            </a:schemeClr>
+          </a:solidFill>
+          <a:ln>
+            <a:noFill/>
+          </a:ln>
+        </p:spPr>
+        <p:style>
+          <a:lnRef idx="2">
+            <a:schemeClr val="accent1">
+              <a:shade val="50000"/>
+            </a:schemeClr>
+          </a:lnRef>
+          <a:fillRef idx="1">
+            <a:schemeClr val="accent1"/>
+          </a:fillRef>
+          <a:effectRef idx="0">
+            <a:schemeClr val="accent1"/>
+          </a:effectRef>
+          <a:fontRef idx="minor">
+            <a:schemeClr val="lt1"/>
+          </a:fontRef>
+        </p:style>
+        <p:txBody>
+          <a:bodyPr rtlCol="0" anchor="ctr"/>
+          <a:lstStyle/>
+          <a:p>
+            <a:pPr algn="ctr"/>
+            <a:endParaRPr lang="de-DE">
+              <a:solidFill>
+                <a:schemeClr val="tx1"/>
+              </a:solidFill>
+            </a:endParaRPr>
+          </a:p>
+        </p:txBody>
+      </p:sp>
+      <p:sp>
+        <p:nvSpPr>
+          <p:cNvPr id="83" name="Textfeld 82"/>
+          <p:cNvSpPr txBox="1"/>
+          <p:nvPr/>
+        </p:nvSpPr>
+        <p:spPr>
+          <a:xfrm>
+            <a:off x="1159915" y="137858"/>
+            <a:ext cx="360002" cy="155171"/>
+          </a:xfrm>
+          <a:prstGeom prst="rect">
+            <a:avLst/>
+          </a:prstGeom>
+          <a:noFill/>
+        </p:spPr>
+        <p:txBody>
+          <a:bodyPr wrap="square" lIns="0" tIns="0" rIns="0" bIns="0" rtlCol="0">
+            <a:spAutoFit/>
+          </a:bodyPr>
+          <a:lstStyle/>
+          <a:p>
+            <a:pPr algn="ctr"/>
+            <a:r>
+              <a:rPr lang="de-DE" sz="504" dirty="0"/>
+              <a:t>Goal</a:t>
+            </a:r>
+            <a:br>
+              <a:rPr lang="de-DE" sz="504" dirty="0"/>
+            </a:br>
+            <a:r>
+              <a:rPr lang="de-DE" sz="504" b="1" i="1" dirty="0" err="1" smtClean="0"/>
+              <a:t>active</a:t>
+            </a:r>
+            <a:endParaRPr lang="de-DE" sz="504" b="1" i="1" dirty="0"/>
+          </a:p>
+        </p:txBody>
+      </p:sp>
+      <p:sp>
+        <p:nvSpPr>
+          <p:cNvPr id="84" name="Textfeld 83"/>
+          <p:cNvSpPr txBox="1"/>
+          <p:nvPr/>
+        </p:nvSpPr>
+        <p:spPr>
+          <a:xfrm>
+            <a:off x="1687712" y="1384914"/>
+            <a:ext cx="360002" cy="155171"/>
+          </a:xfrm>
+          <a:prstGeom prst="rect">
+            <a:avLst/>
+          </a:prstGeom>
+          <a:noFill/>
+        </p:spPr>
+        <p:txBody>
+          <a:bodyPr wrap="square" lIns="0" tIns="0" rIns="0" bIns="0" rtlCol="0">
+            <a:spAutoFit/>
+          </a:bodyPr>
+          <a:lstStyle/>
+          <a:p>
+            <a:pPr algn="ctr"/>
+            <a:r>
+              <a:rPr lang="de-DE" sz="504" dirty="0" smtClean="0">
+                <a:solidFill>
+                  <a:schemeClr val="accent2"/>
+                </a:solidFill>
+              </a:rPr>
+              <a:t>Plan</a:t>
+            </a:r>
+            <a:r>
+              <a:rPr lang="de-DE" sz="504" dirty="0">
+                <a:solidFill>
+                  <a:schemeClr val="accent2"/>
+                </a:solidFill>
+              </a:rPr>
+              <a:t/>
+            </a:r>
+            <a:br>
+              <a:rPr lang="de-DE" sz="504" dirty="0">
+                <a:solidFill>
+                  <a:schemeClr val="accent2"/>
+                </a:solidFill>
+              </a:rPr>
+            </a:br>
+            <a:r>
+              <a:rPr lang="de-DE" sz="504" dirty="0" err="1" smtClean="0">
+                <a:solidFill>
+                  <a:schemeClr val="accent2"/>
+                </a:solidFill>
+              </a:rPr>
+              <a:t>aborted</a:t>
+            </a:r>
+            <a:endParaRPr lang="de-DE" sz="504" dirty="0">
+              <a:solidFill>
+                <a:schemeClr val="accent2"/>
+              </a:solidFill>
+            </a:endParaRPr>
+          </a:p>
+        </p:txBody>
+      </p:sp>
+      <p:cxnSp>
+        <p:nvCxnSpPr>
+          <p:cNvPr id="85" name="Gewinkelter Verbinder 84"/>
+          <p:cNvCxnSpPr/>
+          <p:nvPr/>
+        </p:nvCxnSpPr>
+        <p:spPr>
+          <a:xfrm flipH="1">
+            <a:off x="2007183" y="1293477"/>
+            <a:ext cx="80038" cy="155171"/>
+          </a:xfrm>
+          <a:prstGeom prst="straightConnector1">
+            <a:avLst/>
+          </a:prstGeom>
+          <a:ln>
+            <a:solidFill>
+              <a:schemeClr val="accent2"/>
+            </a:solidFill>
+            <a:prstDash val="dash"/>
+            <a:tailEnd type="arrow"/>
+          </a:ln>
+        </p:spPr>
+        <p:style>
+          <a:lnRef idx="1">
+            <a:schemeClr val="accent1"/>
+          </a:lnRef>
+          <a:fillRef idx="0">
+            <a:schemeClr val="accent1"/>
+          </a:fillRef>
+          <a:effectRef idx="0">
+            <a:schemeClr val="accent1"/>
+          </a:effectRef>
+          <a:fontRef idx="minor">
+            <a:schemeClr val="tx1"/>
+          </a:fontRef>
+        </p:style>
+      </p:cxnSp>
+      <p:sp>
+        <p:nvSpPr>
+          <p:cNvPr id="93" name="Rechteckiger Pfeil 92"/>
+          <p:cNvSpPr/>
+          <p:nvPr/>
+        </p:nvSpPr>
+        <p:spPr>
+          <a:xfrm rot="10800000" flipV="1">
+            <a:off x="1565365" y="277008"/>
+            <a:ext cx="575351" cy="461248"/>
+          </a:xfrm>
+          <a:prstGeom prst="bentArrow">
+            <a:avLst/>
+          </a:prstGeom>
+          <a:solidFill>
+            <a:schemeClr val="bg1">
+              <a:lumMod val="75000"/>
+            </a:schemeClr>
+          </a:solidFill>
+          <a:ln>
+            <a:noFill/>
+          </a:ln>
+        </p:spPr>
+        <p:style>
+          <a:lnRef idx="2">
+            <a:schemeClr val="accent1">
+              <a:shade val="50000"/>
+            </a:schemeClr>
+          </a:lnRef>
+          <a:fillRef idx="1">
+            <a:schemeClr val="accent1"/>
+          </a:fillRef>
+          <a:effectRef idx="0">
+            <a:schemeClr val="accent1"/>
+          </a:effectRef>
+          <a:fontRef idx="minor">
+            <a:schemeClr val="lt1"/>
+          </a:fontRef>
+        </p:style>
+        <p:txBody>
+          <a:bodyPr rtlCol="0" anchor="ctr"/>
+          <a:lstStyle/>
+          <a:p>
+            <a:pPr algn="ctr"/>
+            <a:endParaRPr lang="de-DE">
+              <a:solidFill>
+                <a:schemeClr val="tx1"/>
+              </a:solidFill>
+            </a:endParaRPr>
+          </a:p>
+        </p:txBody>
+      </p:sp>
+      <p:cxnSp>
+        <p:nvCxnSpPr>
+          <p:cNvPr id="95" name="Gerader Verbinder 94"/>
+          <p:cNvCxnSpPr/>
+          <p:nvPr/>
+        </p:nvCxnSpPr>
+        <p:spPr>
+          <a:xfrm flipV="1">
+            <a:off x="815411" y="647427"/>
+            <a:ext cx="1011770" cy="576883"/>
+          </a:xfrm>
+          <a:prstGeom prst="line">
+            <a:avLst/>
+          </a:prstGeom>
+        </p:spPr>
+        <p:style>
+          <a:lnRef idx="1">
+            <a:schemeClr val="accent1"/>
+          </a:lnRef>
+          <a:fillRef idx="0">
+            <a:schemeClr val="accent1"/>
+          </a:fillRef>
+          <a:effectRef idx="0">
+            <a:schemeClr val="accent1"/>
+          </a:effectRef>
+          <a:fontRef idx="minor">
+            <a:schemeClr val="tx1"/>
+          </a:fontRef>
+        </p:style>
+      </p:cxnSp>
+      <p:sp>
+        <p:nvSpPr>
+          <p:cNvPr id="96" name="Titel 67"/>
+          <p:cNvSpPr>
+            <a:spLocks noGrp="1"/>
+          </p:cNvSpPr>
+          <p:nvPr>
+            <p:ph type="title"/>
+          </p:nvPr>
+        </p:nvSpPr>
+        <p:spPr>
+          <a:xfrm>
+            <a:off x="64555" y="1032005"/>
+            <a:ext cx="509009" cy="494416"/>
+          </a:xfrm>
+        </p:spPr>
+        <p:txBody>
+          <a:bodyPr lIns="0" tIns="0" rIns="0" bIns="0">
+            <a:normAutofit/>
+          </a:bodyPr>
+          <a:lstStyle/>
+          <a:p>
+            <a:r>
+              <a:rPr lang="en-US" sz="800" i="1" dirty="0" smtClean="0"/>
+              <a:t>maintain condition becomes </a:t>
+            </a:r>
+            <a:r>
+              <a:rPr lang="en-US" sz="800" dirty="0" smtClean="0">
+                <a:solidFill>
+                  <a:schemeClr val="accent2"/>
+                </a:solidFill>
+                <a:latin typeface="Consolas" panose="020B0609020204030204" pitchFamily="49" charset="0"/>
+              </a:rPr>
+              <a:t>false</a:t>
+            </a:r>
+            <a:endParaRPr lang="en-US" sz="800" dirty="0">
+              <a:solidFill>
+                <a:schemeClr val="accent2"/>
+              </a:solidFill>
+              <a:latin typeface="Consolas" panose="020B0609020204030204" pitchFamily="49" charset="0"/>
+            </a:endParaRPr>
+          </a:p>
+        </p:txBody>
+      </p:sp>
+      <p:sp>
+        <p:nvSpPr>
+          <p:cNvPr id="98" name="Titel 67"/>
+          <p:cNvSpPr txBox="1">
+            <a:spLocks/>
+          </p:cNvSpPr>
+          <p:nvPr/>
+        </p:nvSpPr>
+        <p:spPr>
+          <a:xfrm>
+            <a:off x="2150862" y="146246"/>
+            <a:ext cx="554899" cy="592010"/>
+          </a:xfrm>
+          <a:prstGeom prst="rect">
+            <a:avLst/>
+          </a:prstGeom>
+        </p:spPr>
+        <p:txBody>
+          <a:bodyPr vert="horz" lIns="0" tIns="0" rIns="0" bIns="0" rtlCol="0" anchor="ctr">
+            <a:normAutofit/>
+          </a:bodyPr>
+          <a:lstStyle>
+            <a:lvl1pPr algn="ctr" defTabSz="288005" rtl="0" eaLnBrk="1" latinLnBrk="0" hangingPunct="1">
+              <a:spcBef>
+                <a:spcPct val="0"/>
+              </a:spcBef>
+              <a:buNone/>
+              <a:defRPr sz="1386" kern="1200">
+                <a:solidFill>
+                  <a:schemeClr val="tx1"/>
+                </a:solidFill>
+                <a:latin typeface="+mj-lt"/>
+                <a:ea typeface="+mj-ea"/>
+                <a:cs typeface="+mj-cs"/>
+              </a:defRPr>
+            </a:lvl1pPr>
+          </a:lstStyle>
+          <a:p>
+            <a:r>
+              <a:rPr lang="en-US" sz="800" i="1" dirty="0" smtClean="0">
+                <a:latin typeface="+mn-lt"/>
+              </a:rPr>
+              <a:t>maintain condition becomes </a:t>
+            </a:r>
+            <a:r>
+              <a:rPr lang="en-US" sz="800" dirty="0" smtClean="0">
+                <a:solidFill>
+                  <a:schemeClr val="accent3">
+                    <a:lumMod val="50000"/>
+                  </a:schemeClr>
+                </a:solidFill>
+                <a:latin typeface="Consolas" panose="020B0609020204030204" pitchFamily="49" charset="0"/>
+              </a:rPr>
+              <a:t>true</a:t>
+            </a:r>
+            <a:endParaRPr lang="en-US" sz="800" dirty="0">
+              <a:solidFill>
+                <a:schemeClr val="accent3">
+                  <a:lumMod val="50000"/>
+                </a:schemeClr>
+              </a:solidFill>
+              <a:latin typeface="Consolas" panose="020B0609020204030204" pitchFamily="49" charset="0"/>
+            </a:endParaRPr>
+          </a:p>
+        </p:txBody>
+      </p:sp>
+      <p:sp>
+        <p:nvSpPr>
+          <p:cNvPr id="100" name="Textfeld 99"/>
+          <p:cNvSpPr txBox="1"/>
+          <p:nvPr/>
+        </p:nvSpPr>
+        <p:spPr>
+          <a:xfrm>
+            <a:off x="1509681" y="1293477"/>
+            <a:ext cx="267648" cy="155171"/>
+          </a:xfrm>
+          <a:prstGeom prst="rect">
+            <a:avLst/>
+          </a:prstGeom>
+          <a:noFill/>
+        </p:spPr>
+        <p:txBody>
+          <a:bodyPr wrap="square" lIns="0" tIns="0" rIns="0" bIns="0" rtlCol="0">
+            <a:spAutoFit/>
+          </a:bodyPr>
+          <a:lstStyle/>
+          <a:p>
+            <a:pPr algn="ctr"/>
+            <a:r>
+              <a:rPr lang="de-DE" sz="504" dirty="0"/>
+              <a:t>Goal</a:t>
+            </a:r>
+            <a:br>
+              <a:rPr lang="de-DE" sz="504" dirty="0"/>
+            </a:br>
+            <a:r>
+              <a:rPr lang="de-DE" sz="504" b="1" i="1" dirty="0" err="1" smtClean="0"/>
+              <a:t>active</a:t>
+            </a:r>
+            <a:endParaRPr lang="de-DE" sz="504" b="1" i="1" dirty="0"/>
+          </a:p>
+        </p:txBody>
+      </p:sp>
+      <p:sp>
+        <p:nvSpPr>
+          <p:cNvPr id="101" name="Textfeld 100"/>
+          <p:cNvSpPr txBox="1"/>
+          <p:nvPr/>
+        </p:nvSpPr>
+        <p:spPr>
+          <a:xfrm>
+            <a:off x="2364917" y="1197863"/>
+            <a:ext cx="339720" cy="155171"/>
+          </a:xfrm>
+          <a:prstGeom prst="rect">
+            <a:avLst/>
+          </a:prstGeom>
+          <a:noFill/>
+        </p:spPr>
+        <p:txBody>
+          <a:bodyPr wrap="square" lIns="0" tIns="0" rIns="0" bIns="0" rtlCol="0">
+            <a:spAutoFit/>
+          </a:bodyPr>
+          <a:lstStyle/>
+          <a:p>
+            <a:pPr algn="ctr"/>
+            <a:r>
+              <a:rPr lang="de-DE" sz="504" dirty="0"/>
+              <a:t>Goal</a:t>
+            </a:r>
+            <a:br>
+              <a:rPr lang="de-DE" sz="504" dirty="0"/>
+            </a:br>
+            <a:r>
+              <a:rPr lang="de-DE" sz="504" b="1" i="1" dirty="0" err="1" smtClean="0"/>
+              <a:t>suspended</a:t>
+            </a:r>
+            <a:endParaRPr lang="de-DE" sz="504" b="1" i="1" dirty="0"/>
+          </a:p>
+        </p:txBody>
+      </p:sp>
+    </p:spTree>
+    <p:extLst>
+      <p:ext uri="{BB962C8B-B14F-4D97-AF65-F5344CB8AC3E}">
+        <p14:creationId xmlns:p14="http://schemas.microsoft.com/office/powerpoint/2010/main" val="263173259"/>
+      </p:ext>
+    </p:extLst>
+  </p:cSld>
+  <p:clrMapOvr>
+    <a:masterClrMapping/>
+  </p:clrMapOvr>
+  <mc:AlternateContent xmlns:mc="http://schemas.openxmlformats.org/markup-compatibility/2006" xmlns:p14="http://schemas.microsoft.com/office/powerpoint/2010/main">
+    <mc:Choice Requires="p14">
+      <p:transition spd="slow" p14:dur="2000"/>
+    </mc:Choice>
+    <mc:Fallback xmlns="">
+      <p:transition spd="slow"/>
+    </mc:Fallback>
+  </mc:AlternateContent>
+  <p:timing>
+    <p:tnLst>
+      <p:par>
+        <p:cTn id="1" dur="indefinite" restart="never" nodeType="tmRoot"/>
+      </p:par>
+    </p:tnLst>
+  </p:timing>
+</p:sld>
+</file>
+
+<file path=ppt/slides/slide4.xml><?xml version="1.0" encoding="utf-8"?>
+<p:sld xmlns:a="http://schemas.openxmlformats.org/drawingml/2006/main" xmlns:r="http://schemas.openxmlformats.org/officeDocument/2006/relationships" xmlns:p="http://schemas.openxmlformats.org/presentationml/2006/main">
+  <p:cSld>
+    <p:spTree>
+      <p:nvGrpSpPr>
+        <p:cNvPr id="1" name=""/>
+        <p:cNvGrpSpPr/>
+        <p:nvPr/>
+      </p:nvGrpSpPr>
+      <p:grpSpPr>
+        <a:xfrm>
+          <a:off x="0" y="0"/>
+          <a:ext cx="0" cy="0"/>
+          <a:chOff x="0" y="0"/>
+          <a:chExt cx="0" cy="0"/>
+        </a:xfrm>
+      </p:grpSpPr>
+      <p:sp>
+        <p:nvSpPr>
           <p:cNvPr id="68" name="Titel 67"/>
           <p:cNvSpPr>
             <a:spLocks noGrp="1"/>
@@ -6316,17 +8172,12 @@
           <a:p>
             <a:r>
               <a:rPr lang="en-US" dirty="0" smtClean="0"/>
-              <a:t>Goal </a:t>
-            </a:r>
-            <a:r>
-              <a:rPr lang="en-US" dirty="0" smtClean="0"/>
-              <a:t>Plan </a:t>
+              <a:t>Goal Plan </a:t>
             </a:r>
             <a:r>
               <a:rPr lang="en-US" dirty="0"/>
               <a:t>Tree Example</a:t>
             </a:r>
-            <a:endParaRPr lang="en-US" dirty="0"/>
           </a:p>
         </p:txBody>
       </p:sp>
@@ -6407,11 +8258,7 @@
             </a:r>
             <a:r>
               <a:rPr lang="de-DE" sz="504" dirty="0"/>
-              <a:t> </a:t>
-            </a:r>
-            <a:r>
-              <a:rPr lang="de-DE" sz="504" dirty="0"/>
-              <a:t>pan-</a:t>
+              <a:t> pan-</a:t>
             </a:r>
             <a:r>
               <a:rPr lang="de-DE" sz="504" dirty="0" err="1"/>
@@ -6511,17 +8358,12 @@
           <a:p>
             <a:r>
               <a:rPr lang="de-DE" sz="504" dirty="0" err="1"/>
-              <a:t>s</a:t>
-            </a:r>
-            <a:r>
-              <a:rPr lang="de-DE" sz="504" dirty="0" err="1"/>
-              <a:t>equential</a:t>
+              <a:t>sequential</a:t>
             </a:r>
             <a:r>
               <a:rPr lang="de-DE" sz="504" dirty="0"/>
               <a:t> = AND</a:t>
             </a:r>
-            <a:endParaRPr lang="de-DE" sz="504" dirty="0"/>
           </a:p>
         </p:txBody>
       </p:sp>
@@ -6551,7 +8393,6 @@
               <a:rPr lang="de-DE" sz="504" dirty="0"/>
               <a:t>…</a:t>
             </a:r>
-            <a:endParaRPr lang="de-DE" sz="504" dirty="0"/>
           </a:p>
         </p:txBody>
       </p:sp>
@@ -6785,7 +8626,6 @@
               <a:rPr lang="de-DE" sz="504" dirty="0"/>
               <a:t>= OR</a:t>
             </a:r>
-            <a:endParaRPr lang="de-DE" sz="504" dirty="0"/>
           </a:p>
         </p:txBody>
       </p:sp>
@@ -6933,7 +8773,6 @@
               <a:rPr lang="de-DE" sz="472" dirty="0"/>
               <a:t> </a:t>
             </a:r>
-            <a:endParaRPr lang="de-DE" sz="472" dirty="0"/>
           </a:p>
         </p:txBody>
       </p:sp>
@@ -7037,7 +8876,6 @@
               <a:rPr lang="de-DE" sz="504" dirty="0"/>
               <a:t>= OR</a:t>
             </a:r>
-            <a:endParaRPr lang="de-DE" sz="504" dirty="0"/>
           </a:p>
         </p:txBody>
       </p:sp>
@@ -7092,11 +8930,7 @@
             </a:r>
             <a:r>
               <a:rPr lang="de-DE" sz="504" dirty="0" err="1"/>
-              <a:t>p</a:t>
-            </a:r>
-            <a:r>
-              <a:rPr lang="de-DE" sz="504" dirty="0" err="1"/>
-              <a:t>ancake</a:t>
+              <a:t>pancake</a:t>
             </a:r>
             <a:endParaRPr lang="de-DE" sz="504" dirty="0"/>
           </a:p>
@@ -7221,7 +9055,6 @@
               <a:rPr lang="de-DE" sz="504" dirty="0"/>
               <a:t>plan</a:t>
             </a:r>
-            <a:endParaRPr lang="de-DE" sz="504" dirty="0"/>
           </a:p>
         </p:txBody>
       </p:sp>
@@ -7276,11 +9109,7 @@
             </a:r>
             <a:r>
               <a:rPr lang="de-DE" sz="504" dirty="0" err="1"/>
-              <a:t>p</a:t>
-            </a:r>
-            <a:r>
-              <a:rPr lang="de-DE" sz="504" dirty="0" err="1"/>
-              <a:t>ancake</a:t>
+              <a:t>pancake</a:t>
             </a:r>
             <a:endParaRPr lang="de-DE" sz="504" dirty="0"/>
           </a:p>
@@ -7289,7 +9118,7 @@
     </p:spTree>
     <p:extLst>
       <p:ext uri="{BB962C8B-B14F-4D97-AF65-F5344CB8AC3E}">
-        <p14:creationId xmlns:p14="http://schemas.microsoft.com/office/powerpoint/2010/main" val="263173259"/>
+        <p14:creationId xmlns:p14="http://schemas.microsoft.com/office/powerpoint/2010/main" val="2842158907"/>
       </p:ext>
     </p:extLst>
   </p:cSld>

</xml_diff>

<commit_message>
fix simple cleaner svg
</commit_message>
<xml_diff>
--- a/docs/mkdocs-ng/docs/tutorials/quickstart-bdi/patrol.pptx
+++ b/docs/mkdocs-ng/docs/tutorials/quickstart-bdi/patrol.pptx
@@ -3286,6 +3286,13 @@
   <p:clrMapOvr>
     <a:masterClrMapping/>
   </p:clrMapOvr>
+  <p:timing>
+    <p:tnLst>
+      <p:par>
+        <p:cTn id="1" dur="indefinite" restart="never" nodeType="tmRoot"/>
+      </p:par>
+    </p:tnLst>
+  </p:timing>
 </p:sld>
 </file>
 
@@ -9311,8 +9318,8 @@
         </p:nvSpPr>
         <p:spPr>
           <a:xfrm>
-            <a:off x="2483991" y="3057334"/>
-            <a:ext cx="144016" cy="119017"/>
+            <a:off x="177871" y="98798"/>
+            <a:ext cx="5114432" cy="3077554"/>
           </a:xfrm>
           <a:prstGeom prst="rect">
             <a:avLst/>

</xml_diff>